<commit_message>
Changes for presentation and minor in documentation
</commit_message>
<xml_diff>
--- a/Abgaben/Abschlusspr�sentation.pptx
+++ b/Abgaben/Abschlusspr�sentation.pptx
@@ -12,9 +12,9 @@
     <p:sldId id="261" r:id="rId6"/>
     <p:sldId id="262" r:id="rId7"/>
     <p:sldId id="263" r:id="rId8"/>
-    <p:sldId id="264" r:id="rId9"/>
-    <p:sldId id="265" r:id="rId10"/>
-    <p:sldId id="266" r:id="rId11"/>
+    <p:sldId id="267" r:id="rId9"/>
+    <p:sldId id="264" r:id="rId10"/>
+    <p:sldId id="265" r:id="rId11"/>
   </p:sldIdLst>
   <p:sldSz cx="9144000" cy="6858000" type="screen4x3"/>
   <p:notesSz cx="6858000" cy="9144000"/>
@@ -114,6 +114,3966 @@
     </a:lvl9pPr>
   </p:defaultTextStyle>
 </p:presentation>
+</file>
+
+<file path=ppt/diagrams/colors1.xml><?xml version="1.0" encoding="utf-8"?>
+<dgm:colorsDef xmlns:dgm="http://schemas.openxmlformats.org/drawingml/2006/diagram" xmlns:a="http://schemas.openxmlformats.org/drawingml/2006/main" uniqueId="urn:microsoft.com/office/officeart/2005/8/colors/accent1_2">
+  <dgm:title val=""/>
+  <dgm:desc val=""/>
+  <dgm:catLst>
+    <dgm:cat type="accent1" pri="11200"/>
+  </dgm:catLst>
+  <dgm:styleLbl name="node0">
+    <dgm:fillClrLst meth="repeat">
+      <a:schemeClr val="accent1"/>
+    </dgm:fillClrLst>
+    <dgm:linClrLst meth="repeat">
+      <a:schemeClr val="lt1"/>
+    </dgm:linClrLst>
+    <dgm:effectClrLst/>
+    <dgm:txLinClrLst/>
+    <dgm:txFillClrLst/>
+    <dgm:txEffectClrLst/>
+  </dgm:styleLbl>
+  <dgm:styleLbl name="alignNode1">
+    <dgm:fillClrLst meth="repeat">
+      <a:schemeClr val="accent1"/>
+    </dgm:fillClrLst>
+    <dgm:linClrLst meth="repeat">
+      <a:schemeClr val="accent1"/>
+    </dgm:linClrLst>
+    <dgm:effectClrLst/>
+    <dgm:txLinClrLst/>
+    <dgm:txFillClrLst/>
+    <dgm:txEffectClrLst/>
+  </dgm:styleLbl>
+  <dgm:styleLbl name="node1">
+    <dgm:fillClrLst meth="repeat">
+      <a:schemeClr val="accent1"/>
+    </dgm:fillClrLst>
+    <dgm:linClrLst meth="repeat">
+      <a:schemeClr val="lt1"/>
+    </dgm:linClrLst>
+    <dgm:effectClrLst/>
+    <dgm:txLinClrLst/>
+    <dgm:txFillClrLst/>
+    <dgm:txEffectClrLst/>
+  </dgm:styleLbl>
+  <dgm:styleLbl name="lnNode1">
+    <dgm:fillClrLst meth="repeat">
+      <a:schemeClr val="accent1"/>
+    </dgm:fillClrLst>
+    <dgm:linClrLst meth="repeat">
+      <a:schemeClr val="lt1"/>
+    </dgm:linClrLst>
+    <dgm:effectClrLst/>
+    <dgm:txLinClrLst/>
+    <dgm:txFillClrLst/>
+    <dgm:txEffectClrLst/>
+  </dgm:styleLbl>
+  <dgm:styleLbl name="vennNode1">
+    <dgm:fillClrLst meth="repeat">
+      <a:schemeClr val="accent1">
+        <a:alpha val="50000"/>
+      </a:schemeClr>
+    </dgm:fillClrLst>
+    <dgm:linClrLst meth="repeat">
+      <a:schemeClr val="lt1"/>
+    </dgm:linClrLst>
+    <dgm:effectClrLst/>
+    <dgm:txLinClrLst/>
+    <dgm:txFillClrLst/>
+    <dgm:txEffectClrLst/>
+  </dgm:styleLbl>
+  <dgm:styleLbl name="node2">
+    <dgm:fillClrLst meth="repeat">
+      <a:schemeClr val="accent1"/>
+    </dgm:fillClrLst>
+    <dgm:linClrLst meth="repeat">
+      <a:schemeClr val="lt1"/>
+    </dgm:linClrLst>
+    <dgm:effectClrLst/>
+    <dgm:txLinClrLst/>
+    <dgm:txFillClrLst/>
+    <dgm:txEffectClrLst/>
+  </dgm:styleLbl>
+  <dgm:styleLbl name="node3">
+    <dgm:fillClrLst meth="repeat">
+      <a:schemeClr val="accent1"/>
+    </dgm:fillClrLst>
+    <dgm:linClrLst meth="repeat">
+      <a:schemeClr val="lt1"/>
+    </dgm:linClrLst>
+    <dgm:effectClrLst/>
+    <dgm:txLinClrLst/>
+    <dgm:txFillClrLst/>
+    <dgm:txEffectClrLst/>
+  </dgm:styleLbl>
+  <dgm:styleLbl name="node4">
+    <dgm:fillClrLst meth="repeat">
+      <a:schemeClr val="accent1"/>
+    </dgm:fillClrLst>
+    <dgm:linClrLst meth="repeat">
+      <a:schemeClr val="lt1"/>
+    </dgm:linClrLst>
+    <dgm:effectClrLst/>
+    <dgm:txLinClrLst/>
+    <dgm:txFillClrLst/>
+    <dgm:txEffectClrLst/>
+  </dgm:styleLbl>
+  <dgm:styleLbl name="fgImgPlace1">
+    <dgm:fillClrLst meth="repeat">
+      <a:schemeClr val="accent1">
+        <a:tint val="50000"/>
+      </a:schemeClr>
+    </dgm:fillClrLst>
+    <dgm:linClrLst meth="repeat">
+      <a:schemeClr val="lt1"/>
+    </dgm:linClrLst>
+    <dgm:effectClrLst/>
+    <dgm:txLinClrLst/>
+    <dgm:txFillClrLst meth="repeat">
+      <a:schemeClr val="lt1"/>
+    </dgm:txFillClrLst>
+    <dgm:txEffectClrLst/>
+  </dgm:styleLbl>
+  <dgm:styleLbl name="alignImgPlace1">
+    <dgm:fillClrLst meth="repeat">
+      <a:schemeClr val="accent1">
+        <a:tint val="50000"/>
+      </a:schemeClr>
+    </dgm:fillClrLst>
+    <dgm:linClrLst meth="repeat">
+      <a:schemeClr val="lt1"/>
+    </dgm:linClrLst>
+    <dgm:effectClrLst/>
+    <dgm:txLinClrLst/>
+    <dgm:txFillClrLst meth="repeat">
+      <a:schemeClr val="lt1"/>
+    </dgm:txFillClrLst>
+    <dgm:txEffectClrLst/>
+  </dgm:styleLbl>
+  <dgm:styleLbl name="bgImgPlace1">
+    <dgm:fillClrLst meth="repeat">
+      <a:schemeClr val="accent1">
+        <a:tint val="50000"/>
+      </a:schemeClr>
+    </dgm:fillClrLst>
+    <dgm:linClrLst meth="repeat">
+      <a:schemeClr val="lt1"/>
+    </dgm:linClrLst>
+    <dgm:effectClrLst/>
+    <dgm:txLinClrLst/>
+    <dgm:txFillClrLst meth="repeat">
+      <a:schemeClr val="lt1"/>
+    </dgm:txFillClrLst>
+    <dgm:txEffectClrLst/>
+  </dgm:styleLbl>
+  <dgm:styleLbl name="sibTrans2D1">
+    <dgm:fillClrLst meth="repeat">
+      <a:schemeClr val="accent1">
+        <a:tint val="60000"/>
+      </a:schemeClr>
+    </dgm:fillClrLst>
+    <dgm:linClrLst meth="repeat">
+      <a:schemeClr val="accent1">
+        <a:tint val="60000"/>
+      </a:schemeClr>
+    </dgm:linClrLst>
+    <dgm:effectClrLst/>
+    <dgm:txLinClrLst/>
+    <dgm:txFillClrLst/>
+    <dgm:txEffectClrLst/>
+  </dgm:styleLbl>
+  <dgm:styleLbl name="fgSibTrans2D1">
+    <dgm:fillClrLst meth="repeat">
+      <a:schemeClr val="accent1">
+        <a:tint val="60000"/>
+      </a:schemeClr>
+    </dgm:fillClrLst>
+    <dgm:linClrLst meth="repeat">
+      <a:schemeClr val="accent1">
+        <a:tint val="60000"/>
+      </a:schemeClr>
+    </dgm:linClrLst>
+    <dgm:effectClrLst/>
+    <dgm:txLinClrLst/>
+    <dgm:txFillClrLst/>
+    <dgm:txEffectClrLst/>
+  </dgm:styleLbl>
+  <dgm:styleLbl name="bgSibTrans2D1">
+    <dgm:fillClrLst meth="repeat">
+      <a:schemeClr val="accent1">
+        <a:tint val="60000"/>
+      </a:schemeClr>
+    </dgm:fillClrLst>
+    <dgm:linClrLst meth="repeat">
+      <a:schemeClr val="accent1">
+        <a:tint val="60000"/>
+      </a:schemeClr>
+    </dgm:linClrLst>
+    <dgm:effectClrLst/>
+    <dgm:txLinClrLst/>
+    <dgm:txFillClrLst/>
+    <dgm:txEffectClrLst/>
+  </dgm:styleLbl>
+  <dgm:styleLbl name="sibTrans1D1">
+    <dgm:fillClrLst meth="repeat">
+      <a:schemeClr val="accent1"/>
+    </dgm:fillClrLst>
+    <dgm:linClrLst meth="repeat">
+      <a:schemeClr val="accent1"/>
+    </dgm:linClrLst>
+    <dgm:effectClrLst/>
+    <dgm:txLinClrLst/>
+    <dgm:txFillClrLst meth="repeat">
+      <a:schemeClr val="tx1"/>
+    </dgm:txFillClrLst>
+    <dgm:txEffectClrLst/>
+  </dgm:styleLbl>
+  <dgm:styleLbl name="callout">
+    <dgm:fillClrLst meth="repeat">
+      <a:schemeClr val="accent1"/>
+    </dgm:fillClrLst>
+    <dgm:linClrLst meth="repeat">
+      <a:schemeClr val="accent1">
+        <a:tint val="50000"/>
+      </a:schemeClr>
+    </dgm:linClrLst>
+    <dgm:effectClrLst/>
+    <dgm:txLinClrLst/>
+    <dgm:txFillClrLst meth="repeat">
+      <a:schemeClr val="tx1"/>
+    </dgm:txFillClrLst>
+    <dgm:txEffectClrLst/>
+  </dgm:styleLbl>
+  <dgm:styleLbl name="asst0">
+    <dgm:fillClrLst meth="repeat">
+      <a:schemeClr val="accent1"/>
+    </dgm:fillClrLst>
+    <dgm:linClrLst meth="repeat">
+      <a:schemeClr val="lt1"/>
+    </dgm:linClrLst>
+    <dgm:effectClrLst/>
+    <dgm:txLinClrLst/>
+    <dgm:txFillClrLst/>
+    <dgm:txEffectClrLst/>
+  </dgm:styleLbl>
+  <dgm:styleLbl name="asst1">
+    <dgm:fillClrLst meth="repeat">
+      <a:schemeClr val="accent1"/>
+    </dgm:fillClrLst>
+    <dgm:linClrLst meth="repeat">
+      <a:schemeClr val="lt1"/>
+    </dgm:linClrLst>
+    <dgm:effectClrLst/>
+    <dgm:txLinClrLst/>
+    <dgm:txFillClrLst/>
+    <dgm:txEffectClrLst/>
+  </dgm:styleLbl>
+  <dgm:styleLbl name="asst2">
+    <dgm:fillClrLst meth="repeat">
+      <a:schemeClr val="accent1"/>
+    </dgm:fillClrLst>
+    <dgm:linClrLst meth="repeat">
+      <a:schemeClr val="lt1"/>
+    </dgm:linClrLst>
+    <dgm:effectClrLst/>
+    <dgm:txLinClrLst/>
+    <dgm:txFillClrLst/>
+    <dgm:txEffectClrLst/>
+  </dgm:styleLbl>
+  <dgm:styleLbl name="asst3">
+    <dgm:fillClrLst meth="repeat">
+      <a:schemeClr val="accent1"/>
+    </dgm:fillClrLst>
+    <dgm:linClrLst meth="repeat">
+      <a:schemeClr val="lt1"/>
+    </dgm:linClrLst>
+    <dgm:effectClrLst/>
+    <dgm:txLinClrLst/>
+    <dgm:txFillClrLst/>
+    <dgm:txEffectClrLst/>
+  </dgm:styleLbl>
+  <dgm:styleLbl name="asst4">
+    <dgm:fillClrLst meth="repeat">
+      <a:schemeClr val="accent1"/>
+    </dgm:fillClrLst>
+    <dgm:linClrLst meth="repeat">
+      <a:schemeClr val="lt1"/>
+    </dgm:linClrLst>
+    <dgm:effectClrLst/>
+    <dgm:txLinClrLst/>
+    <dgm:txFillClrLst/>
+    <dgm:txEffectClrLst/>
+  </dgm:styleLbl>
+  <dgm:styleLbl name="parChTrans2D1">
+    <dgm:fillClrLst meth="repeat">
+      <a:schemeClr val="accent1">
+        <a:tint val="60000"/>
+      </a:schemeClr>
+    </dgm:fillClrLst>
+    <dgm:linClrLst meth="repeat">
+      <a:schemeClr val="accent1">
+        <a:tint val="60000"/>
+      </a:schemeClr>
+    </dgm:linClrLst>
+    <dgm:effectClrLst/>
+    <dgm:txLinClrLst/>
+    <dgm:txFillClrLst meth="repeat">
+      <a:schemeClr val="lt1"/>
+    </dgm:txFillClrLst>
+    <dgm:txEffectClrLst/>
+  </dgm:styleLbl>
+  <dgm:styleLbl name="parChTrans2D2">
+    <dgm:fillClrLst meth="repeat">
+      <a:schemeClr val="accent1"/>
+    </dgm:fillClrLst>
+    <dgm:linClrLst meth="repeat">
+      <a:schemeClr val="accent1"/>
+    </dgm:linClrLst>
+    <dgm:effectClrLst/>
+    <dgm:txLinClrLst/>
+    <dgm:txFillClrLst meth="repeat">
+      <a:schemeClr val="lt1"/>
+    </dgm:txFillClrLst>
+    <dgm:txEffectClrLst/>
+  </dgm:styleLbl>
+  <dgm:styleLbl name="parChTrans2D3">
+    <dgm:fillClrLst meth="repeat">
+      <a:schemeClr val="accent1"/>
+    </dgm:fillClrLst>
+    <dgm:linClrLst meth="repeat">
+      <a:schemeClr val="accent1"/>
+    </dgm:linClrLst>
+    <dgm:effectClrLst/>
+    <dgm:txLinClrLst/>
+    <dgm:txFillClrLst meth="repeat">
+      <a:schemeClr val="lt1"/>
+    </dgm:txFillClrLst>
+    <dgm:txEffectClrLst/>
+  </dgm:styleLbl>
+  <dgm:styleLbl name="parChTrans2D4">
+    <dgm:fillClrLst meth="repeat">
+      <a:schemeClr val="accent1"/>
+    </dgm:fillClrLst>
+    <dgm:linClrLst meth="repeat">
+      <a:schemeClr val="accent1"/>
+    </dgm:linClrLst>
+    <dgm:effectClrLst/>
+    <dgm:txLinClrLst/>
+    <dgm:txFillClrLst meth="repeat">
+      <a:schemeClr val="lt1"/>
+    </dgm:txFillClrLst>
+    <dgm:txEffectClrLst/>
+  </dgm:styleLbl>
+  <dgm:styleLbl name="parChTrans1D1">
+    <dgm:fillClrLst meth="repeat">
+      <a:schemeClr val="accent1"/>
+    </dgm:fillClrLst>
+    <dgm:linClrLst meth="repeat">
+      <a:schemeClr val="accent1">
+        <a:shade val="60000"/>
+      </a:schemeClr>
+    </dgm:linClrLst>
+    <dgm:effectClrLst/>
+    <dgm:txLinClrLst/>
+    <dgm:txFillClrLst meth="repeat">
+      <a:schemeClr val="tx1"/>
+    </dgm:txFillClrLst>
+    <dgm:txEffectClrLst/>
+  </dgm:styleLbl>
+  <dgm:styleLbl name="parChTrans1D2">
+    <dgm:fillClrLst meth="repeat">
+      <a:schemeClr val="accent1"/>
+    </dgm:fillClrLst>
+    <dgm:linClrLst meth="repeat">
+      <a:schemeClr val="accent1">
+        <a:shade val="60000"/>
+      </a:schemeClr>
+    </dgm:linClrLst>
+    <dgm:effectClrLst/>
+    <dgm:txLinClrLst/>
+    <dgm:txFillClrLst meth="repeat">
+      <a:schemeClr val="tx1"/>
+    </dgm:txFillClrLst>
+    <dgm:txEffectClrLst/>
+  </dgm:styleLbl>
+  <dgm:styleLbl name="parChTrans1D3">
+    <dgm:fillClrLst meth="repeat">
+      <a:schemeClr val="accent1"/>
+    </dgm:fillClrLst>
+    <dgm:linClrLst meth="repeat">
+      <a:schemeClr val="accent1">
+        <a:shade val="80000"/>
+      </a:schemeClr>
+    </dgm:linClrLst>
+    <dgm:effectClrLst/>
+    <dgm:txLinClrLst/>
+    <dgm:txFillClrLst meth="repeat">
+      <a:schemeClr val="tx1"/>
+    </dgm:txFillClrLst>
+    <dgm:txEffectClrLst/>
+  </dgm:styleLbl>
+  <dgm:styleLbl name="parChTrans1D4">
+    <dgm:fillClrLst meth="repeat">
+      <a:schemeClr val="accent1"/>
+    </dgm:fillClrLst>
+    <dgm:linClrLst meth="repeat">
+      <a:schemeClr val="accent1">
+        <a:shade val="80000"/>
+      </a:schemeClr>
+    </dgm:linClrLst>
+    <dgm:effectClrLst/>
+    <dgm:txLinClrLst/>
+    <dgm:txFillClrLst meth="repeat">
+      <a:schemeClr val="tx1"/>
+    </dgm:txFillClrLst>
+    <dgm:txEffectClrLst/>
+  </dgm:styleLbl>
+  <dgm:styleLbl name="fgAcc1">
+    <dgm:fillClrLst meth="repeat">
+      <a:schemeClr val="lt1">
+        <a:alpha val="90000"/>
+      </a:schemeClr>
+    </dgm:fillClrLst>
+    <dgm:linClrLst meth="repeat">
+      <a:schemeClr val="accent1"/>
+    </dgm:linClrLst>
+    <dgm:effectClrLst/>
+    <dgm:txLinClrLst/>
+    <dgm:txFillClrLst meth="repeat">
+      <a:schemeClr val="dk1"/>
+    </dgm:txFillClrLst>
+    <dgm:txEffectClrLst/>
+  </dgm:styleLbl>
+  <dgm:styleLbl name="conFgAcc1">
+    <dgm:fillClrLst meth="repeat">
+      <a:schemeClr val="lt1">
+        <a:alpha val="90000"/>
+      </a:schemeClr>
+    </dgm:fillClrLst>
+    <dgm:linClrLst meth="repeat">
+      <a:schemeClr val="accent1"/>
+    </dgm:linClrLst>
+    <dgm:effectClrLst/>
+    <dgm:txLinClrLst/>
+    <dgm:txFillClrLst meth="repeat">
+      <a:schemeClr val="dk1"/>
+    </dgm:txFillClrLst>
+    <dgm:txEffectClrLst/>
+  </dgm:styleLbl>
+  <dgm:styleLbl name="alignAcc1">
+    <dgm:fillClrLst meth="repeat">
+      <a:schemeClr val="lt1">
+        <a:alpha val="90000"/>
+      </a:schemeClr>
+    </dgm:fillClrLst>
+    <dgm:linClrLst meth="repeat">
+      <a:schemeClr val="accent1"/>
+    </dgm:linClrLst>
+    <dgm:effectClrLst/>
+    <dgm:txLinClrLst/>
+    <dgm:txFillClrLst meth="repeat">
+      <a:schemeClr val="dk1"/>
+    </dgm:txFillClrLst>
+    <dgm:txEffectClrLst/>
+  </dgm:styleLbl>
+  <dgm:styleLbl name="trAlignAcc1">
+    <dgm:fillClrLst meth="repeat">
+      <a:schemeClr val="lt1">
+        <a:alpha val="40000"/>
+      </a:schemeClr>
+    </dgm:fillClrLst>
+    <dgm:linClrLst meth="repeat">
+      <a:schemeClr val="accent1"/>
+    </dgm:linClrLst>
+    <dgm:effectClrLst/>
+    <dgm:txLinClrLst/>
+    <dgm:txFillClrLst meth="repeat">
+      <a:schemeClr val="dk1"/>
+    </dgm:txFillClrLst>
+    <dgm:txEffectClrLst/>
+  </dgm:styleLbl>
+  <dgm:styleLbl name="bgAcc1">
+    <dgm:fillClrLst meth="repeat">
+      <a:schemeClr val="lt1">
+        <a:alpha val="90000"/>
+      </a:schemeClr>
+    </dgm:fillClrLst>
+    <dgm:linClrLst meth="repeat">
+      <a:schemeClr val="accent1"/>
+    </dgm:linClrLst>
+    <dgm:effectClrLst/>
+    <dgm:txLinClrLst/>
+    <dgm:txFillClrLst meth="repeat">
+      <a:schemeClr val="dk1"/>
+    </dgm:txFillClrLst>
+    <dgm:txEffectClrLst/>
+  </dgm:styleLbl>
+  <dgm:styleLbl name="solidFgAcc1">
+    <dgm:fillClrLst meth="repeat">
+      <a:schemeClr val="lt1"/>
+    </dgm:fillClrLst>
+    <dgm:linClrLst meth="repeat">
+      <a:schemeClr val="accent1"/>
+    </dgm:linClrLst>
+    <dgm:effectClrLst/>
+    <dgm:txLinClrLst/>
+    <dgm:txFillClrLst meth="repeat">
+      <a:schemeClr val="dk1"/>
+    </dgm:txFillClrLst>
+    <dgm:txEffectClrLst/>
+  </dgm:styleLbl>
+  <dgm:styleLbl name="solidAlignAcc1">
+    <dgm:fillClrLst meth="repeat">
+      <a:schemeClr val="lt1"/>
+    </dgm:fillClrLst>
+    <dgm:linClrLst meth="repeat">
+      <a:schemeClr val="accent1"/>
+    </dgm:linClrLst>
+    <dgm:effectClrLst/>
+    <dgm:txLinClrLst/>
+    <dgm:txFillClrLst meth="repeat">
+      <a:schemeClr val="dk1"/>
+    </dgm:txFillClrLst>
+    <dgm:txEffectClrLst/>
+  </dgm:styleLbl>
+  <dgm:styleLbl name="solidBgAcc1">
+    <dgm:fillClrLst meth="repeat">
+      <a:schemeClr val="lt1"/>
+    </dgm:fillClrLst>
+    <dgm:linClrLst meth="repeat">
+      <a:schemeClr val="accent1"/>
+    </dgm:linClrLst>
+    <dgm:effectClrLst/>
+    <dgm:txLinClrLst/>
+    <dgm:txFillClrLst meth="repeat">
+      <a:schemeClr val="dk1"/>
+    </dgm:txFillClrLst>
+    <dgm:txEffectClrLst/>
+  </dgm:styleLbl>
+  <dgm:styleLbl name="fgAccFollowNode1">
+    <dgm:fillClrLst meth="repeat">
+      <a:schemeClr val="accent1">
+        <a:alpha val="90000"/>
+        <a:tint val="40000"/>
+      </a:schemeClr>
+    </dgm:fillClrLst>
+    <dgm:linClrLst meth="repeat">
+      <a:schemeClr val="accent1">
+        <a:alpha val="90000"/>
+        <a:tint val="40000"/>
+      </a:schemeClr>
+    </dgm:linClrLst>
+    <dgm:effectClrLst/>
+    <dgm:txLinClrLst/>
+    <dgm:txFillClrLst meth="repeat">
+      <a:schemeClr val="dk1"/>
+    </dgm:txFillClrLst>
+    <dgm:txEffectClrLst/>
+  </dgm:styleLbl>
+  <dgm:styleLbl name="alignAccFollowNode1">
+    <dgm:fillClrLst meth="repeat">
+      <a:schemeClr val="accent1">
+        <a:alpha val="90000"/>
+        <a:tint val="40000"/>
+      </a:schemeClr>
+    </dgm:fillClrLst>
+    <dgm:linClrLst meth="repeat">
+      <a:schemeClr val="accent1">
+        <a:alpha val="90000"/>
+        <a:tint val="40000"/>
+      </a:schemeClr>
+    </dgm:linClrLst>
+    <dgm:effectClrLst/>
+    <dgm:txLinClrLst/>
+    <dgm:txFillClrLst meth="repeat">
+      <a:schemeClr val="dk1"/>
+    </dgm:txFillClrLst>
+    <dgm:txEffectClrLst/>
+  </dgm:styleLbl>
+  <dgm:styleLbl name="bgAccFollowNode1">
+    <dgm:fillClrLst meth="repeat">
+      <a:schemeClr val="accent1">
+        <a:alpha val="90000"/>
+        <a:tint val="40000"/>
+      </a:schemeClr>
+    </dgm:fillClrLst>
+    <dgm:linClrLst meth="repeat">
+      <a:schemeClr val="accent1">
+        <a:alpha val="90000"/>
+        <a:tint val="40000"/>
+      </a:schemeClr>
+    </dgm:linClrLst>
+    <dgm:effectClrLst/>
+    <dgm:txLinClrLst/>
+    <dgm:txFillClrLst meth="repeat">
+      <a:schemeClr val="dk1"/>
+    </dgm:txFillClrLst>
+    <dgm:txEffectClrLst/>
+  </dgm:styleLbl>
+  <dgm:styleLbl name="fgAcc0">
+    <dgm:fillClrLst meth="repeat">
+      <a:schemeClr val="lt1">
+        <a:alpha val="90000"/>
+      </a:schemeClr>
+    </dgm:fillClrLst>
+    <dgm:linClrLst meth="repeat">
+      <a:schemeClr val="accent1"/>
+    </dgm:linClrLst>
+    <dgm:effectClrLst/>
+    <dgm:txLinClrLst/>
+    <dgm:txFillClrLst meth="repeat">
+      <a:schemeClr val="dk1"/>
+    </dgm:txFillClrLst>
+    <dgm:txEffectClrLst/>
+  </dgm:styleLbl>
+  <dgm:styleLbl name="fgAcc2">
+    <dgm:fillClrLst meth="repeat">
+      <a:schemeClr val="lt1">
+        <a:alpha val="90000"/>
+      </a:schemeClr>
+    </dgm:fillClrLst>
+    <dgm:linClrLst meth="repeat">
+      <a:schemeClr val="accent1"/>
+    </dgm:linClrLst>
+    <dgm:effectClrLst/>
+    <dgm:txLinClrLst/>
+    <dgm:txFillClrLst meth="repeat">
+      <a:schemeClr val="dk1"/>
+    </dgm:txFillClrLst>
+    <dgm:txEffectClrLst/>
+  </dgm:styleLbl>
+  <dgm:styleLbl name="fgAcc3">
+    <dgm:fillClrLst meth="repeat">
+      <a:schemeClr val="lt1">
+        <a:alpha val="90000"/>
+      </a:schemeClr>
+    </dgm:fillClrLst>
+    <dgm:linClrLst meth="repeat">
+      <a:schemeClr val="accent1"/>
+    </dgm:linClrLst>
+    <dgm:effectClrLst/>
+    <dgm:txLinClrLst/>
+    <dgm:txFillClrLst meth="repeat">
+      <a:schemeClr val="dk1"/>
+    </dgm:txFillClrLst>
+    <dgm:txEffectClrLst/>
+  </dgm:styleLbl>
+  <dgm:styleLbl name="fgAcc4">
+    <dgm:fillClrLst meth="repeat">
+      <a:schemeClr val="lt1">
+        <a:alpha val="90000"/>
+      </a:schemeClr>
+    </dgm:fillClrLst>
+    <dgm:linClrLst meth="repeat">
+      <a:schemeClr val="accent1"/>
+    </dgm:linClrLst>
+    <dgm:effectClrLst/>
+    <dgm:txLinClrLst/>
+    <dgm:txFillClrLst meth="repeat">
+      <a:schemeClr val="dk1"/>
+    </dgm:txFillClrLst>
+    <dgm:txEffectClrLst/>
+  </dgm:styleLbl>
+  <dgm:styleLbl name="bgShp">
+    <dgm:fillClrLst meth="repeat">
+      <a:schemeClr val="accent1">
+        <a:tint val="40000"/>
+      </a:schemeClr>
+    </dgm:fillClrLst>
+    <dgm:linClrLst meth="repeat">
+      <a:schemeClr val="accent1"/>
+    </dgm:linClrLst>
+    <dgm:effectClrLst/>
+    <dgm:txLinClrLst/>
+    <dgm:txFillClrLst meth="repeat">
+      <a:schemeClr val="dk1"/>
+    </dgm:txFillClrLst>
+    <dgm:txEffectClrLst/>
+  </dgm:styleLbl>
+  <dgm:styleLbl name="dkBgShp">
+    <dgm:fillClrLst meth="repeat">
+      <a:schemeClr val="accent1">
+        <a:shade val="80000"/>
+      </a:schemeClr>
+    </dgm:fillClrLst>
+    <dgm:linClrLst meth="repeat">
+      <a:schemeClr val="accent1"/>
+    </dgm:linClrLst>
+    <dgm:effectClrLst/>
+    <dgm:txLinClrLst/>
+    <dgm:txFillClrLst meth="repeat">
+      <a:schemeClr val="lt1"/>
+    </dgm:txFillClrLst>
+    <dgm:txEffectClrLst/>
+  </dgm:styleLbl>
+  <dgm:styleLbl name="trBgShp">
+    <dgm:fillClrLst meth="repeat">
+      <a:schemeClr val="accent1">
+        <a:tint val="50000"/>
+        <a:alpha val="40000"/>
+      </a:schemeClr>
+    </dgm:fillClrLst>
+    <dgm:linClrLst meth="repeat">
+      <a:schemeClr val="accent1"/>
+    </dgm:linClrLst>
+    <dgm:effectClrLst/>
+    <dgm:txLinClrLst/>
+    <dgm:txFillClrLst meth="repeat">
+      <a:schemeClr val="lt1"/>
+    </dgm:txFillClrLst>
+    <dgm:txEffectClrLst/>
+  </dgm:styleLbl>
+  <dgm:styleLbl name="fgShp">
+    <dgm:fillClrLst meth="repeat">
+      <a:schemeClr val="accent1">
+        <a:tint val="60000"/>
+      </a:schemeClr>
+    </dgm:fillClrLst>
+    <dgm:linClrLst meth="repeat">
+      <a:schemeClr val="lt1"/>
+    </dgm:linClrLst>
+    <dgm:effectClrLst/>
+    <dgm:txLinClrLst/>
+    <dgm:txFillClrLst meth="repeat">
+      <a:schemeClr val="dk1"/>
+    </dgm:txFillClrLst>
+    <dgm:txEffectClrLst/>
+  </dgm:styleLbl>
+  <dgm:styleLbl name="revTx">
+    <dgm:fillClrLst meth="repeat">
+      <a:schemeClr val="lt1">
+        <a:alpha val="0"/>
+      </a:schemeClr>
+    </dgm:fillClrLst>
+    <dgm:linClrLst meth="repeat">
+      <a:schemeClr val="dk1">
+        <a:alpha val="0"/>
+      </a:schemeClr>
+    </dgm:linClrLst>
+    <dgm:effectClrLst/>
+    <dgm:txLinClrLst/>
+    <dgm:txFillClrLst meth="repeat">
+      <a:schemeClr val="tx1"/>
+    </dgm:txFillClrLst>
+    <dgm:txEffectClrLst/>
+  </dgm:styleLbl>
+</dgm:colorsDef>
+</file>
+
+<file path=ppt/diagrams/data1.xml><?xml version="1.0" encoding="utf-8"?>
+<dgm:dataModel xmlns:dgm="http://schemas.openxmlformats.org/drawingml/2006/diagram" xmlns:a="http://schemas.openxmlformats.org/drawingml/2006/main">
+  <dgm:ptLst>
+    <dgm:pt modelId="{3321BD3E-EB4C-48E8-819C-88703AE58EAA}" type="doc">
+      <dgm:prSet loTypeId="urn:microsoft.com/office/officeart/2005/8/layout/vProcess5" loCatId="process" qsTypeId="urn:microsoft.com/office/officeart/2005/8/quickstyle/simple1" qsCatId="simple" csTypeId="urn:microsoft.com/office/officeart/2005/8/colors/accent1_2" csCatId="accent1" phldr="1"/>
+      <dgm:spPr/>
+      <dgm:t>
+        <a:bodyPr/>
+        <a:lstStyle/>
+        <a:p>
+          <a:endParaRPr lang="de-DE"/>
+        </a:p>
+      </dgm:t>
+    </dgm:pt>
+    <dgm:pt modelId="{02BC7B6D-BD00-4CBE-95A3-1C44BA1ED3DC}">
+      <dgm:prSet phldrT="[Text]"/>
+      <dgm:spPr/>
+      <dgm:t>
+        <a:bodyPr/>
+        <a:lstStyle/>
+        <a:p>
+          <a:r>
+            <a:rPr lang="de-DE" dirty="0" smtClean="0"/>
+            <a:t>Wahlberechtigter gibt Personalausweisnummer und vollständigen Namen an</a:t>
+          </a:r>
+          <a:endParaRPr lang="de-DE" dirty="0"/>
+        </a:p>
+      </dgm:t>
+    </dgm:pt>
+    <dgm:pt modelId="{96CAAF42-4EA4-4F79-BFC6-EB01B6345389}" type="parTrans" cxnId="{D94A5877-919E-4C77-96FA-2574B6C8A5C8}">
+      <dgm:prSet/>
+      <dgm:spPr/>
+      <dgm:t>
+        <a:bodyPr/>
+        <a:lstStyle/>
+        <a:p>
+          <a:endParaRPr lang="de-DE"/>
+        </a:p>
+      </dgm:t>
+    </dgm:pt>
+    <dgm:pt modelId="{093B2DF1-D9DE-42E2-8907-A6AA23AC348E}" type="sibTrans" cxnId="{D94A5877-919E-4C77-96FA-2574B6C8A5C8}">
+      <dgm:prSet/>
+      <dgm:spPr/>
+      <dgm:t>
+        <a:bodyPr/>
+        <a:lstStyle/>
+        <a:p>
+          <a:endParaRPr lang="de-DE"/>
+        </a:p>
+      </dgm:t>
+    </dgm:pt>
+    <dgm:pt modelId="{13E42E31-33C6-4463-916C-983FD50F4960}">
+      <dgm:prSet phldrT="[Text]"/>
+      <dgm:spPr/>
+      <dgm:t>
+        <a:bodyPr/>
+        <a:lstStyle/>
+        <a:p>
+          <a:r>
+            <a:rPr lang="de-DE" dirty="0" smtClean="0"/>
+            <a:t>Wahlberechtigter füllt Stimmzettel aus</a:t>
+          </a:r>
+          <a:endParaRPr lang="de-DE" dirty="0"/>
+        </a:p>
+      </dgm:t>
+    </dgm:pt>
+    <dgm:pt modelId="{E9E16E65-0998-424C-86CF-1AE65CA09E25}" type="parTrans" cxnId="{2B83810B-2552-45DD-8898-9C945D4C3FB3}">
+      <dgm:prSet/>
+      <dgm:spPr/>
+      <dgm:t>
+        <a:bodyPr/>
+        <a:lstStyle/>
+        <a:p>
+          <a:endParaRPr lang="de-DE"/>
+        </a:p>
+      </dgm:t>
+    </dgm:pt>
+    <dgm:pt modelId="{12AC41A8-1839-4FEC-BC88-6BAC6EC591EB}" type="sibTrans" cxnId="{2B83810B-2552-45DD-8898-9C945D4C3FB3}">
+      <dgm:prSet/>
+      <dgm:spPr/>
+      <dgm:t>
+        <a:bodyPr/>
+        <a:lstStyle/>
+        <a:p>
+          <a:endParaRPr lang="de-DE"/>
+        </a:p>
+      </dgm:t>
+    </dgm:pt>
+    <dgm:pt modelId="{A752C814-59E5-4925-9FFC-BED3B3E1B583}">
+      <dgm:prSet phldrT="[Text]"/>
+      <dgm:spPr/>
+      <dgm:t>
+        <a:bodyPr/>
+        <a:lstStyle/>
+        <a:p>
+          <a:r>
+            <a:rPr lang="de-DE" dirty="0" smtClean="0"/>
+            <a:t>Wahlberechtigter wird als „gewählt“ markiert</a:t>
+          </a:r>
+          <a:endParaRPr lang="de-DE" dirty="0"/>
+        </a:p>
+      </dgm:t>
+    </dgm:pt>
+    <dgm:pt modelId="{F4575A42-5603-4C84-8141-8D9237AA81F3}" type="parTrans" cxnId="{A36E5A13-7739-407A-A294-DC94042F46F7}">
+      <dgm:prSet/>
+      <dgm:spPr/>
+      <dgm:t>
+        <a:bodyPr/>
+        <a:lstStyle/>
+        <a:p>
+          <a:endParaRPr lang="de-DE"/>
+        </a:p>
+      </dgm:t>
+    </dgm:pt>
+    <dgm:pt modelId="{27A3CA78-31CC-49A4-9912-0121EF27A870}" type="sibTrans" cxnId="{A36E5A13-7739-407A-A294-DC94042F46F7}">
+      <dgm:prSet/>
+      <dgm:spPr/>
+      <dgm:t>
+        <a:bodyPr/>
+        <a:lstStyle/>
+        <a:p>
+          <a:endParaRPr lang="de-DE"/>
+        </a:p>
+      </dgm:t>
+    </dgm:pt>
+    <dgm:pt modelId="{6DB22C6B-E2A0-4F4D-9990-6E66EE551E35}">
+      <dgm:prSet phldrT="[Text]"/>
+      <dgm:spPr/>
+      <dgm:t>
+        <a:bodyPr/>
+        <a:lstStyle/>
+        <a:p>
+          <a:r>
+            <a:rPr lang="de-DE" dirty="0" smtClean="0"/>
+            <a:t>Stimmen werden eingetragen</a:t>
+          </a:r>
+          <a:endParaRPr lang="de-DE" dirty="0"/>
+        </a:p>
+      </dgm:t>
+    </dgm:pt>
+    <dgm:pt modelId="{1D948748-69EB-4B90-8D17-A61D4A9E37C6}" type="parTrans" cxnId="{70066237-7CF0-41CC-8772-BAF4DBA8CC80}">
+      <dgm:prSet/>
+      <dgm:spPr/>
+      <dgm:t>
+        <a:bodyPr/>
+        <a:lstStyle/>
+        <a:p>
+          <a:endParaRPr lang="de-DE"/>
+        </a:p>
+      </dgm:t>
+    </dgm:pt>
+    <dgm:pt modelId="{CD6BE724-8555-4226-B73A-CF7FBE332CB4}" type="sibTrans" cxnId="{70066237-7CF0-41CC-8772-BAF4DBA8CC80}">
+      <dgm:prSet/>
+      <dgm:spPr/>
+      <dgm:t>
+        <a:bodyPr/>
+        <a:lstStyle/>
+        <a:p>
+          <a:endParaRPr lang="de-DE"/>
+        </a:p>
+      </dgm:t>
+    </dgm:pt>
+    <dgm:pt modelId="{8907C69F-04F6-4209-B3E4-3B881B027644}" type="pres">
+      <dgm:prSet presAssocID="{3321BD3E-EB4C-48E8-819C-88703AE58EAA}" presName="outerComposite" presStyleCnt="0">
+        <dgm:presLayoutVars>
+          <dgm:chMax val="5"/>
+          <dgm:dir/>
+          <dgm:resizeHandles val="exact"/>
+        </dgm:presLayoutVars>
+      </dgm:prSet>
+      <dgm:spPr/>
+      <dgm:t>
+        <a:bodyPr/>
+        <a:lstStyle/>
+        <a:p>
+          <a:endParaRPr lang="de-DE"/>
+        </a:p>
+      </dgm:t>
+    </dgm:pt>
+    <dgm:pt modelId="{326A7C5D-0E37-445F-9A35-C90790A9CC5C}" type="pres">
+      <dgm:prSet presAssocID="{3321BD3E-EB4C-48E8-819C-88703AE58EAA}" presName="dummyMaxCanvas" presStyleCnt="0">
+        <dgm:presLayoutVars/>
+      </dgm:prSet>
+      <dgm:spPr/>
+    </dgm:pt>
+    <dgm:pt modelId="{7B0E7293-5F82-41DC-B952-203CCB2A0A33}" type="pres">
+      <dgm:prSet presAssocID="{3321BD3E-EB4C-48E8-819C-88703AE58EAA}" presName="FourNodes_1" presStyleLbl="node1" presStyleIdx="0" presStyleCnt="4">
+        <dgm:presLayoutVars>
+          <dgm:bulletEnabled val="1"/>
+        </dgm:presLayoutVars>
+      </dgm:prSet>
+      <dgm:spPr/>
+      <dgm:t>
+        <a:bodyPr/>
+        <a:lstStyle/>
+        <a:p>
+          <a:endParaRPr lang="de-DE"/>
+        </a:p>
+      </dgm:t>
+    </dgm:pt>
+    <dgm:pt modelId="{06212AD8-DAFF-4347-9DD1-673E2FD1B148}" type="pres">
+      <dgm:prSet presAssocID="{3321BD3E-EB4C-48E8-819C-88703AE58EAA}" presName="FourNodes_2" presStyleLbl="node1" presStyleIdx="1" presStyleCnt="4">
+        <dgm:presLayoutVars>
+          <dgm:bulletEnabled val="1"/>
+        </dgm:presLayoutVars>
+      </dgm:prSet>
+      <dgm:spPr/>
+      <dgm:t>
+        <a:bodyPr/>
+        <a:lstStyle/>
+        <a:p>
+          <a:endParaRPr lang="de-DE"/>
+        </a:p>
+      </dgm:t>
+    </dgm:pt>
+    <dgm:pt modelId="{99415EA1-B174-4409-AA75-59BFC48F23C5}" type="pres">
+      <dgm:prSet presAssocID="{3321BD3E-EB4C-48E8-819C-88703AE58EAA}" presName="FourNodes_3" presStyleLbl="node1" presStyleIdx="2" presStyleCnt="4">
+        <dgm:presLayoutVars>
+          <dgm:bulletEnabled val="1"/>
+        </dgm:presLayoutVars>
+      </dgm:prSet>
+      <dgm:spPr/>
+      <dgm:t>
+        <a:bodyPr/>
+        <a:lstStyle/>
+        <a:p>
+          <a:endParaRPr lang="de-DE"/>
+        </a:p>
+      </dgm:t>
+    </dgm:pt>
+    <dgm:pt modelId="{B9F37ACD-B89C-480C-9F06-94F0A3DE1B04}" type="pres">
+      <dgm:prSet presAssocID="{3321BD3E-EB4C-48E8-819C-88703AE58EAA}" presName="FourNodes_4" presStyleLbl="node1" presStyleIdx="3" presStyleCnt="4">
+        <dgm:presLayoutVars>
+          <dgm:bulletEnabled val="1"/>
+        </dgm:presLayoutVars>
+      </dgm:prSet>
+      <dgm:spPr/>
+      <dgm:t>
+        <a:bodyPr/>
+        <a:lstStyle/>
+        <a:p>
+          <a:endParaRPr lang="de-DE"/>
+        </a:p>
+      </dgm:t>
+    </dgm:pt>
+    <dgm:pt modelId="{671A635C-EAD7-4CC5-9471-2C281B7E900E}" type="pres">
+      <dgm:prSet presAssocID="{3321BD3E-EB4C-48E8-819C-88703AE58EAA}" presName="FourConn_1-2" presStyleLbl="fgAccFollowNode1" presStyleIdx="0" presStyleCnt="3">
+        <dgm:presLayoutVars>
+          <dgm:bulletEnabled val="1"/>
+        </dgm:presLayoutVars>
+      </dgm:prSet>
+      <dgm:spPr/>
+      <dgm:t>
+        <a:bodyPr/>
+        <a:lstStyle/>
+        <a:p>
+          <a:endParaRPr lang="de-DE"/>
+        </a:p>
+      </dgm:t>
+    </dgm:pt>
+    <dgm:pt modelId="{1000797B-02B4-485D-B8A9-5C62BAA02EF0}" type="pres">
+      <dgm:prSet presAssocID="{3321BD3E-EB4C-48E8-819C-88703AE58EAA}" presName="FourConn_2-3" presStyleLbl="fgAccFollowNode1" presStyleIdx="1" presStyleCnt="3">
+        <dgm:presLayoutVars>
+          <dgm:bulletEnabled val="1"/>
+        </dgm:presLayoutVars>
+      </dgm:prSet>
+      <dgm:spPr/>
+      <dgm:t>
+        <a:bodyPr/>
+        <a:lstStyle/>
+        <a:p>
+          <a:endParaRPr lang="de-DE"/>
+        </a:p>
+      </dgm:t>
+    </dgm:pt>
+    <dgm:pt modelId="{55C3F406-B924-41F6-B9CD-179A257627F7}" type="pres">
+      <dgm:prSet presAssocID="{3321BD3E-EB4C-48E8-819C-88703AE58EAA}" presName="FourConn_3-4" presStyleLbl="fgAccFollowNode1" presStyleIdx="2" presStyleCnt="3">
+        <dgm:presLayoutVars>
+          <dgm:bulletEnabled val="1"/>
+        </dgm:presLayoutVars>
+      </dgm:prSet>
+      <dgm:spPr/>
+      <dgm:t>
+        <a:bodyPr/>
+        <a:lstStyle/>
+        <a:p>
+          <a:endParaRPr lang="de-DE"/>
+        </a:p>
+      </dgm:t>
+    </dgm:pt>
+    <dgm:pt modelId="{2F2B2C98-C0B1-4F7A-8F98-DFC1C6B4C57E}" type="pres">
+      <dgm:prSet presAssocID="{3321BD3E-EB4C-48E8-819C-88703AE58EAA}" presName="FourNodes_1_text" presStyleLbl="node1" presStyleIdx="3" presStyleCnt="4">
+        <dgm:presLayoutVars>
+          <dgm:bulletEnabled val="1"/>
+        </dgm:presLayoutVars>
+      </dgm:prSet>
+      <dgm:spPr/>
+      <dgm:t>
+        <a:bodyPr/>
+        <a:lstStyle/>
+        <a:p>
+          <a:endParaRPr lang="de-DE"/>
+        </a:p>
+      </dgm:t>
+    </dgm:pt>
+    <dgm:pt modelId="{A4550223-FF7A-4844-8660-4EF8CC41246A}" type="pres">
+      <dgm:prSet presAssocID="{3321BD3E-EB4C-48E8-819C-88703AE58EAA}" presName="FourNodes_2_text" presStyleLbl="node1" presStyleIdx="3" presStyleCnt="4">
+        <dgm:presLayoutVars>
+          <dgm:bulletEnabled val="1"/>
+        </dgm:presLayoutVars>
+      </dgm:prSet>
+      <dgm:spPr/>
+      <dgm:t>
+        <a:bodyPr/>
+        <a:lstStyle/>
+        <a:p>
+          <a:endParaRPr lang="de-DE"/>
+        </a:p>
+      </dgm:t>
+    </dgm:pt>
+    <dgm:pt modelId="{02A0BFD9-3FE3-43FF-827D-2DBCC7A23CCE}" type="pres">
+      <dgm:prSet presAssocID="{3321BD3E-EB4C-48E8-819C-88703AE58EAA}" presName="FourNodes_3_text" presStyleLbl="node1" presStyleIdx="3" presStyleCnt="4">
+        <dgm:presLayoutVars>
+          <dgm:bulletEnabled val="1"/>
+        </dgm:presLayoutVars>
+      </dgm:prSet>
+      <dgm:spPr/>
+      <dgm:t>
+        <a:bodyPr/>
+        <a:lstStyle/>
+        <a:p>
+          <a:endParaRPr lang="de-DE"/>
+        </a:p>
+      </dgm:t>
+    </dgm:pt>
+    <dgm:pt modelId="{85960212-6CF2-42E7-8598-5E45069FC85E}" type="pres">
+      <dgm:prSet presAssocID="{3321BD3E-EB4C-48E8-819C-88703AE58EAA}" presName="FourNodes_4_text" presStyleLbl="node1" presStyleIdx="3" presStyleCnt="4">
+        <dgm:presLayoutVars>
+          <dgm:bulletEnabled val="1"/>
+        </dgm:presLayoutVars>
+      </dgm:prSet>
+      <dgm:spPr/>
+      <dgm:t>
+        <a:bodyPr/>
+        <a:lstStyle/>
+        <a:p>
+          <a:endParaRPr lang="de-DE"/>
+        </a:p>
+      </dgm:t>
+    </dgm:pt>
+  </dgm:ptLst>
+  <dgm:cxnLst>
+    <dgm:cxn modelId="{2B83810B-2552-45DD-8898-9C945D4C3FB3}" srcId="{3321BD3E-EB4C-48E8-819C-88703AE58EAA}" destId="{13E42E31-33C6-4463-916C-983FD50F4960}" srcOrd="1" destOrd="0" parTransId="{E9E16E65-0998-424C-86CF-1AE65CA09E25}" sibTransId="{12AC41A8-1839-4FEC-BC88-6BAC6EC591EB}"/>
+    <dgm:cxn modelId="{F7749F78-167E-45E8-80B0-522FA82E504B}" type="presOf" srcId="{6DB22C6B-E2A0-4F4D-9990-6E66EE551E35}" destId="{85960212-6CF2-42E7-8598-5E45069FC85E}" srcOrd="1" destOrd="0" presId="urn:microsoft.com/office/officeart/2005/8/layout/vProcess5"/>
+    <dgm:cxn modelId="{02C11D1E-A56A-405E-8751-3C1929020A5A}" type="presOf" srcId="{093B2DF1-D9DE-42E2-8907-A6AA23AC348E}" destId="{671A635C-EAD7-4CC5-9471-2C281B7E900E}" srcOrd="0" destOrd="0" presId="urn:microsoft.com/office/officeart/2005/8/layout/vProcess5"/>
+    <dgm:cxn modelId="{A36E5A13-7739-407A-A294-DC94042F46F7}" srcId="{3321BD3E-EB4C-48E8-819C-88703AE58EAA}" destId="{A752C814-59E5-4925-9FFC-BED3B3E1B583}" srcOrd="2" destOrd="0" parTransId="{F4575A42-5603-4C84-8141-8D9237AA81F3}" sibTransId="{27A3CA78-31CC-49A4-9912-0121EF27A870}"/>
+    <dgm:cxn modelId="{AAB45091-C4D1-4B7F-81FB-C4A37B47652D}" type="presOf" srcId="{3321BD3E-EB4C-48E8-819C-88703AE58EAA}" destId="{8907C69F-04F6-4209-B3E4-3B881B027644}" srcOrd="0" destOrd="0" presId="urn:microsoft.com/office/officeart/2005/8/layout/vProcess5"/>
+    <dgm:cxn modelId="{D94A5877-919E-4C77-96FA-2574B6C8A5C8}" srcId="{3321BD3E-EB4C-48E8-819C-88703AE58EAA}" destId="{02BC7B6D-BD00-4CBE-95A3-1C44BA1ED3DC}" srcOrd="0" destOrd="0" parTransId="{96CAAF42-4EA4-4F79-BFC6-EB01B6345389}" sibTransId="{093B2DF1-D9DE-42E2-8907-A6AA23AC348E}"/>
+    <dgm:cxn modelId="{D1854D21-7582-4E33-A3EF-E00FBA28DBE0}" type="presOf" srcId="{13E42E31-33C6-4463-916C-983FD50F4960}" destId="{06212AD8-DAFF-4347-9DD1-673E2FD1B148}" srcOrd="0" destOrd="0" presId="urn:microsoft.com/office/officeart/2005/8/layout/vProcess5"/>
+    <dgm:cxn modelId="{70066237-7CF0-41CC-8772-BAF4DBA8CC80}" srcId="{3321BD3E-EB4C-48E8-819C-88703AE58EAA}" destId="{6DB22C6B-E2A0-4F4D-9990-6E66EE551E35}" srcOrd="3" destOrd="0" parTransId="{1D948748-69EB-4B90-8D17-A61D4A9E37C6}" sibTransId="{CD6BE724-8555-4226-B73A-CF7FBE332CB4}"/>
+    <dgm:cxn modelId="{F5E6CE9A-5CC1-4D91-A8FB-B4098DB62FC5}" type="presOf" srcId="{13E42E31-33C6-4463-916C-983FD50F4960}" destId="{A4550223-FF7A-4844-8660-4EF8CC41246A}" srcOrd="1" destOrd="0" presId="urn:microsoft.com/office/officeart/2005/8/layout/vProcess5"/>
+    <dgm:cxn modelId="{79962167-A906-42D0-A0B8-58E1EDF3481E}" type="presOf" srcId="{02BC7B6D-BD00-4CBE-95A3-1C44BA1ED3DC}" destId="{2F2B2C98-C0B1-4F7A-8F98-DFC1C6B4C57E}" srcOrd="1" destOrd="0" presId="urn:microsoft.com/office/officeart/2005/8/layout/vProcess5"/>
+    <dgm:cxn modelId="{3BA6BD96-C802-4A50-85E3-96316B981379}" type="presOf" srcId="{12AC41A8-1839-4FEC-BC88-6BAC6EC591EB}" destId="{1000797B-02B4-485D-B8A9-5C62BAA02EF0}" srcOrd="0" destOrd="0" presId="urn:microsoft.com/office/officeart/2005/8/layout/vProcess5"/>
+    <dgm:cxn modelId="{6CB6A7F4-3C59-41A2-B1CC-20CB9A22CA8C}" type="presOf" srcId="{A752C814-59E5-4925-9FFC-BED3B3E1B583}" destId="{02A0BFD9-3FE3-43FF-827D-2DBCC7A23CCE}" srcOrd="1" destOrd="0" presId="urn:microsoft.com/office/officeart/2005/8/layout/vProcess5"/>
+    <dgm:cxn modelId="{AB690DC3-25D0-4827-9D19-F29BACC7100B}" type="presOf" srcId="{A752C814-59E5-4925-9FFC-BED3B3E1B583}" destId="{99415EA1-B174-4409-AA75-59BFC48F23C5}" srcOrd="0" destOrd="0" presId="urn:microsoft.com/office/officeart/2005/8/layout/vProcess5"/>
+    <dgm:cxn modelId="{E7246D5E-A7CF-4EAB-AE56-C2FE7311D34C}" type="presOf" srcId="{02BC7B6D-BD00-4CBE-95A3-1C44BA1ED3DC}" destId="{7B0E7293-5F82-41DC-B952-203CCB2A0A33}" srcOrd="0" destOrd="0" presId="urn:microsoft.com/office/officeart/2005/8/layout/vProcess5"/>
+    <dgm:cxn modelId="{B0AF8A46-D51D-406E-A0B9-673CCA55C74B}" type="presOf" srcId="{27A3CA78-31CC-49A4-9912-0121EF27A870}" destId="{55C3F406-B924-41F6-B9CD-179A257627F7}" srcOrd="0" destOrd="0" presId="urn:microsoft.com/office/officeart/2005/8/layout/vProcess5"/>
+    <dgm:cxn modelId="{EC041AEA-2DC8-407D-9F6D-3AEBF57F2C83}" type="presOf" srcId="{6DB22C6B-E2A0-4F4D-9990-6E66EE551E35}" destId="{B9F37ACD-B89C-480C-9F06-94F0A3DE1B04}" srcOrd="0" destOrd="0" presId="urn:microsoft.com/office/officeart/2005/8/layout/vProcess5"/>
+    <dgm:cxn modelId="{52240B1B-5D8D-4B50-8B7F-B0EEAA3D36FF}" type="presParOf" srcId="{8907C69F-04F6-4209-B3E4-3B881B027644}" destId="{326A7C5D-0E37-445F-9A35-C90790A9CC5C}" srcOrd="0" destOrd="0" presId="urn:microsoft.com/office/officeart/2005/8/layout/vProcess5"/>
+    <dgm:cxn modelId="{F9412C20-CB67-41DB-A1C6-BEDF4EAC02A1}" type="presParOf" srcId="{8907C69F-04F6-4209-B3E4-3B881B027644}" destId="{7B0E7293-5F82-41DC-B952-203CCB2A0A33}" srcOrd="1" destOrd="0" presId="urn:microsoft.com/office/officeart/2005/8/layout/vProcess5"/>
+    <dgm:cxn modelId="{A1CDCFEF-F53A-4555-BB27-D1F9C27BCDB8}" type="presParOf" srcId="{8907C69F-04F6-4209-B3E4-3B881B027644}" destId="{06212AD8-DAFF-4347-9DD1-673E2FD1B148}" srcOrd="2" destOrd="0" presId="urn:microsoft.com/office/officeart/2005/8/layout/vProcess5"/>
+    <dgm:cxn modelId="{83CD7B80-9741-4A81-ACA9-95DD082CE812}" type="presParOf" srcId="{8907C69F-04F6-4209-B3E4-3B881B027644}" destId="{99415EA1-B174-4409-AA75-59BFC48F23C5}" srcOrd="3" destOrd="0" presId="urn:microsoft.com/office/officeart/2005/8/layout/vProcess5"/>
+    <dgm:cxn modelId="{CB422594-8830-402C-90F3-952A3B98DC07}" type="presParOf" srcId="{8907C69F-04F6-4209-B3E4-3B881B027644}" destId="{B9F37ACD-B89C-480C-9F06-94F0A3DE1B04}" srcOrd="4" destOrd="0" presId="urn:microsoft.com/office/officeart/2005/8/layout/vProcess5"/>
+    <dgm:cxn modelId="{48CF52C3-763C-4291-AC2F-4FAFFA24A92C}" type="presParOf" srcId="{8907C69F-04F6-4209-B3E4-3B881B027644}" destId="{671A635C-EAD7-4CC5-9471-2C281B7E900E}" srcOrd="5" destOrd="0" presId="urn:microsoft.com/office/officeart/2005/8/layout/vProcess5"/>
+    <dgm:cxn modelId="{E32B0B6A-7615-41DD-BB62-A105C16E7F8C}" type="presParOf" srcId="{8907C69F-04F6-4209-B3E4-3B881B027644}" destId="{1000797B-02B4-485D-B8A9-5C62BAA02EF0}" srcOrd="6" destOrd="0" presId="urn:microsoft.com/office/officeart/2005/8/layout/vProcess5"/>
+    <dgm:cxn modelId="{EBE83C55-DC4A-42E4-BA5F-E4C77053372B}" type="presParOf" srcId="{8907C69F-04F6-4209-B3E4-3B881B027644}" destId="{55C3F406-B924-41F6-B9CD-179A257627F7}" srcOrd="7" destOrd="0" presId="urn:microsoft.com/office/officeart/2005/8/layout/vProcess5"/>
+    <dgm:cxn modelId="{FFB6B4BD-E607-4484-A102-BD54544BA311}" type="presParOf" srcId="{8907C69F-04F6-4209-B3E4-3B881B027644}" destId="{2F2B2C98-C0B1-4F7A-8F98-DFC1C6B4C57E}" srcOrd="8" destOrd="0" presId="urn:microsoft.com/office/officeart/2005/8/layout/vProcess5"/>
+    <dgm:cxn modelId="{6F102700-7448-432A-8550-AA26F5EA3184}" type="presParOf" srcId="{8907C69F-04F6-4209-B3E4-3B881B027644}" destId="{A4550223-FF7A-4844-8660-4EF8CC41246A}" srcOrd="9" destOrd="0" presId="urn:microsoft.com/office/officeart/2005/8/layout/vProcess5"/>
+    <dgm:cxn modelId="{DBFE39A5-EC24-4C03-B909-2BAC4F404BC9}" type="presParOf" srcId="{8907C69F-04F6-4209-B3E4-3B881B027644}" destId="{02A0BFD9-3FE3-43FF-827D-2DBCC7A23CCE}" srcOrd="10" destOrd="0" presId="urn:microsoft.com/office/officeart/2005/8/layout/vProcess5"/>
+    <dgm:cxn modelId="{FF595931-7E21-44F6-B83D-A1A3BB6DDA27}" type="presParOf" srcId="{8907C69F-04F6-4209-B3E4-3B881B027644}" destId="{85960212-6CF2-42E7-8598-5E45069FC85E}" srcOrd="11" destOrd="0" presId="urn:microsoft.com/office/officeart/2005/8/layout/vProcess5"/>
+  </dgm:cxnLst>
+  <dgm:bg/>
+  <dgm:whole/>
+  <dgm:extLst>
+    <a:ext uri="http://schemas.microsoft.com/office/drawing/2008/diagram">
+      <dsp:dataModelExt xmlns:dsp="http://schemas.microsoft.com/office/drawing/2008/diagram" xmlns="" relId="rId6" minVer="http://schemas.openxmlformats.org/drawingml/2006/diagram"/>
+    </a:ext>
+  </dgm:extLst>
+</dgm:dataModel>
+</file>
+
+<file path=ppt/diagrams/drawing1.xml><?xml version="1.0" encoding="utf-8"?>
+<dsp:drawing xmlns:dgm="http://schemas.openxmlformats.org/drawingml/2006/diagram" xmlns:a="http://schemas.openxmlformats.org/drawingml/2006/main" xmlns:dsp="http://schemas.microsoft.com/office/drawing/2008/diagram">
+  <dsp:spTree>
+    <dsp:nvGrpSpPr>
+      <dsp:cNvPr id="0" name=""/>
+      <dsp:cNvGrpSpPr/>
+    </dsp:nvGrpSpPr>
+    <dsp:grpSpPr/>
+    <dsp:sp modelId="{7B0E7293-5F82-41DC-B952-203CCB2A0A33}">
+      <dsp:nvSpPr>
+        <dsp:cNvPr id="0" name=""/>
+        <dsp:cNvSpPr/>
+      </dsp:nvSpPr>
+      <dsp:spPr>
+        <a:xfrm>
+          <a:off x="0" y="0"/>
+          <a:ext cx="4876800" cy="894080"/>
+        </a:xfrm>
+        <a:prstGeom prst="roundRect">
+          <a:avLst>
+            <a:gd name="adj" fmla="val 10000"/>
+          </a:avLst>
+        </a:prstGeom>
+        <a:solidFill>
+          <a:schemeClr val="accent1">
+            <a:hueOff val="0"/>
+            <a:satOff val="0"/>
+            <a:lumOff val="0"/>
+            <a:alphaOff val="0"/>
+          </a:schemeClr>
+        </a:solidFill>
+        <a:ln w="19050" cap="flat" cmpd="sng" algn="ctr">
+          <a:solidFill>
+            <a:schemeClr val="lt1">
+              <a:hueOff val="0"/>
+              <a:satOff val="0"/>
+              <a:lumOff val="0"/>
+              <a:alphaOff val="0"/>
+            </a:schemeClr>
+          </a:solidFill>
+          <a:prstDash val="solid"/>
+        </a:ln>
+        <a:effectLst/>
+      </dsp:spPr>
+      <dsp:style>
+        <a:lnRef idx="2">
+          <a:scrgbClr r="0" g="0" b="0"/>
+        </a:lnRef>
+        <a:fillRef idx="1">
+          <a:scrgbClr r="0" g="0" b="0"/>
+        </a:fillRef>
+        <a:effectRef idx="0">
+          <a:scrgbClr r="0" g="0" b="0"/>
+        </a:effectRef>
+        <a:fontRef idx="minor">
+          <a:schemeClr val="lt1"/>
+        </a:fontRef>
+      </dsp:style>
+      <dsp:txBody>
+        <a:bodyPr spcFirstLastPara="0" vert="horz" wrap="square" lIns="68580" tIns="68580" rIns="68580" bIns="68580" numCol="1" spcCol="1270" anchor="ctr" anchorCtr="0">
+          <a:noAutofit/>
+        </a:bodyPr>
+        <a:lstStyle/>
+        <a:p>
+          <a:pPr lvl="0" algn="l" defTabSz="800100">
+            <a:lnSpc>
+              <a:spcPct val="90000"/>
+            </a:lnSpc>
+            <a:spcBef>
+              <a:spcPct val="0"/>
+            </a:spcBef>
+            <a:spcAft>
+              <a:spcPct val="35000"/>
+            </a:spcAft>
+          </a:pPr>
+          <a:r>
+            <a:rPr lang="de-DE" sz="1800" kern="1200" dirty="0" smtClean="0"/>
+            <a:t>Wahlberechtigter gibt Personalausweisnummer und vollständigen Namen an</a:t>
+          </a:r>
+          <a:endParaRPr lang="de-DE" sz="1800" kern="1200" dirty="0"/>
+        </a:p>
+      </dsp:txBody>
+      <dsp:txXfrm>
+        <a:off x="0" y="0"/>
+        <a:ext cx="3888841" cy="894080"/>
+      </dsp:txXfrm>
+    </dsp:sp>
+    <dsp:sp modelId="{06212AD8-DAFF-4347-9DD1-673E2FD1B148}">
+      <dsp:nvSpPr>
+        <dsp:cNvPr id="0" name=""/>
+        <dsp:cNvSpPr/>
+      </dsp:nvSpPr>
+      <dsp:spPr>
+        <a:xfrm>
+          <a:off x="408432" y="1056640"/>
+          <a:ext cx="4876800" cy="894080"/>
+        </a:xfrm>
+        <a:prstGeom prst="roundRect">
+          <a:avLst>
+            <a:gd name="adj" fmla="val 10000"/>
+          </a:avLst>
+        </a:prstGeom>
+        <a:solidFill>
+          <a:schemeClr val="accent1">
+            <a:hueOff val="0"/>
+            <a:satOff val="0"/>
+            <a:lumOff val="0"/>
+            <a:alphaOff val="0"/>
+          </a:schemeClr>
+        </a:solidFill>
+        <a:ln w="19050" cap="flat" cmpd="sng" algn="ctr">
+          <a:solidFill>
+            <a:schemeClr val="lt1">
+              <a:hueOff val="0"/>
+              <a:satOff val="0"/>
+              <a:lumOff val="0"/>
+              <a:alphaOff val="0"/>
+            </a:schemeClr>
+          </a:solidFill>
+          <a:prstDash val="solid"/>
+        </a:ln>
+        <a:effectLst/>
+      </dsp:spPr>
+      <dsp:style>
+        <a:lnRef idx="2">
+          <a:scrgbClr r="0" g="0" b="0"/>
+        </a:lnRef>
+        <a:fillRef idx="1">
+          <a:scrgbClr r="0" g="0" b="0"/>
+        </a:fillRef>
+        <a:effectRef idx="0">
+          <a:scrgbClr r="0" g="0" b="0"/>
+        </a:effectRef>
+        <a:fontRef idx="minor">
+          <a:schemeClr val="lt1"/>
+        </a:fontRef>
+      </dsp:style>
+      <dsp:txBody>
+        <a:bodyPr spcFirstLastPara="0" vert="horz" wrap="square" lIns="68580" tIns="68580" rIns="68580" bIns="68580" numCol="1" spcCol="1270" anchor="ctr" anchorCtr="0">
+          <a:noAutofit/>
+        </a:bodyPr>
+        <a:lstStyle/>
+        <a:p>
+          <a:pPr lvl="0" algn="l" defTabSz="800100">
+            <a:lnSpc>
+              <a:spcPct val="90000"/>
+            </a:lnSpc>
+            <a:spcBef>
+              <a:spcPct val="0"/>
+            </a:spcBef>
+            <a:spcAft>
+              <a:spcPct val="35000"/>
+            </a:spcAft>
+          </a:pPr>
+          <a:r>
+            <a:rPr lang="de-DE" sz="1800" kern="1200" dirty="0" smtClean="0"/>
+            <a:t>Wahlberechtigter füllt Stimmzettel aus</a:t>
+          </a:r>
+          <a:endParaRPr lang="de-DE" sz="1800" kern="1200" dirty="0"/>
+        </a:p>
+      </dsp:txBody>
+      <dsp:txXfrm>
+        <a:off x="408432" y="1056640"/>
+        <a:ext cx="3887215" cy="894080"/>
+      </dsp:txXfrm>
+    </dsp:sp>
+    <dsp:sp modelId="{99415EA1-B174-4409-AA75-59BFC48F23C5}">
+      <dsp:nvSpPr>
+        <dsp:cNvPr id="0" name=""/>
+        <dsp:cNvSpPr/>
+      </dsp:nvSpPr>
+      <dsp:spPr>
+        <a:xfrm>
+          <a:off x="810768" y="2113280"/>
+          <a:ext cx="4876800" cy="894080"/>
+        </a:xfrm>
+        <a:prstGeom prst="roundRect">
+          <a:avLst>
+            <a:gd name="adj" fmla="val 10000"/>
+          </a:avLst>
+        </a:prstGeom>
+        <a:solidFill>
+          <a:schemeClr val="accent1">
+            <a:hueOff val="0"/>
+            <a:satOff val="0"/>
+            <a:lumOff val="0"/>
+            <a:alphaOff val="0"/>
+          </a:schemeClr>
+        </a:solidFill>
+        <a:ln w="19050" cap="flat" cmpd="sng" algn="ctr">
+          <a:solidFill>
+            <a:schemeClr val="lt1">
+              <a:hueOff val="0"/>
+              <a:satOff val="0"/>
+              <a:lumOff val="0"/>
+              <a:alphaOff val="0"/>
+            </a:schemeClr>
+          </a:solidFill>
+          <a:prstDash val="solid"/>
+        </a:ln>
+        <a:effectLst/>
+      </dsp:spPr>
+      <dsp:style>
+        <a:lnRef idx="2">
+          <a:scrgbClr r="0" g="0" b="0"/>
+        </a:lnRef>
+        <a:fillRef idx="1">
+          <a:scrgbClr r="0" g="0" b="0"/>
+        </a:fillRef>
+        <a:effectRef idx="0">
+          <a:scrgbClr r="0" g="0" b="0"/>
+        </a:effectRef>
+        <a:fontRef idx="minor">
+          <a:schemeClr val="lt1"/>
+        </a:fontRef>
+      </dsp:style>
+      <dsp:txBody>
+        <a:bodyPr spcFirstLastPara="0" vert="horz" wrap="square" lIns="68580" tIns="68580" rIns="68580" bIns="68580" numCol="1" spcCol="1270" anchor="ctr" anchorCtr="0">
+          <a:noAutofit/>
+        </a:bodyPr>
+        <a:lstStyle/>
+        <a:p>
+          <a:pPr lvl="0" algn="l" defTabSz="800100">
+            <a:lnSpc>
+              <a:spcPct val="90000"/>
+            </a:lnSpc>
+            <a:spcBef>
+              <a:spcPct val="0"/>
+            </a:spcBef>
+            <a:spcAft>
+              <a:spcPct val="35000"/>
+            </a:spcAft>
+          </a:pPr>
+          <a:r>
+            <a:rPr lang="de-DE" sz="1800" kern="1200" dirty="0" smtClean="0"/>
+            <a:t>Wahlberechtigter wird als „gewählt“ markiert</a:t>
+          </a:r>
+          <a:endParaRPr lang="de-DE" sz="1800" kern="1200" dirty="0"/>
+        </a:p>
+      </dsp:txBody>
+      <dsp:txXfrm>
+        <a:off x="810768" y="2113280"/>
+        <a:ext cx="3893311" cy="894080"/>
+      </dsp:txXfrm>
+    </dsp:sp>
+    <dsp:sp modelId="{B9F37ACD-B89C-480C-9F06-94F0A3DE1B04}">
+      <dsp:nvSpPr>
+        <dsp:cNvPr id="0" name=""/>
+        <dsp:cNvSpPr/>
+      </dsp:nvSpPr>
+      <dsp:spPr>
+        <a:xfrm>
+          <a:off x="1219200" y="3169919"/>
+          <a:ext cx="4876800" cy="894080"/>
+        </a:xfrm>
+        <a:prstGeom prst="roundRect">
+          <a:avLst>
+            <a:gd name="adj" fmla="val 10000"/>
+          </a:avLst>
+        </a:prstGeom>
+        <a:solidFill>
+          <a:schemeClr val="accent1">
+            <a:hueOff val="0"/>
+            <a:satOff val="0"/>
+            <a:lumOff val="0"/>
+            <a:alphaOff val="0"/>
+          </a:schemeClr>
+        </a:solidFill>
+        <a:ln w="19050" cap="flat" cmpd="sng" algn="ctr">
+          <a:solidFill>
+            <a:schemeClr val="lt1">
+              <a:hueOff val="0"/>
+              <a:satOff val="0"/>
+              <a:lumOff val="0"/>
+              <a:alphaOff val="0"/>
+            </a:schemeClr>
+          </a:solidFill>
+          <a:prstDash val="solid"/>
+        </a:ln>
+        <a:effectLst/>
+      </dsp:spPr>
+      <dsp:style>
+        <a:lnRef idx="2">
+          <a:scrgbClr r="0" g="0" b="0"/>
+        </a:lnRef>
+        <a:fillRef idx="1">
+          <a:scrgbClr r="0" g="0" b="0"/>
+        </a:fillRef>
+        <a:effectRef idx="0">
+          <a:scrgbClr r="0" g="0" b="0"/>
+        </a:effectRef>
+        <a:fontRef idx="minor">
+          <a:schemeClr val="lt1"/>
+        </a:fontRef>
+      </dsp:style>
+      <dsp:txBody>
+        <a:bodyPr spcFirstLastPara="0" vert="horz" wrap="square" lIns="68580" tIns="68580" rIns="68580" bIns="68580" numCol="1" spcCol="1270" anchor="ctr" anchorCtr="0">
+          <a:noAutofit/>
+        </a:bodyPr>
+        <a:lstStyle/>
+        <a:p>
+          <a:pPr lvl="0" algn="l" defTabSz="800100">
+            <a:lnSpc>
+              <a:spcPct val="90000"/>
+            </a:lnSpc>
+            <a:spcBef>
+              <a:spcPct val="0"/>
+            </a:spcBef>
+            <a:spcAft>
+              <a:spcPct val="35000"/>
+            </a:spcAft>
+          </a:pPr>
+          <a:r>
+            <a:rPr lang="de-DE" sz="1800" kern="1200" dirty="0" smtClean="0"/>
+            <a:t>Stimmen werden eingetragen</a:t>
+          </a:r>
+          <a:endParaRPr lang="de-DE" sz="1800" kern="1200" dirty="0"/>
+        </a:p>
+      </dsp:txBody>
+      <dsp:txXfrm>
+        <a:off x="1219200" y="3169919"/>
+        <a:ext cx="3887215" cy="894080"/>
+      </dsp:txXfrm>
+    </dsp:sp>
+    <dsp:sp modelId="{671A635C-EAD7-4CC5-9471-2C281B7E900E}">
+      <dsp:nvSpPr>
+        <dsp:cNvPr id="0" name=""/>
+        <dsp:cNvSpPr/>
+      </dsp:nvSpPr>
+      <dsp:spPr>
+        <a:xfrm>
+          <a:off x="4295647" y="684783"/>
+          <a:ext cx="581152" cy="581152"/>
+        </a:xfrm>
+        <a:prstGeom prst="downArrow">
+          <a:avLst>
+            <a:gd name="adj1" fmla="val 55000"/>
+            <a:gd name="adj2" fmla="val 45000"/>
+          </a:avLst>
+        </a:prstGeom>
+        <a:solidFill>
+          <a:schemeClr val="accent1">
+            <a:alpha val="90000"/>
+            <a:tint val="40000"/>
+            <a:hueOff val="0"/>
+            <a:satOff val="0"/>
+            <a:lumOff val="0"/>
+            <a:alphaOff val="0"/>
+          </a:schemeClr>
+        </a:solidFill>
+        <a:ln w="19050" cap="flat" cmpd="sng" algn="ctr">
+          <a:solidFill>
+            <a:schemeClr val="accent1">
+              <a:alpha val="90000"/>
+              <a:tint val="40000"/>
+              <a:hueOff val="0"/>
+              <a:satOff val="0"/>
+              <a:lumOff val="0"/>
+              <a:alphaOff val="0"/>
+            </a:schemeClr>
+          </a:solidFill>
+          <a:prstDash val="solid"/>
+        </a:ln>
+        <a:effectLst/>
+      </dsp:spPr>
+      <dsp:style>
+        <a:lnRef idx="2">
+          <a:scrgbClr r="0" g="0" b="0"/>
+        </a:lnRef>
+        <a:fillRef idx="1">
+          <a:scrgbClr r="0" g="0" b="0"/>
+        </a:fillRef>
+        <a:effectRef idx="0">
+          <a:scrgbClr r="0" g="0" b="0"/>
+        </a:effectRef>
+        <a:fontRef idx="minor"/>
+      </dsp:style>
+      <dsp:txBody>
+        <a:bodyPr spcFirstLastPara="0" vert="horz" wrap="square" lIns="35560" tIns="35560" rIns="35560" bIns="35560" numCol="1" spcCol="1270" anchor="ctr" anchorCtr="0">
+          <a:noAutofit/>
+        </a:bodyPr>
+        <a:lstStyle/>
+        <a:p>
+          <a:pPr lvl="0" algn="ctr" defTabSz="1244600">
+            <a:lnSpc>
+              <a:spcPct val="90000"/>
+            </a:lnSpc>
+            <a:spcBef>
+              <a:spcPct val="0"/>
+            </a:spcBef>
+            <a:spcAft>
+              <a:spcPct val="35000"/>
+            </a:spcAft>
+          </a:pPr>
+          <a:endParaRPr lang="de-DE" sz="2800" kern="1200"/>
+        </a:p>
+      </dsp:txBody>
+      <dsp:txXfrm>
+        <a:off x="4295647" y="684783"/>
+        <a:ext cx="581152" cy="581152"/>
+      </dsp:txXfrm>
+    </dsp:sp>
+    <dsp:sp modelId="{1000797B-02B4-485D-B8A9-5C62BAA02EF0}">
+      <dsp:nvSpPr>
+        <dsp:cNvPr id="0" name=""/>
+        <dsp:cNvSpPr/>
+      </dsp:nvSpPr>
+      <dsp:spPr>
+        <a:xfrm>
+          <a:off x="4704080" y="1741423"/>
+          <a:ext cx="581152" cy="581152"/>
+        </a:xfrm>
+        <a:prstGeom prst="downArrow">
+          <a:avLst>
+            <a:gd name="adj1" fmla="val 55000"/>
+            <a:gd name="adj2" fmla="val 45000"/>
+          </a:avLst>
+        </a:prstGeom>
+        <a:solidFill>
+          <a:schemeClr val="accent1">
+            <a:alpha val="90000"/>
+            <a:tint val="40000"/>
+            <a:hueOff val="0"/>
+            <a:satOff val="0"/>
+            <a:lumOff val="0"/>
+            <a:alphaOff val="0"/>
+          </a:schemeClr>
+        </a:solidFill>
+        <a:ln w="19050" cap="flat" cmpd="sng" algn="ctr">
+          <a:solidFill>
+            <a:schemeClr val="accent1">
+              <a:alpha val="90000"/>
+              <a:tint val="40000"/>
+              <a:hueOff val="0"/>
+              <a:satOff val="0"/>
+              <a:lumOff val="0"/>
+              <a:alphaOff val="0"/>
+            </a:schemeClr>
+          </a:solidFill>
+          <a:prstDash val="solid"/>
+        </a:ln>
+        <a:effectLst/>
+      </dsp:spPr>
+      <dsp:style>
+        <a:lnRef idx="2">
+          <a:scrgbClr r="0" g="0" b="0"/>
+        </a:lnRef>
+        <a:fillRef idx="1">
+          <a:scrgbClr r="0" g="0" b="0"/>
+        </a:fillRef>
+        <a:effectRef idx="0">
+          <a:scrgbClr r="0" g="0" b="0"/>
+        </a:effectRef>
+        <a:fontRef idx="minor"/>
+      </dsp:style>
+      <dsp:txBody>
+        <a:bodyPr spcFirstLastPara="0" vert="horz" wrap="square" lIns="35560" tIns="35560" rIns="35560" bIns="35560" numCol="1" spcCol="1270" anchor="ctr" anchorCtr="0">
+          <a:noAutofit/>
+        </a:bodyPr>
+        <a:lstStyle/>
+        <a:p>
+          <a:pPr lvl="0" algn="ctr" defTabSz="1244600">
+            <a:lnSpc>
+              <a:spcPct val="90000"/>
+            </a:lnSpc>
+            <a:spcBef>
+              <a:spcPct val="0"/>
+            </a:spcBef>
+            <a:spcAft>
+              <a:spcPct val="35000"/>
+            </a:spcAft>
+          </a:pPr>
+          <a:endParaRPr lang="de-DE" sz="2800" kern="1200"/>
+        </a:p>
+      </dsp:txBody>
+      <dsp:txXfrm>
+        <a:off x="4704080" y="1741423"/>
+        <a:ext cx="581152" cy="581152"/>
+      </dsp:txXfrm>
+    </dsp:sp>
+    <dsp:sp modelId="{55C3F406-B924-41F6-B9CD-179A257627F7}">
+      <dsp:nvSpPr>
+        <dsp:cNvPr id="0" name=""/>
+        <dsp:cNvSpPr/>
+      </dsp:nvSpPr>
+      <dsp:spPr>
+        <a:xfrm>
+          <a:off x="5106415" y="2798064"/>
+          <a:ext cx="581152" cy="581152"/>
+        </a:xfrm>
+        <a:prstGeom prst="downArrow">
+          <a:avLst>
+            <a:gd name="adj1" fmla="val 55000"/>
+            <a:gd name="adj2" fmla="val 45000"/>
+          </a:avLst>
+        </a:prstGeom>
+        <a:solidFill>
+          <a:schemeClr val="accent1">
+            <a:alpha val="90000"/>
+            <a:tint val="40000"/>
+            <a:hueOff val="0"/>
+            <a:satOff val="0"/>
+            <a:lumOff val="0"/>
+            <a:alphaOff val="0"/>
+          </a:schemeClr>
+        </a:solidFill>
+        <a:ln w="19050" cap="flat" cmpd="sng" algn="ctr">
+          <a:solidFill>
+            <a:schemeClr val="accent1">
+              <a:alpha val="90000"/>
+              <a:tint val="40000"/>
+              <a:hueOff val="0"/>
+              <a:satOff val="0"/>
+              <a:lumOff val="0"/>
+              <a:alphaOff val="0"/>
+            </a:schemeClr>
+          </a:solidFill>
+          <a:prstDash val="solid"/>
+        </a:ln>
+        <a:effectLst/>
+      </dsp:spPr>
+      <dsp:style>
+        <a:lnRef idx="2">
+          <a:scrgbClr r="0" g="0" b="0"/>
+        </a:lnRef>
+        <a:fillRef idx="1">
+          <a:scrgbClr r="0" g="0" b="0"/>
+        </a:fillRef>
+        <a:effectRef idx="0">
+          <a:scrgbClr r="0" g="0" b="0"/>
+        </a:effectRef>
+        <a:fontRef idx="minor"/>
+      </dsp:style>
+      <dsp:txBody>
+        <a:bodyPr spcFirstLastPara="0" vert="horz" wrap="square" lIns="35560" tIns="35560" rIns="35560" bIns="35560" numCol="1" spcCol="1270" anchor="ctr" anchorCtr="0">
+          <a:noAutofit/>
+        </a:bodyPr>
+        <a:lstStyle/>
+        <a:p>
+          <a:pPr lvl="0" algn="ctr" defTabSz="1244600">
+            <a:lnSpc>
+              <a:spcPct val="90000"/>
+            </a:lnSpc>
+            <a:spcBef>
+              <a:spcPct val="0"/>
+            </a:spcBef>
+            <a:spcAft>
+              <a:spcPct val="35000"/>
+            </a:spcAft>
+          </a:pPr>
+          <a:endParaRPr lang="de-DE" sz="2800" kern="1200"/>
+        </a:p>
+      </dsp:txBody>
+      <dsp:txXfrm>
+        <a:off x="5106415" y="2798064"/>
+        <a:ext cx="581152" cy="581152"/>
+      </dsp:txXfrm>
+    </dsp:sp>
+  </dsp:spTree>
+</dsp:drawing>
+</file>
+
+<file path=ppt/diagrams/layout1.xml><?xml version="1.0" encoding="utf-8"?>
+<dgm:layoutDef xmlns:dgm="http://schemas.openxmlformats.org/drawingml/2006/diagram" xmlns:a="http://schemas.openxmlformats.org/drawingml/2006/main" uniqueId="urn:microsoft.com/office/officeart/2005/8/layout/vProcess5">
+  <dgm:title val=""/>
+  <dgm:desc val=""/>
+  <dgm:catLst>
+    <dgm:cat type="process" pri="14000"/>
+  </dgm:catLst>
+  <dgm:sampData>
+    <dgm:dataModel>
+      <dgm:ptLst>
+        <dgm:pt modelId="0" type="doc"/>
+        <dgm:pt modelId="1">
+          <dgm:prSet phldr="1"/>
+        </dgm:pt>
+        <dgm:pt modelId="2">
+          <dgm:prSet phldr="1"/>
+        </dgm:pt>
+        <dgm:pt modelId="3">
+          <dgm:prSet phldr="1"/>
+        </dgm:pt>
+      </dgm:ptLst>
+      <dgm:cxnLst>
+        <dgm:cxn modelId="5" srcId="0" destId="1" srcOrd="0" destOrd="0"/>
+        <dgm:cxn modelId="6" srcId="0" destId="2" srcOrd="1" destOrd="0"/>
+        <dgm:cxn modelId="7" srcId="0" destId="3" srcOrd="2" destOrd="0"/>
+      </dgm:cxnLst>
+      <dgm:bg/>
+      <dgm:whole/>
+    </dgm:dataModel>
+  </dgm:sampData>
+  <dgm:styleData>
+    <dgm:dataModel>
+      <dgm:ptLst>
+        <dgm:pt modelId="0" type="doc"/>
+        <dgm:pt modelId="1"/>
+        <dgm:pt modelId="2"/>
+      </dgm:ptLst>
+      <dgm:cxnLst>
+        <dgm:cxn modelId="3" srcId="0" destId="1" srcOrd="0" destOrd="0"/>
+        <dgm:cxn modelId="4" srcId="0" destId="2" srcOrd="1" destOrd="0"/>
+      </dgm:cxnLst>
+      <dgm:bg/>
+      <dgm:whole/>
+    </dgm:dataModel>
+  </dgm:styleData>
+  <dgm:clrData>
+    <dgm:dataModel>
+      <dgm:ptLst>
+        <dgm:pt modelId="0" type="doc"/>
+        <dgm:pt modelId="1"/>
+        <dgm:pt modelId="2"/>
+        <dgm:pt modelId="3"/>
+        <dgm:pt modelId="4"/>
+      </dgm:ptLst>
+      <dgm:cxnLst>
+        <dgm:cxn modelId="6" srcId="0" destId="1" srcOrd="0" destOrd="0"/>
+        <dgm:cxn modelId="7" srcId="0" destId="2" srcOrd="1" destOrd="0"/>
+        <dgm:cxn modelId="8" srcId="0" destId="3" srcOrd="2" destOrd="0"/>
+        <dgm:cxn modelId="9" srcId="0" destId="4" srcOrd="3" destOrd="0"/>
+      </dgm:cxnLst>
+      <dgm:bg/>
+      <dgm:whole/>
+    </dgm:dataModel>
+  </dgm:clrData>
+  <dgm:layoutNode name="outerComposite">
+    <dgm:varLst>
+      <dgm:chMax val="5"/>
+      <dgm:dir/>
+      <dgm:resizeHandles val="exact"/>
+    </dgm:varLst>
+    <dgm:alg type="composite"/>
+    <dgm:shape xmlns:r="http://schemas.openxmlformats.org/officeDocument/2006/relationships" r:blip="">
+      <dgm:adjLst/>
+    </dgm:shape>
+    <dgm:presOf/>
+    <dgm:choose name="Name0">
+      <dgm:if name="Name1" func="var" arg="dir" op="equ" val="norm">
+        <dgm:constrLst>
+          <dgm:constr type="primFontSz" for="ch" ptType="node" op="equ" val="65"/>
+          <dgm:constr type="w" for="ch" forName="dummyMaxCanvas" refType="w"/>
+          <dgm:constr type="h" for="ch" forName="dummyMaxCanvas" refType="h"/>
+          <dgm:constr type="w" for="ch" forName="OneNode_1" refType="w"/>
+          <dgm:constr type="h" for="ch" forName="OneNode_1" refType="h" fact="0.5"/>
+          <dgm:constr type="ctrY" for="ch" forName="OneNode_1" refType="h" fact="0.5"/>
+          <dgm:constr type="w" for="ch" forName="TwoNodes_1" refType="w" fact="0.85"/>
+          <dgm:constr type="h" for="ch" forName="TwoNodes_1" refType="h" fact="0.45"/>
+          <dgm:constr type="t" for="ch" forName="TwoNodes_1"/>
+          <dgm:constr type="l" for="ch" forName="TwoNodes_1"/>
+          <dgm:constr type="w" for="ch" forName="TwoNodes_2" refType="w" fact="0.85"/>
+          <dgm:constr type="h" for="ch" forName="TwoNodes_2" refType="h" fact="0.45"/>
+          <dgm:constr type="b" for="ch" forName="TwoNodes_2" refType="h"/>
+          <dgm:constr type="r" for="ch" forName="TwoNodes_2" refType="w"/>
+          <dgm:constr type="w" for="ch" forName="TwoConn_1-2" refType="h" refFor="ch" refForName="TwoNodes_1" fact="0.65"/>
+          <dgm:constr type="h" for="ch" forName="TwoConn_1-2" refType="h" refFor="ch" refForName="TwoNodes_1" fact="0.65"/>
+          <dgm:constr type="ctrY" for="ch" forName="TwoConn_1-2" refType="h" fact="0.5"/>
+          <dgm:constr type="r" for="ch" forName="TwoConn_1-2" refType="r" refFor="ch" refForName="TwoNodes_1"/>
+          <dgm:constr type="r" for="ch" forName="TwoNodes_1_text" refType="l" refFor="ch" refForName="TwoConn_1-2"/>
+          <dgm:constr type="rOff" for="ch" forName="TwoNodes_1_text" refType="w" refFor="ch" refForName="TwoConn_1-2" fact="-0.5"/>
+          <dgm:constr type="t" for="ch" forName="TwoNodes_1_text" refType="t" refFor="ch" refForName="TwoNodes_1"/>
+          <dgm:constr type="b" for="ch" forName="TwoNodes_1_text" refType="b" refFor="ch" refForName="TwoNodes_1"/>
+          <dgm:constr type="l" for="ch" forName="TwoNodes_1_text" refType="l" refFor="ch" refForName="TwoNodes_1"/>
+          <dgm:constr type="r" for="ch" forName="TwoNodes_2_text" refType="l" refFor="ch" refForName="TwoConn_1-2"/>
+          <dgm:constr type="t" for="ch" forName="TwoNodes_2_text" refType="t" refFor="ch" refForName="TwoNodes_2"/>
+          <dgm:constr type="b" for="ch" forName="TwoNodes_2_text" refType="b" refFor="ch" refForName="TwoNodes_2"/>
+          <dgm:constr type="l" for="ch" forName="TwoNodes_2_text" refType="l" refFor="ch" refForName="TwoNodes_2"/>
+          <dgm:constr type="w" for="ch" forName="ThreeNodes_1" refType="w" fact="0.85"/>
+          <dgm:constr type="h" for="ch" forName="ThreeNodes_1" refType="h" fact="0.3"/>
+          <dgm:constr type="t" for="ch" forName="ThreeNodes_1"/>
+          <dgm:constr type="l" for="ch" forName="ThreeNodes_1"/>
+          <dgm:constr type="w" for="ch" forName="ThreeNodes_2" refType="w" fact="0.85"/>
+          <dgm:constr type="h" for="ch" forName="ThreeNodes_2" refType="h" fact="0.3"/>
+          <dgm:constr type="ctrY" for="ch" forName="ThreeNodes_2" refType="h" fact="0.5"/>
+          <dgm:constr type="ctrX" for="ch" forName="ThreeNodes_2" refType="w" fact="0.5"/>
+          <dgm:constr type="w" for="ch" forName="ThreeNodes_3" refType="w" fact="0.85"/>
+          <dgm:constr type="h" for="ch" forName="ThreeNodes_3" refType="h" fact="0.3"/>
+          <dgm:constr type="b" for="ch" forName="ThreeNodes_3" refType="h"/>
+          <dgm:constr type="r" for="ch" forName="ThreeNodes_3" refType="w"/>
+          <dgm:constr type="w" for="ch" forName="ThreeConn_1-2" refType="h" refFor="ch" refForName="ThreeNodes_1" fact="0.65"/>
+          <dgm:constr type="h" for="ch" forName="ThreeConn_1-2" refType="h" refFor="ch" refForName="ThreeNodes_1" fact="0.65"/>
+          <dgm:constr type="ctrY" for="ch" forName="ThreeConn_1-2" refType="h" fact="0.325"/>
+          <dgm:constr type="r" for="ch" forName="ThreeConn_1-2" refType="r" refFor="ch" refForName="ThreeNodes_1"/>
+          <dgm:constr type="w" for="ch" forName="ThreeConn_2-3" refType="h" refFor="ch" refForName="ThreeNodes_2" fact="0.65"/>
+          <dgm:constr type="h" for="ch" forName="ThreeConn_2-3" refType="h" refFor="ch" refForName="ThreeNodes_2" fact="0.65"/>
+          <dgm:constr type="ctrY" for="ch" forName="ThreeConn_2-3" refType="h" fact="0.673"/>
+          <dgm:constr type="r" for="ch" forName="ThreeConn_2-3" refType="r" refFor="ch" refForName="ThreeNodes_2"/>
+          <dgm:constr type="r" for="ch" forName="ThreeNodes_1_text" refType="l" refFor="ch" refForName="ThreeConn_1-2"/>
+          <dgm:constr type="rOff" for="ch" forName="ThreeNodes_1_text" refType="w" refFor="ch" refForName="ThreeConn_1-2" fact="-0.57"/>
+          <dgm:constr type="t" for="ch" forName="ThreeNodes_1_text" refType="t" refFor="ch" refForName="ThreeNodes_1"/>
+          <dgm:constr type="b" for="ch" forName="ThreeNodes_1_text" refType="b" refFor="ch" refForName="ThreeNodes_1"/>
+          <dgm:constr type="l" for="ch" forName="ThreeNodes_1_text" refType="l" refFor="ch" refForName="ThreeNodes_1"/>
+          <dgm:constr type="r" for="ch" forName="ThreeNodes_2_text" refType="l" refFor="ch" refForName="ThreeConn_1-2"/>
+          <dgm:constr type="t" for="ch" forName="ThreeNodes_2_text" refType="t" refFor="ch" refForName="ThreeNodes_2"/>
+          <dgm:constr type="b" for="ch" forName="ThreeNodes_2_text" refType="b" refFor="ch" refForName="ThreeNodes_2"/>
+          <dgm:constr type="l" for="ch" forName="ThreeNodes_2_text" refType="l" refFor="ch" refForName="ThreeNodes_2"/>
+          <dgm:constr type="r" for="ch" forName="ThreeNodes_3_text" refType="l" refFor="ch" refForName="ThreeConn_2-3"/>
+          <dgm:constr type="t" for="ch" forName="ThreeNodes_3_text" refType="t" refFor="ch" refForName="ThreeNodes_3"/>
+          <dgm:constr type="b" for="ch" forName="ThreeNodes_3_text" refType="b" refFor="ch" refForName="ThreeNodes_3"/>
+          <dgm:constr type="l" for="ch" forName="ThreeNodes_3_text" refType="l" refFor="ch" refForName="ThreeNodes_3"/>
+          <dgm:constr type="w" for="ch" forName="FourNodes_1" refType="w" fact="0.8"/>
+          <dgm:constr type="h" for="ch" forName="FourNodes_1" refType="h" fact="0.22"/>
+          <dgm:constr type="t" for="ch" forName="FourNodes_1"/>
+          <dgm:constr type="l" for="ch" forName="FourNodes_1"/>
+          <dgm:constr type="w" for="ch" forName="FourNodes_2" refType="w" fact="0.8"/>
+          <dgm:constr type="h" for="ch" forName="FourNodes_2" refType="h" fact="0.22"/>
+          <dgm:constr type="ctrY" for="ch" forName="FourNodes_2" refType="h" fact="0.37"/>
+          <dgm:constr type="ctrX" for="ch" forName="FourNodes_2" refType="w" fact="0.467"/>
+          <dgm:constr type="w" for="ch" forName="FourNodes_3" refType="w" fact="0.8"/>
+          <dgm:constr type="h" for="ch" forName="FourNodes_3" refType="h" fact="0.22"/>
+          <dgm:constr type="ctrY" for="ch" forName="FourNodes_3" refType="h" fact="0.63"/>
+          <dgm:constr type="ctrX" for="ch" forName="FourNodes_3" refType="w" fact="0.533"/>
+          <dgm:constr type="w" for="ch" forName="FourNodes_4" refType="w" fact="0.8"/>
+          <dgm:constr type="h" for="ch" forName="FourNodes_4" refType="h" fact="0.22"/>
+          <dgm:constr type="b" for="ch" forName="FourNodes_4" refType="h"/>
+          <dgm:constr type="r" for="ch" forName="FourNodes_4" refType="w"/>
+          <dgm:constr type="w" for="ch" forName="FourConn_1-2" refType="h" refFor="ch" refForName="FourNodes_1" fact="0.65"/>
+          <dgm:constr type="h" for="ch" forName="FourConn_1-2" refType="h" refFor="ch" refForName="FourNodes_1" fact="0.65"/>
+          <dgm:constr type="ctrY" for="ch" forName="FourConn_1-2" refType="h" fact="0.24"/>
+          <dgm:constr type="r" for="ch" forName="FourConn_1-2" refType="r" refFor="ch" refForName="FourNodes_1"/>
+          <dgm:constr type="w" for="ch" forName="FourConn_2-3" refType="h" refFor="ch" refForName="FourNodes_2" fact="0.65"/>
+          <dgm:constr type="h" for="ch" forName="FourConn_2-3" refType="h" refFor="ch" refForName="FourNodes_2" fact="0.65"/>
+          <dgm:constr type="ctrY" for="ch" forName="FourConn_2-3" refType="h" fact="0.5"/>
+          <dgm:constr type="r" for="ch" forName="FourConn_2-3" refType="r" refFor="ch" refForName="FourNodes_2"/>
+          <dgm:constr type="w" for="ch" forName="FourConn_3-4" refType="h" refFor="ch" refForName="FourNodes_3" fact="0.65"/>
+          <dgm:constr type="h" for="ch" forName="FourConn_3-4" refType="h" refFor="ch" refForName="FourNodes_3" fact="0.65"/>
+          <dgm:constr type="ctrY" for="ch" forName="FourConn_3-4" refType="h" fact="0.76"/>
+          <dgm:constr type="r" for="ch" forName="FourConn_3-4" refType="r" refFor="ch" refForName="FourNodes_3"/>
+          <dgm:constr type="r" for="ch" forName="FourNodes_1_text" refType="l" refFor="ch" refForName="FourConn_1-2"/>
+          <dgm:constr type="rOff" for="ch" forName="FourNodes_1_text" refType="w" refFor="ch" refForName="FourConn_1-2" fact="-0.7"/>
+          <dgm:constr type="t" for="ch" forName="FourNodes_1_text" refType="t" refFor="ch" refForName="FourNodes_1"/>
+          <dgm:constr type="b" for="ch" forName="FourNodes_1_text" refType="b" refFor="ch" refForName="FourNodes_1"/>
+          <dgm:constr type="l" for="ch" forName="FourNodes_1_text" refType="l" refFor="ch" refForName="FourNodes_1"/>
+          <dgm:constr type="r" for="ch" forName="FourNodes_2_text" refType="l" refFor="ch" refForName="FourConn_1-2"/>
+          <dgm:constr type="t" for="ch" forName="FourNodes_2_text" refType="t" refFor="ch" refForName="FourNodes_2"/>
+          <dgm:constr type="b" for="ch" forName="FourNodes_2_text" refType="b" refFor="ch" refForName="FourNodes_2"/>
+          <dgm:constr type="l" for="ch" forName="FourNodes_2_text" refType="l" refFor="ch" refForName="FourNodes_2"/>
+          <dgm:constr type="r" for="ch" forName="FourNodes_3_text" refType="l" refFor="ch" refForName="FourConn_2-3"/>
+          <dgm:constr type="t" for="ch" forName="FourNodes_3_text" refType="t" refFor="ch" refForName="FourNodes_3"/>
+          <dgm:constr type="b" for="ch" forName="FourNodes_3_text" refType="b" refFor="ch" refForName="FourNodes_3"/>
+          <dgm:constr type="l" for="ch" forName="FourNodes_3_text" refType="l" refFor="ch" refForName="FourNodes_3"/>
+          <dgm:constr type="r" for="ch" forName="FourNodes_4_text" refType="l" refFor="ch" refForName="FourConn_3-4"/>
+          <dgm:constr type="t" for="ch" forName="FourNodes_4_text" refType="t" refFor="ch" refForName="FourNodes_4"/>
+          <dgm:constr type="b" for="ch" forName="FourNodes_4_text" refType="b" refFor="ch" refForName="FourNodes_4"/>
+          <dgm:constr type="l" for="ch" forName="FourNodes_4_text" refType="l" refFor="ch" refForName="FourNodes_4"/>
+          <dgm:constr type="w" for="ch" forName="FiveNodes_1" refType="w" fact="0.77"/>
+          <dgm:constr type="h" for="ch" forName="FiveNodes_1" refType="h" fact="0.18"/>
+          <dgm:constr type="t" for="ch" forName="FiveNodes_1"/>
+          <dgm:constr type="l" for="ch" forName="FiveNodes_1"/>
+          <dgm:constr type="w" for="ch" forName="FiveNodes_2" refType="w" fact="0.77"/>
+          <dgm:constr type="h" for="ch" forName="FiveNodes_2" refType="h" fact="0.18"/>
+          <dgm:constr type="ctrY" for="ch" forName="FiveNodes_2" refType="h" fact="0.295"/>
+          <dgm:constr type="ctrX" for="ch" forName="FiveNodes_2" refType="w" fact="0.4425"/>
+          <dgm:constr type="w" for="ch" forName="FiveNodes_3" refType="w" fact="0.77"/>
+          <dgm:constr type="h" for="ch" forName="FiveNodes_3" refType="h" fact="0.18"/>
+          <dgm:constr type="ctrY" for="ch" forName="FiveNodes_3" refType="h" fact="0.5"/>
+          <dgm:constr type="ctrX" for="ch" forName="FiveNodes_3" refType="w" fact="0.5"/>
+          <dgm:constr type="w" for="ch" forName="FiveNodes_4" refType="w" fact="0.77"/>
+          <dgm:constr type="h" for="ch" forName="FiveNodes_4" refType="h" fact="0.18"/>
+          <dgm:constr type="ctrY" for="ch" forName="FiveNodes_4" refType="h" fact="0.705"/>
+          <dgm:constr type="ctrX" for="ch" forName="FiveNodes_4" refType="w" fact="0.5575"/>
+          <dgm:constr type="w" for="ch" forName="FiveNodes_5" refType="w" fact="0.77"/>
+          <dgm:constr type="h" for="ch" forName="FiveNodes_5" refType="h" fact="0.18"/>
+          <dgm:constr type="b" for="ch" forName="FiveNodes_5" refType="h"/>
+          <dgm:constr type="r" for="ch" forName="FiveNodes_5" refType="w"/>
+          <dgm:constr type="w" for="ch" forName="FiveConn_1-2" refType="h" refFor="ch" refForName="FiveNodes_1" fact="0.65"/>
+          <dgm:constr type="h" for="ch" forName="FiveConn_1-2" refType="h" refFor="ch" refForName="FiveNodes_1" fact="0.65"/>
+          <dgm:constr type="ctrY" for="ch" forName="FiveConn_1-2" refType="h" fact="0.19"/>
+          <dgm:constr type="r" for="ch" forName="FiveConn_1-2" refType="r" refFor="ch" refForName="FiveNodes_1"/>
+          <dgm:constr type="w" for="ch" forName="FiveConn_2-3" refType="h" refFor="ch" refForName="FiveNodes_2" fact="0.65"/>
+          <dgm:constr type="h" for="ch" forName="FiveConn_2-3" refType="h" refFor="ch" refForName="FiveNodes_2" fact="0.65"/>
+          <dgm:constr type="ctrY" for="ch" forName="FiveConn_2-3" refType="h" fact="0.395"/>
+          <dgm:constr type="r" for="ch" forName="FiveConn_2-3" refType="r" refFor="ch" refForName="FiveNodes_2"/>
+          <dgm:constr type="w" for="ch" forName="FiveConn_3-4" refType="h" refFor="ch" refForName="FiveNodes_3" fact="0.65"/>
+          <dgm:constr type="h" for="ch" forName="FiveConn_3-4" refType="h" refFor="ch" refForName="FiveNodes_3" fact="0.65"/>
+          <dgm:constr type="ctrY" for="ch" forName="FiveConn_3-4" refType="h" fact="0.597"/>
+          <dgm:constr type="r" for="ch" forName="FiveConn_3-4" refType="r" refFor="ch" refForName="FiveNodes_3"/>
+          <dgm:constr type="w" for="ch" forName="FiveConn_4-5" refType="h" refFor="ch" refForName="FiveNodes_4" fact="0.65"/>
+          <dgm:constr type="h" for="ch" forName="FiveConn_4-5" refType="h" refFor="ch" refForName="FiveNodes_4" fact="0.65"/>
+          <dgm:constr type="ctrY" for="ch" forName="FiveConn_4-5" refType="h" fact="0.804"/>
+          <dgm:constr type="r" for="ch" forName="FiveConn_4-5" refType="r" refFor="ch" refForName="FiveNodes_4"/>
+          <dgm:constr type="r" for="ch" forName="FiveNodes_1_text" refType="l" refFor="ch" refForName="FiveConn_1-2"/>
+          <dgm:constr type="rOff" for="ch" forName="FiveNodes_1_text" refType="w" refFor="ch" refForName="FiveConn_1-2" fact="-0.75"/>
+          <dgm:constr type="t" for="ch" forName="FiveNodes_1_text" refType="t" refFor="ch" refForName="FiveNodes_1"/>
+          <dgm:constr type="b" for="ch" forName="FiveNodes_1_text" refType="b" refFor="ch" refForName="FiveNodes_1"/>
+          <dgm:constr type="l" for="ch" forName="FiveNodes_1_text" refType="l" refFor="ch" refForName="FiveNodes_1"/>
+          <dgm:constr type="r" for="ch" forName="FiveNodes_2_text" refType="l" refFor="ch" refForName="FiveConn_1-2"/>
+          <dgm:constr type="t" for="ch" forName="FiveNodes_2_text" refType="t" refFor="ch" refForName="FiveNodes_2"/>
+          <dgm:constr type="b" for="ch" forName="FiveNodes_2_text" refType="b" refFor="ch" refForName="FiveNodes_2"/>
+          <dgm:constr type="l" for="ch" forName="FiveNodes_2_text" refType="l" refFor="ch" refForName="FiveNodes_2"/>
+          <dgm:constr type="r" for="ch" forName="FiveNodes_3_text" refType="l" refFor="ch" refForName="FiveConn_2-3"/>
+          <dgm:constr type="t" for="ch" forName="FiveNodes_3_text" refType="t" refFor="ch" refForName="FiveNodes_3"/>
+          <dgm:constr type="b" for="ch" forName="FiveNodes_3_text" refType="b" refFor="ch" refForName="FiveNodes_3"/>
+          <dgm:constr type="l" for="ch" forName="FiveNodes_3_text" refType="l" refFor="ch" refForName="FiveNodes_3"/>
+          <dgm:constr type="r" for="ch" forName="FiveNodes_4_text" refType="l" refFor="ch" refForName="FiveConn_3-4"/>
+          <dgm:constr type="t" for="ch" forName="FiveNodes_4_text" refType="t" refFor="ch" refForName="FiveNodes_4"/>
+          <dgm:constr type="b" for="ch" forName="FiveNodes_4_text" refType="b" refFor="ch" refForName="FiveNodes_4"/>
+          <dgm:constr type="l" for="ch" forName="FiveNodes_4_text" refType="l" refFor="ch" refForName="FiveNodes_4"/>
+          <dgm:constr type="r" for="ch" forName="FiveNodes_5_text" refType="l" refFor="ch" refForName="FiveConn_4-5"/>
+          <dgm:constr type="t" for="ch" forName="FiveNodes_5_text" refType="t" refFor="ch" refForName="FiveNodes_5"/>
+          <dgm:constr type="b" for="ch" forName="FiveNodes_5_text" refType="b" refFor="ch" refForName="FiveNodes_5"/>
+          <dgm:constr type="l" for="ch" forName="FiveNodes_5_text" refType="l" refFor="ch" refForName="FiveNodes_5"/>
+        </dgm:constrLst>
+      </dgm:if>
+      <dgm:else name="Name2">
+        <dgm:constrLst>
+          <dgm:constr type="primFontSz" for="ch" ptType="node" op="equ" val="65"/>
+          <dgm:constr type="w" for="ch" forName="dummyMaxCanvas" refType="w"/>
+          <dgm:constr type="h" for="ch" forName="dummyMaxCanvas" refType="h"/>
+          <dgm:constr type="w" for="ch" forName="OneNode_1" refType="w"/>
+          <dgm:constr type="h" for="ch" forName="OneNode_1" refType="h" fact="0.5"/>
+          <dgm:constr type="ctrY" for="ch" forName="OneNode_1" refType="h" fact="0.5"/>
+          <dgm:constr type="w" for="ch" forName="TwoNodes_1" refType="w" fact="0.85"/>
+          <dgm:constr type="h" for="ch" forName="TwoNodes_1" refType="h" fact="0.45"/>
+          <dgm:constr type="t" for="ch" forName="TwoNodes_1"/>
+          <dgm:constr type="r" for="ch" forName="TwoNodes_1" refType="w"/>
+          <dgm:constr type="w" for="ch" forName="TwoNodes_2" refType="w" fact="0.85"/>
+          <dgm:constr type="h" for="ch" forName="TwoNodes_2" refType="h" fact="0.45"/>
+          <dgm:constr type="b" for="ch" forName="TwoNodes_2" refType="h"/>
+          <dgm:constr type="l" for="ch" forName="TwoNodes_2"/>
+          <dgm:constr type="w" for="ch" forName="TwoConn_1-2" refType="h" refFor="ch" refForName="TwoNodes_1" fact="0.65"/>
+          <dgm:constr type="h" for="ch" forName="TwoConn_1-2" refType="h" refFor="ch" refForName="TwoNodes_1" fact="0.65"/>
+          <dgm:constr type="ctrY" for="ch" forName="TwoConn_1-2" refType="h" fact="0.5"/>
+          <dgm:constr type="l" for="ch" forName="TwoConn_1-2" refType="l" refFor="ch" refForName="TwoNodes_1"/>
+          <dgm:constr type="l" for="ch" forName="TwoNodes_1_text" refType="r" refFor="ch" refForName="TwoConn_1-2"/>
+          <dgm:constr type="lOff" for="ch" forName="TwoNodes_1_text" refType="w" refFor="ch" refForName="TwoConn_1-2" fact="0.5"/>
+          <dgm:constr type="t" for="ch" forName="TwoNodes_1_text" refType="t" refFor="ch" refForName="TwoNodes_1"/>
+          <dgm:constr type="b" for="ch" forName="TwoNodes_1_text" refType="b" refFor="ch" refForName="TwoNodes_1"/>
+          <dgm:constr type="r" for="ch" forName="TwoNodes_1_text" refType="r" refFor="ch" refForName="TwoNodes_1"/>
+          <dgm:constr type="l" for="ch" forName="TwoNodes_2_text" refType="r" refFor="ch" refForName="TwoConn_1-2"/>
+          <dgm:constr type="t" for="ch" forName="TwoNodes_2_text" refType="t" refFor="ch" refForName="TwoNodes_2"/>
+          <dgm:constr type="b" for="ch" forName="TwoNodes_2_text" refType="b" refFor="ch" refForName="TwoNodes_2"/>
+          <dgm:constr type="r" for="ch" forName="TwoNodes_2_text" refType="r" refFor="ch" refForName="TwoNodes_2"/>
+          <dgm:constr type="w" for="ch" forName="ThreeNodes_1" refType="w" fact="0.85"/>
+          <dgm:constr type="h" for="ch" forName="ThreeNodes_1" refType="h" fact="0.3"/>
+          <dgm:constr type="t" for="ch" forName="ThreeNodes_1"/>
+          <dgm:constr type="r" for="ch" forName="ThreeNodes_1" refType="w"/>
+          <dgm:constr type="w" for="ch" forName="ThreeNodes_2" refType="w" fact="0.85"/>
+          <dgm:constr type="h" for="ch" forName="ThreeNodes_2" refType="h" fact="0.3"/>
+          <dgm:constr type="ctrY" for="ch" forName="ThreeNodes_2" refType="h" fact="0.5"/>
+          <dgm:constr type="ctrX" for="ch" forName="ThreeNodes_2" refType="w" fact="0.5"/>
+          <dgm:constr type="w" for="ch" forName="ThreeNodes_3" refType="w" fact="0.85"/>
+          <dgm:constr type="h" for="ch" forName="ThreeNodes_3" refType="h" fact="0.3"/>
+          <dgm:constr type="b" for="ch" forName="ThreeNodes_3" refType="h"/>
+          <dgm:constr type="l" for="ch" forName="ThreeNodes_3"/>
+          <dgm:constr type="w" for="ch" forName="ThreeConn_1-2" refType="h" refFor="ch" refForName="ThreeNodes_1" fact="0.65"/>
+          <dgm:constr type="h" for="ch" forName="ThreeConn_1-2" refType="h" refFor="ch" refForName="ThreeNodes_1" fact="0.65"/>
+          <dgm:constr type="ctrY" for="ch" forName="ThreeConn_1-2" refType="h" fact="0.325"/>
+          <dgm:constr type="l" for="ch" forName="ThreeConn_1-2" refType="l" refFor="ch" refForName="ThreeNodes_1"/>
+          <dgm:constr type="w" for="ch" forName="ThreeConn_2-3" refType="h" refFor="ch" refForName="ThreeNodes_2" fact="0.65"/>
+          <dgm:constr type="h" for="ch" forName="ThreeConn_2-3" refType="h" refFor="ch" refForName="ThreeNodes_2" fact="0.65"/>
+          <dgm:constr type="ctrY" for="ch" forName="ThreeConn_2-3" refType="h" fact="0.673"/>
+          <dgm:constr type="l" for="ch" forName="ThreeConn_2-3" refType="l" refFor="ch" refForName="ThreeNodes_2"/>
+          <dgm:constr type="l" for="ch" forName="ThreeNodes_1_text" refType="r" refFor="ch" refForName="ThreeConn_1-2"/>
+          <dgm:constr type="lOff" for="ch" forName="ThreeNodes_1_text" refType="w" refFor="ch" refForName="ThreeConn_1-2" fact="0.55"/>
+          <dgm:constr type="t" for="ch" forName="ThreeNodes_1_text" refType="t" refFor="ch" refForName="ThreeNodes_1"/>
+          <dgm:constr type="b" for="ch" forName="ThreeNodes_1_text" refType="b" refFor="ch" refForName="ThreeNodes_1"/>
+          <dgm:constr type="r" for="ch" forName="ThreeNodes_1_text" refType="r" refFor="ch" refForName="ThreeNodes_1"/>
+          <dgm:constr type="l" for="ch" forName="ThreeNodes_2_text" refType="r" refFor="ch" refForName="ThreeConn_1-2"/>
+          <dgm:constr type="t" for="ch" forName="ThreeNodes_2_text" refType="t" refFor="ch" refForName="ThreeNodes_2"/>
+          <dgm:constr type="b" for="ch" forName="ThreeNodes_2_text" refType="b" refFor="ch" refForName="ThreeNodes_2"/>
+          <dgm:constr type="r" for="ch" forName="ThreeNodes_2_text" refType="r" refFor="ch" refForName="ThreeNodes_2"/>
+          <dgm:constr type="l" for="ch" forName="ThreeNodes_3_text" refType="r" refFor="ch" refForName="ThreeConn_2-3"/>
+          <dgm:constr type="t" for="ch" forName="ThreeNodes_3_text" refType="t" refFor="ch" refForName="ThreeNodes_3"/>
+          <dgm:constr type="b" for="ch" forName="ThreeNodes_3_text" refType="b" refFor="ch" refForName="ThreeNodes_3"/>
+          <dgm:constr type="r" for="ch" forName="ThreeNodes_3_text" refType="r" refFor="ch" refForName="ThreeNodes_3"/>
+          <dgm:constr type="w" for="ch" forName="FourNodes_1" refType="w" fact="0.8"/>
+          <dgm:constr type="h" for="ch" forName="FourNodes_1" refType="h" fact="0.22"/>
+          <dgm:constr type="t" for="ch" forName="FourNodes_1"/>
+          <dgm:constr type="r" for="ch" forName="FourNodes_1" refType="w"/>
+          <dgm:constr type="w" for="ch" forName="FourNodes_2" refType="w" fact="0.8"/>
+          <dgm:constr type="h" for="ch" forName="FourNodes_2" refType="h" fact="0.22"/>
+          <dgm:constr type="ctrY" for="ch" forName="FourNodes_2" refType="h" fact="0.37"/>
+          <dgm:constr type="ctrX" for="ch" forName="FourNodes_2" refType="w" fact="0.533"/>
+          <dgm:constr type="w" for="ch" forName="FourNodes_3" refType="w" fact="0.8"/>
+          <dgm:constr type="h" for="ch" forName="FourNodes_3" refType="h" fact="0.22"/>
+          <dgm:constr type="ctrY" for="ch" forName="FourNodes_3" refType="h" fact="0.63"/>
+          <dgm:constr type="ctrX" for="ch" forName="FourNodes_3" refType="w" fact="0.467"/>
+          <dgm:constr type="w" for="ch" forName="FourNodes_4" refType="w" fact="0.8"/>
+          <dgm:constr type="h" for="ch" forName="FourNodes_4" refType="h" fact="0.22"/>
+          <dgm:constr type="b" for="ch" forName="FourNodes_4" refType="h"/>
+          <dgm:constr type="l" for="ch" forName="FourNodes_4"/>
+          <dgm:constr type="w" for="ch" forName="FourConn_1-2" refType="h" refFor="ch" refForName="FourNodes_1" fact="0.65"/>
+          <dgm:constr type="h" for="ch" forName="FourConn_1-2" refType="h" refFor="ch" refForName="FourNodes_1" fact="0.65"/>
+          <dgm:constr type="ctrY" for="ch" forName="FourConn_1-2" refType="h" fact="0.24"/>
+          <dgm:constr type="l" for="ch" forName="FourConn_1-2" refType="l" refFor="ch" refForName="FourNodes_1"/>
+          <dgm:constr type="w" for="ch" forName="FourConn_2-3" refType="h" refFor="ch" refForName="FourNodes_2" fact="0.65"/>
+          <dgm:constr type="h" for="ch" forName="FourConn_2-3" refType="h" refFor="ch" refForName="FourNodes_2" fact="0.65"/>
+          <dgm:constr type="ctrY" for="ch" forName="FourConn_2-3" refType="h" fact="0.5"/>
+          <dgm:constr type="l" for="ch" forName="FourConn_2-3" refType="l" refFor="ch" refForName="FourNodes_2"/>
+          <dgm:constr type="w" for="ch" forName="FourConn_3-4" refType="h" refFor="ch" refForName="FourNodes_3" fact="0.65"/>
+          <dgm:constr type="h" for="ch" forName="FourConn_3-4" refType="h" refFor="ch" refForName="FourNodes_3" fact="0.65"/>
+          <dgm:constr type="ctrY" for="ch" forName="FourConn_3-4" refType="h" fact="0.76"/>
+          <dgm:constr type="l" for="ch" forName="FourConn_3-4" refType="l" refFor="ch" refForName="FourNodes_3"/>
+          <dgm:constr type="l" for="ch" forName="FourNodes_1_text" refType="r" refFor="ch" refForName="FourConn_1-2"/>
+          <dgm:constr type="lOff" for="ch" forName="FourNodes_1_text" refType="w" refFor="ch" refForName="FourConn_1-2" fact="0.69"/>
+          <dgm:constr type="t" for="ch" forName="FourNodes_1_text" refType="t" refFor="ch" refForName="FourNodes_1"/>
+          <dgm:constr type="b" for="ch" forName="FourNodes_1_text" refType="b" refFor="ch" refForName="FourNodes_1"/>
+          <dgm:constr type="r" for="ch" forName="FourNodes_1_text" refType="r" refFor="ch" refForName="FourNodes_1"/>
+          <dgm:constr type="l" for="ch" forName="FourNodes_2_text" refType="r" refFor="ch" refForName="FourConn_1-2"/>
+          <dgm:constr type="t" for="ch" forName="FourNodes_2_text" refType="t" refFor="ch" refForName="FourNodes_2"/>
+          <dgm:constr type="b" for="ch" forName="FourNodes_2_text" refType="b" refFor="ch" refForName="FourNodes_2"/>
+          <dgm:constr type="r" for="ch" forName="FourNodes_2_text" refType="r" refFor="ch" refForName="FourNodes_2"/>
+          <dgm:constr type="l" for="ch" forName="FourNodes_3_text" refType="r" refFor="ch" refForName="FourConn_2-3"/>
+          <dgm:constr type="t" for="ch" forName="FourNodes_3_text" refType="t" refFor="ch" refForName="FourNodes_3"/>
+          <dgm:constr type="b" for="ch" forName="FourNodes_3_text" refType="b" refFor="ch" refForName="FourNodes_3"/>
+          <dgm:constr type="r" for="ch" forName="FourNodes_3_text" refType="r" refFor="ch" refForName="FourNodes_3"/>
+          <dgm:constr type="l" for="ch" forName="FourNodes_4_text" refType="r" refFor="ch" refForName="FourConn_3-4"/>
+          <dgm:constr type="t" for="ch" forName="FourNodes_4_text" refType="t" refFor="ch" refForName="FourNodes_4"/>
+          <dgm:constr type="b" for="ch" forName="FourNodes_4_text" refType="b" refFor="ch" refForName="FourNodes_4"/>
+          <dgm:constr type="r" for="ch" forName="FourNodes_4_text" refType="r" refFor="ch" refForName="FourNodes_4"/>
+          <dgm:constr type="w" for="ch" forName="FiveNodes_1" refType="w" fact="0.77"/>
+          <dgm:constr type="h" for="ch" forName="FiveNodes_1" refType="h" fact="0.18"/>
+          <dgm:constr type="t" for="ch" forName="FiveNodes_1"/>
+          <dgm:constr type="r" for="ch" forName="FiveNodes_1" refType="w"/>
+          <dgm:constr type="w" for="ch" forName="FiveNodes_2" refType="w" fact="0.77"/>
+          <dgm:constr type="h" for="ch" forName="FiveNodes_2" refType="h" fact="0.18"/>
+          <dgm:constr type="ctrY" for="ch" forName="FiveNodes_2" refType="h" fact="0.295"/>
+          <dgm:constr type="ctrX" for="ch" forName="FiveNodes_2" refType="w" fact="0.5575"/>
+          <dgm:constr type="w" for="ch" forName="FiveNodes_3" refType="w" fact="0.77"/>
+          <dgm:constr type="h" for="ch" forName="FiveNodes_3" refType="h" fact="0.18"/>
+          <dgm:constr type="ctrY" for="ch" forName="FiveNodes_3" refType="h" fact="0.5"/>
+          <dgm:constr type="ctrX" for="ch" forName="FiveNodes_3" refType="w" fact="0.5"/>
+          <dgm:constr type="w" for="ch" forName="FiveNodes_4" refType="w" fact="0.77"/>
+          <dgm:constr type="h" for="ch" forName="FiveNodes_4" refType="h" fact="0.18"/>
+          <dgm:constr type="ctrY" for="ch" forName="FiveNodes_4" refType="h" fact="0.705"/>
+          <dgm:constr type="ctrX" for="ch" forName="FiveNodes_4" refType="w" fact="0.4425"/>
+          <dgm:constr type="w" for="ch" forName="FiveNodes_5" refType="w" fact="0.77"/>
+          <dgm:constr type="h" for="ch" forName="FiveNodes_5" refType="h" fact="0.18"/>
+          <dgm:constr type="b" for="ch" forName="FiveNodes_5" refType="h"/>
+          <dgm:constr type="l" for="ch" forName="FiveNodes_5"/>
+          <dgm:constr type="w" for="ch" forName="FiveConn_1-2" refType="h" refFor="ch" refForName="FiveNodes_1" fact="0.65"/>
+          <dgm:constr type="h" for="ch" forName="FiveConn_1-2" refType="h" refFor="ch" refForName="FiveNodes_1" fact="0.65"/>
+          <dgm:constr type="ctrY" for="ch" forName="FiveConn_1-2" refType="h" fact="0.19"/>
+          <dgm:constr type="l" for="ch" forName="FiveConn_1-2" refType="l" refFor="ch" refForName="FiveNodes_1"/>
+          <dgm:constr type="w" for="ch" forName="FiveConn_2-3" refType="h" refFor="ch" refForName="FiveNodes_2" fact="0.65"/>
+          <dgm:constr type="h" for="ch" forName="FiveConn_2-3" refType="h" refFor="ch" refForName="FiveNodes_2" fact="0.65"/>
+          <dgm:constr type="ctrY" for="ch" forName="FiveConn_2-3" refType="h" fact="0.395"/>
+          <dgm:constr type="l" for="ch" forName="FiveConn_2-3" refType="l" refFor="ch" refForName="FiveNodes_2"/>
+          <dgm:constr type="w" for="ch" forName="FiveConn_3-4" refType="h" refFor="ch" refForName="FiveNodes_3" fact="0.65"/>
+          <dgm:constr type="h" for="ch" forName="FiveConn_3-4" refType="h" refFor="ch" refForName="FiveNodes_3" fact="0.65"/>
+          <dgm:constr type="ctrY" for="ch" forName="FiveConn_3-4" refType="h" fact="0.597"/>
+          <dgm:constr type="l" for="ch" forName="FiveConn_3-4" refType="l" refFor="ch" refForName="FiveNodes_3"/>
+          <dgm:constr type="w" for="ch" forName="FiveConn_4-5" refType="h" refFor="ch" refForName="FiveNodes_4" fact="0.65"/>
+          <dgm:constr type="h" for="ch" forName="FiveConn_4-5" refType="h" refFor="ch" refForName="FiveNodes_4" fact="0.65"/>
+          <dgm:constr type="ctrY" for="ch" forName="FiveConn_4-5" refType="h" fact="0.804"/>
+          <dgm:constr type="l" for="ch" forName="FiveConn_4-5" refType="l" refFor="ch" refForName="FiveNodes_4"/>
+          <dgm:constr type="l" for="ch" forName="FiveNodes_1_text" refType="r" refFor="ch" refForName="FiveConn_1-2"/>
+          <dgm:constr type="lOff" for="ch" forName="FiveNodes_1_text" refType="w" refFor="ch" refForName="FiveConn_1-2" fact="0.73"/>
+          <dgm:constr type="t" for="ch" forName="FiveNodes_1_text" refType="t" refFor="ch" refForName="FiveNodes_1"/>
+          <dgm:constr type="b" for="ch" forName="FiveNodes_1_text" refType="b" refFor="ch" refForName="FiveNodes_1"/>
+          <dgm:constr type="r" for="ch" forName="FiveNodes_1_text" refType="r" refFor="ch" refForName="FiveNodes_1"/>
+          <dgm:constr type="l" for="ch" forName="FiveNodes_2_text" refType="r" refFor="ch" refForName="FiveConn_1-2"/>
+          <dgm:constr type="t" for="ch" forName="FiveNodes_2_text" refType="t" refFor="ch" refForName="FiveNodes_2"/>
+          <dgm:constr type="b" for="ch" forName="FiveNodes_2_text" refType="b" refFor="ch" refForName="FiveNodes_2"/>
+          <dgm:constr type="r" for="ch" forName="FiveNodes_2_text" refType="r" refFor="ch" refForName="FiveNodes_2"/>
+          <dgm:constr type="l" for="ch" forName="FiveNodes_3_text" refType="r" refFor="ch" refForName="FiveConn_2-3"/>
+          <dgm:constr type="t" for="ch" forName="FiveNodes_3_text" refType="t" refFor="ch" refForName="FiveNodes_3"/>
+          <dgm:constr type="b" for="ch" forName="FiveNodes_3_text" refType="b" refFor="ch" refForName="FiveNodes_3"/>
+          <dgm:constr type="r" for="ch" forName="FiveNodes_3_text" refType="r" refFor="ch" refForName="FiveNodes_3"/>
+          <dgm:constr type="l" for="ch" forName="FiveNodes_4_text" refType="r" refFor="ch" refForName="FiveConn_3-4"/>
+          <dgm:constr type="t" for="ch" forName="FiveNodes_4_text" refType="t" refFor="ch" refForName="FiveNodes_4"/>
+          <dgm:constr type="b" for="ch" forName="FiveNodes_4_text" refType="b" refFor="ch" refForName="FiveNodes_4"/>
+          <dgm:constr type="r" for="ch" forName="FiveNodes_4_text" refType="r" refFor="ch" refForName="FiveNodes_4"/>
+          <dgm:constr type="l" for="ch" forName="FiveNodes_5_text" refType="r" refFor="ch" refForName="FiveConn_4-5"/>
+          <dgm:constr type="t" for="ch" forName="FiveNodes_5_text" refType="t" refFor="ch" refForName="FiveNodes_5"/>
+          <dgm:constr type="b" for="ch" forName="FiveNodes_5_text" refType="b" refFor="ch" refForName="FiveNodes_5"/>
+          <dgm:constr type="r" for="ch" forName="FiveNodes_5_text" refType="r" refFor="ch" refForName="FiveNodes_5"/>
+        </dgm:constrLst>
+      </dgm:else>
+    </dgm:choose>
+    <dgm:ruleLst/>
+    <dgm:layoutNode name="dummyMaxCanvas">
+      <dgm:varLst/>
+      <dgm:alg type="sp"/>
+      <dgm:shape xmlns:r="http://schemas.openxmlformats.org/officeDocument/2006/relationships" r:blip="">
+        <dgm:adjLst/>
+      </dgm:shape>
+      <dgm:presOf/>
+      <dgm:constrLst/>
+      <dgm:ruleLst/>
+    </dgm:layoutNode>
+    <dgm:choose name="Name3">
+      <dgm:if name="Name4" axis="ch" ptType="node" func="cnt" op="equ" val="1">
+        <dgm:layoutNode name="OneNode_1">
+          <dgm:varLst>
+            <dgm:bulletEnabled val="1"/>
+          </dgm:varLst>
+          <dgm:alg type="tx"/>
+          <dgm:shape xmlns:r="http://schemas.openxmlformats.org/officeDocument/2006/relationships" type="roundRect" r:blip="">
+            <dgm:adjLst>
+              <dgm:adj idx="1" val="0.1"/>
+            </dgm:adjLst>
+          </dgm:shape>
+          <dgm:presOf axis="ch desOrSelf" ptType="node node" st="1 1" cnt="1 0"/>
+          <dgm:constrLst>
+            <dgm:constr type="lMarg" refType="primFontSz" fact="0.3"/>
+            <dgm:constr type="rMarg" refType="primFontSz" fact="0.3"/>
+            <dgm:constr type="tMarg" refType="primFontSz" fact="0.3"/>
+            <dgm:constr type="bMarg" refType="primFontSz" fact="0.3"/>
+          </dgm:constrLst>
+          <dgm:ruleLst>
+            <dgm:rule type="primFontSz" val="5" fact="NaN" max="NaN"/>
+          </dgm:ruleLst>
+        </dgm:layoutNode>
+      </dgm:if>
+      <dgm:else name="Name5">
+        <dgm:choose name="Name6">
+          <dgm:if name="Name7" axis="ch" ptType="node" func="cnt" op="equ" val="2">
+            <dgm:layoutNode name="TwoNodes_1">
+              <dgm:varLst>
+                <dgm:bulletEnabled val="1"/>
+              </dgm:varLst>
+              <dgm:alg type="sp"/>
+              <dgm:shape xmlns:r="http://schemas.openxmlformats.org/officeDocument/2006/relationships" type="roundRect" r:blip="">
+                <dgm:adjLst>
+                  <dgm:adj idx="1" val="0.1"/>
+                </dgm:adjLst>
+              </dgm:shape>
+              <dgm:presOf axis="ch desOrSelf" ptType="node node" st="1 1" cnt="1 0"/>
+              <dgm:constrLst/>
+              <dgm:ruleLst/>
+            </dgm:layoutNode>
+            <dgm:layoutNode name="TwoNodes_2">
+              <dgm:varLst>
+                <dgm:bulletEnabled val="1"/>
+              </dgm:varLst>
+              <dgm:alg type="sp"/>
+              <dgm:shape xmlns:r="http://schemas.openxmlformats.org/officeDocument/2006/relationships" type="roundRect" r:blip="">
+                <dgm:adjLst>
+                  <dgm:adj idx="1" val="0.1"/>
+                </dgm:adjLst>
+              </dgm:shape>
+              <dgm:presOf axis="ch desOrSelf" ptType="node node" st="2 1" cnt="1 0"/>
+              <dgm:constrLst/>
+              <dgm:ruleLst/>
+            </dgm:layoutNode>
+            <dgm:layoutNode name="TwoConn_1-2" styleLbl="fgAccFollowNode1">
+              <dgm:varLst>
+                <dgm:bulletEnabled val="1"/>
+              </dgm:varLst>
+              <dgm:alg type="tx"/>
+              <dgm:shape xmlns:r="http://schemas.openxmlformats.org/officeDocument/2006/relationships" type="downArrow" r:blip="">
+                <dgm:adjLst>
+                  <dgm:adj idx="1" val="0.55"/>
+                  <dgm:adj idx="2" val="0.45"/>
+                </dgm:adjLst>
+              </dgm:shape>
+              <dgm:presOf axis="ch" ptType="sibTrans" cnt="1"/>
+              <dgm:constrLst>
+                <dgm:constr type="lMarg" refType="primFontSz" fact="0.1"/>
+                <dgm:constr type="rMarg" refType="primFontSz" fact="0.1"/>
+                <dgm:constr type="tMarg" refType="primFontSz" fact="0.1"/>
+                <dgm:constr type="bMarg" refType="primFontSz" fact="0.1"/>
+              </dgm:constrLst>
+              <dgm:ruleLst>
+                <dgm:rule type="primFontSz" val="5" fact="NaN" max="NaN"/>
+              </dgm:ruleLst>
+            </dgm:layoutNode>
+            <dgm:layoutNode name="TwoNodes_1_text">
+              <dgm:varLst>
+                <dgm:bulletEnabled val="1"/>
+              </dgm:varLst>
+              <dgm:alg type="tx">
+                <dgm:param type="parTxLTRAlign" val="l"/>
+                <dgm:param type="txAnchorVertCh" val="mid"/>
+              </dgm:alg>
+              <dgm:shape xmlns:r="http://schemas.openxmlformats.org/officeDocument/2006/relationships" type="roundRect" r:blip="" hideGeom="1">
+                <dgm:adjLst>
+                  <dgm:adj idx="1" val="0.1"/>
+                </dgm:adjLst>
+              </dgm:shape>
+              <dgm:presOf axis="ch desOrSelf" ptType="node node" st="1 1" cnt="1 0"/>
+              <dgm:constrLst>
+                <dgm:constr type="lMarg" refType="primFontSz" fact="0.3"/>
+                <dgm:constr type="rMarg" refType="primFontSz" fact="0.3"/>
+                <dgm:constr type="tMarg" refType="primFontSz" fact="0.3"/>
+                <dgm:constr type="bMarg" refType="primFontSz" fact="0.3"/>
+              </dgm:constrLst>
+              <dgm:ruleLst>
+                <dgm:rule type="primFontSz" val="5" fact="NaN" max="NaN"/>
+              </dgm:ruleLst>
+            </dgm:layoutNode>
+            <dgm:layoutNode name="TwoNodes_2_text">
+              <dgm:varLst>
+                <dgm:bulletEnabled val="1"/>
+              </dgm:varLst>
+              <dgm:alg type="tx">
+                <dgm:param type="parTxLTRAlign" val="l"/>
+                <dgm:param type="txAnchorVertCh" val="mid"/>
+              </dgm:alg>
+              <dgm:shape xmlns:r="http://schemas.openxmlformats.org/officeDocument/2006/relationships" type="roundRect" r:blip="" hideGeom="1">
+                <dgm:adjLst>
+                  <dgm:adj idx="1" val="0.1"/>
+                </dgm:adjLst>
+              </dgm:shape>
+              <dgm:presOf axis="ch desOrSelf" ptType="node node" st="2 1" cnt="1 0"/>
+              <dgm:constrLst>
+                <dgm:constr type="lMarg" refType="primFontSz" fact="0.3"/>
+                <dgm:constr type="rMarg" refType="primFontSz" fact="0.3"/>
+                <dgm:constr type="tMarg" refType="primFontSz" fact="0.3"/>
+                <dgm:constr type="bMarg" refType="primFontSz" fact="0.3"/>
+              </dgm:constrLst>
+              <dgm:ruleLst>
+                <dgm:rule type="primFontSz" val="5" fact="NaN" max="NaN"/>
+              </dgm:ruleLst>
+            </dgm:layoutNode>
+          </dgm:if>
+          <dgm:else name="Name8">
+            <dgm:choose name="Name9">
+              <dgm:if name="Name10" axis="ch" ptType="node" func="cnt" op="equ" val="3">
+                <dgm:layoutNode name="ThreeNodes_1">
+                  <dgm:varLst>
+                    <dgm:bulletEnabled val="1"/>
+                  </dgm:varLst>
+                  <dgm:alg type="sp"/>
+                  <dgm:shape xmlns:r="http://schemas.openxmlformats.org/officeDocument/2006/relationships" type="roundRect" r:blip="">
+                    <dgm:adjLst>
+                      <dgm:adj idx="1" val="0.1"/>
+                    </dgm:adjLst>
+                  </dgm:shape>
+                  <dgm:presOf axis="ch desOrSelf" ptType="node node" st="1 1" cnt="1 0"/>
+                  <dgm:constrLst/>
+                  <dgm:ruleLst/>
+                </dgm:layoutNode>
+                <dgm:layoutNode name="ThreeNodes_2">
+                  <dgm:varLst>
+                    <dgm:bulletEnabled val="1"/>
+                  </dgm:varLst>
+                  <dgm:alg type="sp"/>
+                  <dgm:shape xmlns:r="http://schemas.openxmlformats.org/officeDocument/2006/relationships" type="roundRect" r:blip="">
+                    <dgm:adjLst>
+                      <dgm:adj idx="1" val="0.1"/>
+                    </dgm:adjLst>
+                  </dgm:shape>
+                  <dgm:presOf axis="ch desOrSelf" ptType="node node" st="2 1" cnt="1 0"/>
+                  <dgm:constrLst/>
+                  <dgm:ruleLst/>
+                </dgm:layoutNode>
+                <dgm:layoutNode name="ThreeNodes_3">
+                  <dgm:varLst>
+                    <dgm:bulletEnabled val="1"/>
+                  </dgm:varLst>
+                  <dgm:alg type="sp"/>
+                  <dgm:shape xmlns:r="http://schemas.openxmlformats.org/officeDocument/2006/relationships" type="roundRect" r:blip="">
+                    <dgm:adjLst>
+                      <dgm:adj idx="1" val="0.1"/>
+                    </dgm:adjLst>
+                  </dgm:shape>
+                  <dgm:presOf axis="ch desOrSelf" ptType="node node" st="3 1" cnt="1 0"/>
+                  <dgm:constrLst/>
+                  <dgm:ruleLst/>
+                </dgm:layoutNode>
+                <dgm:layoutNode name="ThreeConn_1-2" styleLbl="fgAccFollowNode1">
+                  <dgm:varLst>
+                    <dgm:bulletEnabled val="1"/>
+                  </dgm:varLst>
+                  <dgm:alg type="tx"/>
+                  <dgm:shape xmlns:r="http://schemas.openxmlformats.org/officeDocument/2006/relationships" type="downArrow" r:blip="">
+                    <dgm:adjLst>
+                      <dgm:adj idx="1" val="0.55"/>
+                      <dgm:adj idx="2" val="0.45"/>
+                    </dgm:adjLst>
+                  </dgm:shape>
+                  <dgm:presOf axis="ch" ptType="sibTrans" cnt="1"/>
+                  <dgm:constrLst>
+                    <dgm:constr type="lMarg" refType="primFontSz" fact="0.1"/>
+                    <dgm:constr type="rMarg" refType="primFontSz" fact="0.1"/>
+                    <dgm:constr type="tMarg" refType="primFontSz" fact="0.1"/>
+                    <dgm:constr type="bMarg" refType="primFontSz" fact="0.1"/>
+                  </dgm:constrLst>
+                  <dgm:ruleLst>
+                    <dgm:rule type="primFontSz" val="5" fact="NaN" max="NaN"/>
+                  </dgm:ruleLst>
+                </dgm:layoutNode>
+                <dgm:layoutNode name="ThreeConn_2-3" styleLbl="fgAccFollowNode1">
+                  <dgm:varLst>
+                    <dgm:bulletEnabled val="1"/>
+                  </dgm:varLst>
+                  <dgm:alg type="tx"/>
+                  <dgm:shape xmlns:r="http://schemas.openxmlformats.org/officeDocument/2006/relationships" type="downArrow" r:blip="">
+                    <dgm:adjLst>
+                      <dgm:adj idx="1" val="0.55"/>
+                      <dgm:adj idx="2" val="0.45"/>
+                    </dgm:adjLst>
+                  </dgm:shape>
+                  <dgm:presOf axis="ch" ptType="sibTrans" st="2" cnt="1"/>
+                  <dgm:constrLst>
+                    <dgm:constr type="lMarg" refType="primFontSz" fact="0.1"/>
+                    <dgm:constr type="rMarg" refType="primFontSz" fact="0.1"/>
+                    <dgm:constr type="tMarg" refType="primFontSz" fact="0.1"/>
+                    <dgm:constr type="bMarg" refType="primFontSz" fact="0.1"/>
+                  </dgm:constrLst>
+                  <dgm:ruleLst>
+                    <dgm:rule type="primFontSz" val="5" fact="NaN" max="NaN"/>
+                  </dgm:ruleLst>
+                </dgm:layoutNode>
+                <dgm:layoutNode name="ThreeNodes_1_text">
+                  <dgm:varLst>
+                    <dgm:bulletEnabled val="1"/>
+                  </dgm:varLst>
+                  <dgm:alg type="tx">
+                    <dgm:param type="parTxLTRAlign" val="l"/>
+                    <dgm:param type="txAnchorVertCh" val="mid"/>
+                  </dgm:alg>
+                  <dgm:shape xmlns:r="http://schemas.openxmlformats.org/officeDocument/2006/relationships" type="roundRect" r:blip="" hideGeom="1">
+                    <dgm:adjLst>
+                      <dgm:adj idx="1" val="0.1"/>
+                    </dgm:adjLst>
+                  </dgm:shape>
+                  <dgm:presOf axis="ch desOrSelf" ptType="node node" st="1 1" cnt="1 0"/>
+                  <dgm:constrLst>
+                    <dgm:constr type="lMarg" refType="primFontSz" fact="0.3"/>
+                    <dgm:constr type="rMarg" refType="primFontSz" fact="0.3"/>
+                    <dgm:constr type="tMarg" refType="primFontSz" fact="0.3"/>
+                    <dgm:constr type="bMarg" refType="primFontSz" fact="0.3"/>
+                  </dgm:constrLst>
+                  <dgm:ruleLst>
+                    <dgm:rule type="primFontSz" val="5" fact="NaN" max="NaN"/>
+                  </dgm:ruleLst>
+                </dgm:layoutNode>
+                <dgm:layoutNode name="ThreeNodes_2_text">
+                  <dgm:varLst>
+                    <dgm:bulletEnabled val="1"/>
+                  </dgm:varLst>
+                  <dgm:alg type="tx">
+                    <dgm:param type="parTxLTRAlign" val="l"/>
+                    <dgm:param type="txAnchorVertCh" val="mid"/>
+                  </dgm:alg>
+                  <dgm:shape xmlns:r="http://schemas.openxmlformats.org/officeDocument/2006/relationships" type="roundRect" r:blip="" hideGeom="1">
+                    <dgm:adjLst>
+                      <dgm:adj idx="1" val="0.1"/>
+                    </dgm:adjLst>
+                  </dgm:shape>
+                  <dgm:presOf axis="ch desOrSelf" ptType="node node" st="2 1" cnt="1 0"/>
+                  <dgm:constrLst>
+                    <dgm:constr type="lMarg" refType="primFontSz" fact="0.3"/>
+                    <dgm:constr type="rMarg" refType="primFontSz" fact="0.3"/>
+                    <dgm:constr type="tMarg" refType="primFontSz" fact="0.3"/>
+                    <dgm:constr type="bMarg" refType="primFontSz" fact="0.3"/>
+                  </dgm:constrLst>
+                  <dgm:ruleLst>
+                    <dgm:rule type="primFontSz" val="5" fact="NaN" max="NaN"/>
+                  </dgm:ruleLst>
+                </dgm:layoutNode>
+                <dgm:layoutNode name="ThreeNodes_3_text">
+                  <dgm:varLst>
+                    <dgm:bulletEnabled val="1"/>
+                  </dgm:varLst>
+                  <dgm:alg type="tx">
+                    <dgm:param type="parTxLTRAlign" val="l"/>
+                    <dgm:param type="txAnchorVertCh" val="mid"/>
+                  </dgm:alg>
+                  <dgm:shape xmlns:r="http://schemas.openxmlformats.org/officeDocument/2006/relationships" type="roundRect" r:blip="" hideGeom="1">
+                    <dgm:adjLst>
+                      <dgm:adj idx="1" val="0.1"/>
+                    </dgm:adjLst>
+                  </dgm:shape>
+                  <dgm:presOf axis="ch desOrSelf" ptType="node node" st="3 1" cnt="1 0"/>
+                  <dgm:constrLst>
+                    <dgm:constr type="lMarg" refType="primFontSz" fact="0.3"/>
+                    <dgm:constr type="rMarg" refType="primFontSz" fact="0.3"/>
+                    <dgm:constr type="tMarg" refType="primFontSz" fact="0.3"/>
+                    <dgm:constr type="bMarg" refType="primFontSz" fact="0.3"/>
+                  </dgm:constrLst>
+                  <dgm:ruleLst>
+                    <dgm:rule type="primFontSz" val="5" fact="NaN" max="NaN"/>
+                  </dgm:ruleLst>
+                </dgm:layoutNode>
+              </dgm:if>
+              <dgm:else name="Name11">
+                <dgm:choose name="Name12">
+                  <dgm:if name="Name13" axis="ch" ptType="node" func="cnt" op="equ" val="4">
+                    <dgm:layoutNode name="FourNodes_1">
+                      <dgm:varLst>
+                        <dgm:bulletEnabled val="1"/>
+                      </dgm:varLst>
+                      <dgm:alg type="sp"/>
+                      <dgm:shape xmlns:r="http://schemas.openxmlformats.org/officeDocument/2006/relationships" type="roundRect" r:blip="">
+                        <dgm:adjLst>
+                          <dgm:adj idx="1" val="0.1"/>
+                        </dgm:adjLst>
+                      </dgm:shape>
+                      <dgm:presOf axis="ch desOrSelf" ptType="node node" st="1 1" cnt="1 0"/>
+                      <dgm:constrLst/>
+                      <dgm:ruleLst/>
+                    </dgm:layoutNode>
+                    <dgm:layoutNode name="FourNodes_2">
+                      <dgm:varLst>
+                        <dgm:bulletEnabled val="1"/>
+                      </dgm:varLst>
+                      <dgm:alg type="sp"/>
+                      <dgm:shape xmlns:r="http://schemas.openxmlformats.org/officeDocument/2006/relationships" type="roundRect" r:blip="">
+                        <dgm:adjLst>
+                          <dgm:adj idx="1" val="0.1"/>
+                        </dgm:adjLst>
+                      </dgm:shape>
+                      <dgm:presOf axis="ch desOrSelf" ptType="node node" st="2 1" cnt="1 0"/>
+                      <dgm:constrLst/>
+                      <dgm:ruleLst/>
+                    </dgm:layoutNode>
+                    <dgm:layoutNode name="FourNodes_3">
+                      <dgm:varLst>
+                        <dgm:bulletEnabled val="1"/>
+                      </dgm:varLst>
+                      <dgm:alg type="sp"/>
+                      <dgm:shape xmlns:r="http://schemas.openxmlformats.org/officeDocument/2006/relationships" type="roundRect" r:blip="">
+                        <dgm:adjLst>
+                          <dgm:adj idx="1" val="0.1"/>
+                        </dgm:adjLst>
+                      </dgm:shape>
+                      <dgm:presOf axis="ch desOrSelf" ptType="node node" st="3 1" cnt="1 0"/>
+                      <dgm:constrLst/>
+                      <dgm:ruleLst/>
+                    </dgm:layoutNode>
+                    <dgm:layoutNode name="FourNodes_4">
+                      <dgm:varLst>
+                        <dgm:bulletEnabled val="1"/>
+                      </dgm:varLst>
+                      <dgm:alg type="sp"/>
+                      <dgm:shape xmlns:r="http://schemas.openxmlformats.org/officeDocument/2006/relationships" type="roundRect" r:blip="">
+                        <dgm:adjLst>
+                          <dgm:adj idx="1" val="0.1"/>
+                        </dgm:adjLst>
+                      </dgm:shape>
+                      <dgm:presOf axis="ch desOrSelf" ptType="node node" st="4 1" cnt="1 0"/>
+                      <dgm:constrLst/>
+                      <dgm:ruleLst/>
+                    </dgm:layoutNode>
+                    <dgm:layoutNode name="FourConn_1-2" styleLbl="fgAccFollowNode1">
+                      <dgm:varLst>
+                        <dgm:bulletEnabled val="1"/>
+                      </dgm:varLst>
+                      <dgm:alg type="tx"/>
+                      <dgm:shape xmlns:r="http://schemas.openxmlformats.org/officeDocument/2006/relationships" type="downArrow" r:blip="">
+                        <dgm:adjLst>
+                          <dgm:adj idx="1" val="0.55"/>
+                          <dgm:adj idx="2" val="0.45"/>
+                        </dgm:adjLst>
+                      </dgm:shape>
+                      <dgm:presOf axis="ch" ptType="sibTrans" cnt="1"/>
+                      <dgm:constrLst>
+                        <dgm:constr type="lMarg" refType="primFontSz" fact="0.1"/>
+                        <dgm:constr type="rMarg" refType="primFontSz" fact="0.1"/>
+                        <dgm:constr type="tMarg" refType="primFontSz" fact="0.1"/>
+                        <dgm:constr type="bMarg" refType="primFontSz" fact="0.1"/>
+                      </dgm:constrLst>
+                      <dgm:ruleLst>
+                        <dgm:rule type="primFontSz" val="5" fact="NaN" max="NaN"/>
+                      </dgm:ruleLst>
+                    </dgm:layoutNode>
+                    <dgm:layoutNode name="FourConn_2-3" styleLbl="fgAccFollowNode1">
+                      <dgm:varLst>
+                        <dgm:bulletEnabled val="1"/>
+                      </dgm:varLst>
+                      <dgm:alg type="tx"/>
+                      <dgm:shape xmlns:r="http://schemas.openxmlformats.org/officeDocument/2006/relationships" type="downArrow" r:blip="">
+                        <dgm:adjLst>
+                          <dgm:adj idx="1" val="0.55"/>
+                          <dgm:adj idx="2" val="0.45"/>
+                        </dgm:adjLst>
+                      </dgm:shape>
+                      <dgm:presOf axis="ch" ptType="sibTrans" st="2" cnt="1"/>
+                      <dgm:constrLst>
+                        <dgm:constr type="lMarg" refType="primFontSz" fact="0.1"/>
+                        <dgm:constr type="rMarg" refType="primFontSz" fact="0.1"/>
+                        <dgm:constr type="tMarg" refType="primFontSz" fact="0.1"/>
+                        <dgm:constr type="bMarg" refType="primFontSz" fact="0.1"/>
+                      </dgm:constrLst>
+                      <dgm:ruleLst>
+                        <dgm:rule type="primFontSz" val="5" fact="NaN" max="NaN"/>
+                      </dgm:ruleLst>
+                    </dgm:layoutNode>
+                    <dgm:layoutNode name="FourConn_3-4" styleLbl="fgAccFollowNode1">
+                      <dgm:varLst>
+                        <dgm:bulletEnabled val="1"/>
+                      </dgm:varLst>
+                      <dgm:alg type="tx"/>
+                      <dgm:shape xmlns:r="http://schemas.openxmlformats.org/officeDocument/2006/relationships" type="downArrow" r:blip="">
+                        <dgm:adjLst>
+                          <dgm:adj idx="1" val="0.55"/>
+                          <dgm:adj idx="2" val="0.45"/>
+                        </dgm:adjLst>
+                      </dgm:shape>
+                      <dgm:presOf axis="ch" ptType="sibTrans" st="3" cnt="1"/>
+                      <dgm:constrLst>
+                        <dgm:constr type="lMarg" refType="primFontSz" fact="0.1"/>
+                        <dgm:constr type="rMarg" refType="primFontSz" fact="0.1"/>
+                        <dgm:constr type="tMarg" refType="primFontSz" fact="0.1"/>
+                        <dgm:constr type="bMarg" refType="primFontSz" fact="0.1"/>
+                      </dgm:constrLst>
+                      <dgm:ruleLst>
+                        <dgm:rule type="primFontSz" val="5" fact="NaN" max="NaN"/>
+                      </dgm:ruleLst>
+                    </dgm:layoutNode>
+                    <dgm:layoutNode name="FourNodes_1_text">
+                      <dgm:varLst>
+                        <dgm:bulletEnabled val="1"/>
+                      </dgm:varLst>
+                      <dgm:alg type="tx">
+                        <dgm:param type="parTxLTRAlign" val="l"/>
+                        <dgm:param type="txAnchorVertCh" val="mid"/>
+                      </dgm:alg>
+                      <dgm:shape xmlns:r="http://schemas.openxmlformats.org/officeDocument/2006/relationships" type="roundRect" r:blip="" hideGeom="1">
+                        <dgm:adjLst>
+                          <dgm:adj idx="1" val="0.1"/>
+                        </dgm:adjLst>
+                      </dgm:shape>
+                      <dgm:presOf axis="ch desOrSelf" ptType="node node" st="1 1" cnt="1 0"/>
+                      <dgm:constrLst>
+                        <dgm:constr type="lMarg" refType="primFontSz" fact="0.3"/>
+                        <dgm:constr type="rMarg" refType="primFontSz" fact="0.3"/>
+                        <dgm:constr type="tMarg" refType="primFontSz" fact="0.3"/>
+                        <dgm:constr type="bMarg" refType="primFontSz" fact="0.3"/>
+                      </dgm:constrLst>
+                      <dgm:ruleLst>
+                        <dgm:rule type="primFontSz" val="5" fact="NaN" max="NaN"/>
+                      </dgm:ruleLst>
+                    </dgm:layoutNode>
+                    <dgm:layoutNode name="FourNodes_2_text">
+                      <dgm:varLst>
+                        <dgm:bulletEnabled val="1"/>
+                      </dgm:varLst>
+                      <dgm:alg type="tx">
+                        <dgm:param type="parTxLTRAlign" val="l"/>
+                        <dgm:param type="txAnchorVertCh" val="mid"/>
+                      </dgm:alg>
+                      <dgm:shape xmlns:r="http://schemas.openxmlformats.org/officeDocument/2006/relationships" type="roundRect" r:blip="" hideGeom="1">
+                        <dgm:adjLst>
+                          <dgm:adj idx="1" val="0.1"/>
+                        </dgm:adjLst>
+                      </dgm:shape>
+                      <dgm:presOf axis="ch desOrSelf" ptType="node node" st="2 1" cnt="1 0"/>
+                      <dgm:constrLst>
+                        <dgm:constr type="lMarg" refType="primFontSz" fact="0.3"/>
+                        <dgm:constr type="rMarg" refType="primFontSz" fact="0.3"/>
+                        <dgm:constr type="tMarg" refType="primFontSz" fact="0.3"/>
+                        <dgm:constr type="bMarg" refType="primFontSz" fact="0.3"/>
+                      </dgm:constrLst>
+                      <dgm:ruleLst>
+                        <dgm:rule type="primFontSz" val="5" fact="NaN" max="NaN"/>
+                      </dgm:ruleLst>
+                    </dgm:layoutNode>
+                    <dgm:layoutNode name="FourNodes_3_text">
+                      <dgm:varLst>
+                        <dgm:bulletEnabled val="1"/>
+                      </dgm:varLst>
+                      <dgm:alg type="tx">
+                        <dgm:param type="parTxLTRAlign" val="l"/>
+                        <dgm:param type="txAnchorVertCh" val="mid"/>
+                      </dgm:alg>
+                      <dgm:shape xmlns:r="http://schemas.openxmlformats.org/officeDocument/2006/relationships" type="roundRect" r:blip="" hideGeom="1">
+                        <dgm:adjLst>
+                          <dgm:adj idx="1" val="0.1"/>
+                        </dgm:adjLst>
+                      </dgm:shape>
+                      <dgm:presOf axis="ch desOrSelf" ptType="node node" st="3 1" cnt="1 0"/>
+                      <dgm:constrLst>
+                        <dgm:constr type="lMarg" refType="primFontSz" fact="0.3"/>
+                        <dgm:constr type="rMarg" refType="primFontSz" fact="0.3"/>
+                        <dgm:constr type="tMarg" refType="primFontSz" fact="0.3"/>
+                        <dgm:constr type="bMarg" refType="primFontSz" fact="0.3"/>
+                      </dgm:constrLst>
+                      <dgm:ruleLst>
+                        <dgm:rule type="primFontSz" val="5" fact="NaN" max="NaN"/>
+                      </dgm:ruleLst>
+                    </dgm:layoutNode>
+                    <dgm:layoutNode name="FourNodes_4_text">
+                      <dgm:varLst>
+                        <dgm:bulletEnabled val="1"/>
+                      </dgm:varLst>
+                      <dgm:alg type="tx">
+                        <dgm:param type="parTxLTRAlign" val="l"/>
+                        <dgm:param type="txAnchorVertCh" val="mid"/>
+                      </dgm:alg>
+                      <dgm:shape xmlns:r="http://schemas.openxmlformats.org/officeDocument/2006/relationships" type="roundRect" r:blip="" hideGeom="1">
+                        <dgm:adjLst>
+                          <dgm:adj idx="1" val="0.1"/>
+                        </dgm:adjLst>
+                      </dgm:shape>
+                      <dgm:presOf axis="ch desOrSelf" ptType="node node" st="4 1" cnt="1 0"/>
+                      <dgm:constrLst>
+                        <dgm:constr type="lMarg" refType="primFontSz" fact="0.3"/>
+                        <dgm:constr type="rMarg" refType="primFontSz" fact="0.3"/>
+                        <dgm:constr type="tMarg" refType="primFontSz" fact="0.3"/>
+                        <dgm:constr type="bMarg" refType="primFontSz" fact="0.3"/>
+                      </dgm:constrLst>
+                      <dgm:ruleLst>
+                        <dgm:rule type="primFontSz" val="5" fact="NaN" max="NaN"/>
+                      </dgm:ruleLst>
+                    </dgm:layoutNode>
+                  </dgm:if>
+                  <dgm:else name="Name14">
+                    <dgm:choose name="Name15">
+                      <dgm:if name="Name16" axis="ch" ptType="node" func="cnt" op="gte" val="5">
+                        <dgm:layoutNode name="FiveNodes_1">
+                          <dgm:varLst>
+                            <dgm:bulletEnabled val="1"/>
+                          </dgm:varLst>
+                          <dgm:alg type="sp"/>
+                          <dgm:shape xmlns:r="http://schemas.openxmlformats.org/officeDocument/2006/relationships" type="roundRect" r:blip="">
+                            <dgm:adjLst>
+                              <dgm:adj idx="1" val="0.1"/>
+                            </dgm:adjLst>
+                          </dgm:shape>
+                          <dgm:presOf axis="ch desOrSelf" ptType="node node" st="1 1" cnt="1 0"/>
+                          <dgm:constrLst/>
+                          <dgm:ruleLst/>
+                        </dgm:layoutNode>
+                        <dgm:layoutNode name="FiveNodes_2">
+                          <dgm:varLst>
+                            <dgm:bulletEnabled val="1"/>
+                          </dgm:varLst>
+                          <dgm:alg type="sp"/>
+                          <dgm:shape xmlns:r="http://schemas.openxmlformats.org/officeDocument/2006/relationships" type="roundRect" r:blip="">
+                            <dgm:adjLst>
+                              <dgm:adj idx="1" val="0.1"/>
+                            </dgm:adjLst>
+                          </dgm:shape>
+                          <dgm:presOf axis="ch desOrSelf" ptType="node node" st="2 1" cnt="1 0"/>
+                          <dgm:constrLst/>
+                          <dgm:ruleLst/>
+                        </dgm:layoutNode>
+                        <dgm:layoutNode name="FiveNodes_3">
+                          <dgm:varLst>
+                            <dgm:bulletEnabled val="1"/>
+                          </dgm:varLst>
+                          <dgm:alg type="sp"/>
+                          <dgm:shape xmlns:r="http://schemas.openxmlformats.org/officeDocument/2006/relationships" type="roundRect" r:blip="">
+                            <dgm:adjLst>
+                              <dgm:adj idx="1" val="0.1"/>
+                            </dgm:adjLst>
+                          </dgm:shape>
+                          <dgm:presOf axis="ch desOrSelf" ptType="node node" st="3 1" cnt="1 0"/>
+                          <dgm:constrLst/>
+                          <dgm:ruleLst/>
+                        </dgm:layoutNode>
+                        <dgm:layoutNode name="FiveNodes_4">
+                          <dgm:varLst>
+                            <dgm:bulletEnabled val="1"/>
+                          </dgm:varLst>
+                          <dgm:alg type="sp"/>
+                          <dgm:shape xmlns:r="http://schemas.openxmlformats.org/officeDocument/2006/relationships" type="roundRect" r:blip="">
+                            <dgm:adjLst>
+                              <dgm:adj idx="1" val="0.1"/>
+                            </dgm:adjLst>
+                          </dgm:shape>
+                          <dgm:presOf axis="ch desOrSelf" ptType="node node" st="4 1" cnt="1 0"/>
+                          <dgm:constrLst/>
+                          <dgm:ruleLst/>
+                        </dgm:layoutNode>
+                        <dgm:layoutNode name="FiveNodes_5">
+                          <dgm:varLst>
+                            <dgm:bulletEnabled val="1"/>
+                          </dgm:varLst>
+                          <dgm:alg type="sp"/>
+                          <dgm:shape xmlns:r="http://schemas.openxmlformats.org/officeDocument/2006/relationships" type="roundRect" r:blip="">
+                            <dgm:adjLst>
+                              <dgm:adj idx="1" val="0.1"/>
+                            </dgm:adjLst>
+                          </dgm:shape>
+                          <dgm:presOf axis="ch desOrSelf" ptType="node node" st="5 1" cnt="1 0"/>
+                          <dgm:constrLst/>
+                          <dgm:ruleLst/>
+                        </dgm:layoutNode>
+                        <dgm:layoutNode name="FiveConn_1-2" styleLbl="fgAccFollowNode1">
+                          <dgm:varLst>
+                            <dgm:bulletEnabled val="1"/>
+                          </dgm:varLst>
+                          <dgm:alg type="tx"/>
+                          <dgm:shape xmlns:r="http://schemas.openxmlformats.org/officeDocument/2006/relationships" type="downArrow" r:blip="">
+                            <dgm:adjLst>
+                              <dgm:adj idx="1" val="0.55"/>
+                              <dgm:adj idx="2" val="0.45"/>
+                            </dgm:adjLst>
+                          </dgm:shape>
+                          <dgm:presOf axis="ch" ptType="sibTrans" cnt="1"/>
+                          <dgm:constrLst>
+                            <dgm:constr type="lMarg" refType="primFontSz" fact="0.1"/>
+                            <dgm:constr type="rMarg" refType="primFontSz" fact="0.1"/>
+                            <dgm:constr type="tMarg" refType="primFontSz" fact="0.1"/>
+                            <dgm:constr type="bMarg" refType="primFontSz" fact="0.1"/>
+                          </dgm:constrLst>
+                          <dgm:ruleLst>
+                            <dgm:rule type="primFontSz" val="5" fact="NaN" max="NaN"/>
+                          </dgm:ruleLst>
+                        </dgm:layoutNode>
+                        <dgm:layoutNode name="FiveConn_2-3" styleLbl="fgAccFollowNode1">
+                          <dgm:varLst>
+                            <dgm:bulletEnabled val="1"/>
+                          </dgm:varLst>
+                          <dgm:alg type="tx"/>
+                          <dgm:shape xmlns:r="http://schemas.openxmlformats.org/officeDocument/2006/relationships" type="downArrow" r:blip="">
+                            <dgm:adjLst>
+                              <dgm:adj idx="1" val="0.55"/>
+                              <dgm:adj idx="2" val="0.45"/>
+                            </dgm:adjLst>
+                          </dgm:shape>
+                          <dgm:presOf axis="ch" ptType="sibTrans" st="2" cnt="1"/>
+                          <dgm:constrLst>
+                            <dgm:constr type="lMarg" refType="primFontSz" fact="0.1"/>
+                            <dgm:constr type="rMarg" refType="primFontSz" fact="0.1"/>
+                            <dgm:constr type="tMarg" refType="primFontSz" fact="0.1"/>
+                            <dgm:constr type="bMarg" refType="primFontSz" fact="0.1"/>
+                          </dgm:constrLst>
+                          <dgm:ruleLst>
+                            <dgm:rule type="primFontSz" val="5" fact="NaN" max="NaN"/>
+                          </dgm:ruleLst>
+                        </dgm:layoutNode>
+                        <dgm:layoutNode name="FiveConn_3-4" styleLbl="fgAccFollowNode1">
+                          <dgm:varLst>
+                            <dgm:bulletEnabled val="1"/>
+                          </dgm:varLst>
+                          <dgm:alg type="tx"/>
+                          <dgm:shape xmlns:r="http://schemas.openxmlformats.org/officeDocument/2006/relationships" type="downArrow" r:blip="">
+                            <dgm:adjLst>
+                              <dgm:adj idx="1" val="0.55"/>
+                              <dgm:adj idx="2" val="0.45"/>
+                            </dgm:adjLst>
+                          </dgm:shape>
+                          <dgm:presOf axis="ch" ptType="sibTrans" st="3" cnt="1"/>
+                          <dgm:constrLst>
+                            <dgm:constr type="lMarg" refType="primFontSz" fact="0.1"/>
+                            <dgm:constr type="rMarg" refType="primFontSz" fact="0.1"/>
+                            <dgm:constr type="tMarg" refType="primFontSz" fact="0.1"/>
+                            <dgm:constr type="bMarg" refType="primFontSz" fact="0.1"/>
+                          </dgm:constrLst>
+                          <dgm:ruleLst>
+                            <dgm:rule type="primFontSz" val="5" fact="NaN" max="NaN"/>
+                          </dgm:ruleLst>
+                        </dgm:layoutNode>
+                        <dgm:layoutNode name="FiveConn_4-5" styleLbl="fgAccFollowNode1">
+                          <dgm:varLst>
+                            <dgm:bulletEnabled val="1"/>
+                          </dgm:varLst>
+                          <dgm:alg type="tx"/>
+                          <dgm:shape xmlns:r="http://schemas.openxmlformats.org/officeDocument/2006/relationships" type="downArrow" r:blip="">
+                            <dgm:adjLst>
+                              <dgm:adj idx="1" val="0.55"/>
+                              <dgm:adj idx="2" val="0.45"/>
+                            </dgm:adjLst>
+                          </dgm:shape>
+                          <dgm:presOf axis="ch" ptType="sibTrans" st="4" cnt="1"/>
+                          <dgm:constrLst>
+                            <dgm:constr type="lMarg" refType="primFontSz" fact="0.1"/>
+                            <dgm:constr type="rMarg" refType="primFontSz" fact="0.1"/>
+                            <dgm:constr type="tMarg" refType="primFontSz" fact="0.1"/>
+                            <dgm:constr type="bMarg" refType="primFontSz" fact="0.1"/>
+                          </dgm:constrLst>
+                          <dgm:ruleLst>
+                            <dgm:rule type="primFontSz" val="5" fact="NaN" max="NaN"/>
+                          </dgm:ruleLst>
+                        </dgm:layoutNode>
+                        <dgm:layoutNode name="FiveNodes_1_text">
+                          <dgm:varLst>
+                            <dgm:bulletEnabled val="1"/>
+                          </dgm:varLst>
+                          <dgm:alg type="tx">
+                            <dgm:param type="parTxLTRAlign" val="l"/>
+                            <dgm:param type="txAnchorVertCh" val="mid"/>
+                          </dgm:alg>
+                          <dgm:shape xmlns:r="http://schemas.openxmlformats.org/officeDocument/2006/relationships" type="roundRect" r:blip="" hideGeom="1">
+                            <dgm:adjLst>
+                              <dgm:adj idx="1" val="0.1"/>
+                            </dgm:adjLst>
+                          </dgm:shape>
+                          <dgm:presOf axis="ch desOrSelf" ptType="node node" st="1 1" cnt="1 0"/>
+                          <dgm:constrLst>
+                            <dgm:constr type="lMarg" refType="primFontSz" fact="0.3"/>
+                            <dgm:constr type="rMarg" refType="primFontSz" fact="0.3"/>
+                            <dgm:constr type="tMarg" refType="primFontSz" fact="0.3"/>
+                            <dgm:constr type="bMarg" refType="primFontSz" fact="0.3"/>
+                          </dgm:constrLst>
+                          <dgm:ruleLst>
+                            <dgm:rule type="primFontSz" val="5" fact="NaN" max="NaN"/>
+                          </dgm:ruleLst>
+                        </dgm:layoutNode>
+                        <dgm:layoutNode name="FiveNodes_2_text">
+                          <dgm:varLst>
+                            <dgm:bulletEnabled val="1"/>
+                          </dgm:varLst>
+                          <dgm:alg type="tx">
+                            <dgm:param type="parTxLTRAlign" val="l"/>
+                            <dgm:param type="txAnchorVertCh" val="mid"/>
+                          </dgm:alg>
+                          <dgm:shape xmlns:r="http://schemas.openxmlformats.org/officeDocument/2006/relationships" type="roundRect" r:blip="" hideGeom="1">
+                            <dgm:adjLst>
+                              <dgm:adj idx="1" val="0.1"/>
+                            </dgm:adjLst>
+                          </dgm:shape>
+                          <dgm:presOf axis="ch desOrSelf" ptType="node node" st="2 1" cnt="1 0"/>
+                          <dgm:constrLst>
+                            <dgm:constr type="lMarg" refType="primFontSz" fact="0.3"/>
+                            <dgm:constr type="rMarg" refType="primFontSz" fact="0.3"/>
+                            <dgm:constr type="tMarg" refType="primFontSz" fact="0.3"/>
+                            <dgm:constr type="bMarg" refType="primFontSz" fact="0.3"/>
+                          </dgm:constrLst>
+                          <dgm:ruleLst>
+                            <dgm:rule type="primFontSz" val="5" fact="NaN" max="NaN"/>
+                          </dgm:ruleLst>
+                        </dgm:layoutNode>
+                        <dgm:layoutNode name="FiveNodes_3_text">
+                          <dgm:varLst>
+                            <dgm:bulletEnabled val="1"/>
+                          </dgm:varLst>
+                          <dgm:alg type="tx">
+                            <dgm:param type="parTxLTRAlign" val="l"/>
+                            <dgm:param type="txAnchorVertCh" val="mid"/>
+                          </dgm:alg>
+                          <dgm:shape xmlns:r="http://schemas.openxmlformats.org/officeDocument/2006/relationships" type="roundRect" r:blip="" hideGeom="1">
+                            <dgm:adjLst>
+                              <dgm:adj idx="1" val="0.1"/>
+                            </dgm:adjLst>
+                          </dgm:shape>
+                          <dgm:presOf axis="ch desOrSelf" ptType="node node" st="3 1" cnt="1 0"/>
+                          <dgm:constrLst>
+                            <dgm:constr type="lMarg" refType="primFontSz" fact="0.3"/>
+                            <dgm:constr type="rMarg" refType="primFontSz" fact="0.3"/>
+                            <dgm:constr type="tMarg" refType="primFontSz" fact="0.3"/>
+                            <dgm:constr type="bMarg" refType="primFontSz" fact="0.3"/>
+                          </dgm:constrLst>
+                          <dgm:ruleLst>
+                            <dgm:rule type="primFontSz" val="5" fact="NaN" max="NaN"/>
+                          </dgm:ruleLst>
+                        </dgm:layoutNode>
+                        <dgm:layoutNode name="FiveNodes_4_text">
+                          <dgm:varLst>
+                            <dgm:bulletEnabled val="1"/>
+                          </dgm:varLst>
+                          <dgm:alg type="tx">
+                            <dgm:param type="parTxLTRAlign" val="l"/>
+                            <dgm:param type="txAnchorVertCh" val="mid"/>
+                          </dgm:alg>
+                          <dgm:shape xmlns:r="http://schemas.openxmlformats.org/officeDocument/2006/relationships" type="roundRect" r:blip="" hideGeom="1">
+                            <dgm:adjLst>
+                              <dgm:adj idx="1" val="0.1"/>
+                            </dgm:adjLst>
+                          </dgm:shape>
+                          <dgm:presOf axis="ch desOrSelf" ptType="node node" st="4 1" cnt="1 0"/>
+                          <dgm:constrLst>
+                            <dgm:constr type="lMarg" refType="primFontSz" fact="0.3"/>
+                            <dgm:constr type="rMarg" refType="primFontSz" fact="0.3"/>
+                            <dgm:constr type="tMarg" refType="primFontSz" fact="0.3"/>
+                            <dgm:constr type="bMarg" refType="primFontSz" fact="0.3"/>
+                          </dgm:constrLst>
+                          <dgm:ruleLst>
+                            <dgm:rule type="primFontSz" val="5" fact="NaN" max="NaN"/>
+                          </dgm:ruleLst>
+                        </dgm:layoutNode>
+                        <dgm:layoutNode name="FiveNodes_5_text">
+                          <dgm:varLst>
+                            <dgm:bulletEnabled val="1"/>
+                          </dgm:varLst>
+                          <dgm:alg type="tx">
+                            <dgm:param type="parTxLTRAlign" val="l"/>
+                            <dgm:param type="txAnchorVertCh" val="mid"/>
+                          </dgm:alg>
+                          <dgm:shape xmlns:r="http://schemas.openxmlformats.org/officeDocument/2006/relationships" type="roundRect" r:blip="" hideGeom="1">
+                            <dgm:adjLst>
+                              <dgm:adj idx="1" val="0.1"/>
+                            </dgm:adjLst>
+                          </dgm:shape>
+                          <dgm:presOf axis="ch desOrSelf" ptType="node node" st="5 1" cnt="1 0"/>
+                          <dgm:constrLst>
+                            <dgm:constr type="lMarg" refType="primFontSz" fact="0.3"/>
+                            <dgm:constr type="rMarg" refType="primFontSz" fact="0.3"/>
+                            <dgm:constr type="tMarg" refType="primFontSz" fact="0.3"/>
+                            <dgm:constr type="bMarg" refType="primFontSz" fact="0.3"/>
+                          </dgm:constrLst>
+                          <dgm:ruleLst>
+                            <dgm:rule type="primFontSz" val="5" fact="NaN" max="NaN"/>
+                          </dgm:ruleLst>
+                        </dgm:layoutNode>
+                      </dgm:if>
+                      <dgm:else name="Name17"/>
+                    </dgm:choose>
+                  </dgm:else>
+                </dgm:choose>
+              </dgm:else>
+            </dgm:choose>
+          </dgm:else>
+        </dgm:choose>
+      </dgm:else>
+    </dgm:choose>
+  </dgm:layoutNode>
+</dgm:layoutDef>
+</file>
+
+<file path=ppt/diagrams/quickStyle1.xml><?xml version="1.0" encoding="utf-8"?>
+<dgm:styleDef xmlns:dgm="http://schemas.openxmlformats.org/drawingml/2006/diagram" xmlns:a="http://schemas.openxmlformats.org/drawingml/2006/main" uniqueId="urn:microsoft.com/office/officeart/2005/8/quickstyle/simple1">
+  <dgm:title val=""/>
+  <dgm:desc val=""/>
+  <dgm:catLst>
+    <dgm:cat type="simple" pri="10100"/>
+  </dgm:catLst>
+  <dgm:scene3d>
+    <a:camera prst="orthographicFront"/>
+    <a:lightRig rig="threePt" dir="t"/>
+  </dgm:scene3d>
+  <dgm:styleLbl name="node0">
+    <dgm:scene3d>
+      <a:camera prst="orthographicFront"/>
+      <a:lightRig rig="threePt" dir="t"/>
+    </dgm:scene3d>
+    <dgm:sp3d/>
+    <dgm:txPr/>
+    <dgm:style>
+      <a:lnRef idx="2">
+        <a:scrgbClr r="0" g="0" b="0"/>
+      </a:lnRef>
+      <a:fillRef idx="1">
+        <a:scrgbClr r="0" g="0" b="0"/>
+      </a:fillRef>
+      <a:effectRef idx="0">
+        <a:scrgbClr r="0" g="0" b="0"/>
+      </a:effectRef>
+      <a:fontRef idx="minor">
+        <a:schemeClr val="lt1"/>
+      </a:fontRef>
+    </dgm:style>
+  </dgm:styleLbl>
+  <dgm:styleLbl name="lnNode1">
+    <dgm:scene3d>
+      <a:camera prst="orthographicFront"/>
+      <a:lightRig rig="threePt" dir="t"/>
+    </dgm:scene3d>
+    <dgm:sp3d/>
+    <dgm:txPr/>
+    <dgm:style>
+      <a:lnRef idx="2">
+        <a:scrgbClr r="0" g="0" b="0"/>
+      </a:lnRef>
+      <a:fillRef idx="1">
+        <a:scrgbClr r="0" g="0" b="0"/>
+      </a:fillRef>
+      <a:effectRef idx="0">
+        <a:scrgbClr r="0" g="0" b="0"/>
+      </a:effectRef>
+      <a:fontRef idx="minor">
+        <a:schemeClr val="lt1"/>
+      </a:fontRef>
+    </dgm:style>
+  </dgm:styleLbl>
+  <dgm:styleLbl name="vennNode1">
+    <dgm:scene3d>
+      <a:camera prst="orthographicFront"/>
+      <a:lightRig rig="threePt" dir="t"/>
+    </dgm:scene3d>
+    <dgm:sp3d/>
+    <dgm:txPr/>
+    <dgm:style>
+      <a:lnRef idx="2">
+        <a:scrgbClr r="0" g="0" b="0"/>
+      </a:lnRef>
+      <a:fillRef idx="1">
+        <a:scrgbClr r="0" g="0" b="0"/>
+      </a:fillRef>
+      <a:effectRef idx="0">
+        <a:scrgbClr r="0" g="0" b="0"/>
+      </a:effectRef>
+      <a:fontRef idx="minor">
+        <a:schemeClr val="tx1"/>
+      </a:fontRef>
+    </dgm:style>
+  </dgm:styleLbl>
+  <dgm:styleLbl name="alignNode1">
+    <dgm:scene3d>
+      <a:camera prst="orthographicFront"/>
+      <a:lightRig rig="threePt" dir="t"/>
+    </dgm:scene3d>
+    <dgm:sp3d/>
+    <dgm:txPr/>
+    <dgm:style>
+      <a:lnRef idx="2">
+        <a:scrgbClr r="0" g="0" b="0"/>
+      </a:lnRef>
+      <a:fillRef idx="1">
+        <a:scrgbClr r="0" g="0" b="0"/>
+      </a:fillRef>
+      <a:effectRef idx="0">
+        <a:scrgbClr r="0" g="0" b="0"/>
+      </a:effectRef>
+      <a:fontRef idx="minor">
+        <a:schemeClr val="lt1"/>
+      </a:fontRef>
+    </dgm:style>
+  </dgm:styleLbl>
+  <dgm:styleLbl name="node1">
+    <dgm:scene3d>
+      <a:camera prst="orthographicFront"/>
+      <a:lightRig rig="threePt" dir="t"/>
+    </dgm:scene3d>
+    <dgm:sp3d/>
+    <dgm:txPr/>
+    <dgm:style>
+      <a:lnRef idx="2">
+        <a:scrgbClr r="0" g="0" b="0"/>
+      </a:lnRef>
+      <a:fillRef idx="1">
+        <a:scrgbClr r="0" g="0" b="0"/>
+      </a:fillRef>
+      <a:effectRef idx="0">
+        <a:scrgbClr r="0" g="0" b="0"/>
+      </a:effectRef>
+      <a:fontRef idx="minor">
+        <a:schemeClr val="lt1"/>
+      </a:fontRef>
+    </dgm:style>
+  </dgm:styleLbl>
+  <dgm:styleLbl name="node2">
+    <dgm:scene3d>
+      <a:camera prst="orthographicFront"/>
+      <a:lightRig rig="threePt" dir="t"/>
+    </dgm:scene3d>
+    <dgm:sp3d/>
+    <dgm:txPr/>
+    <dgm:style>
+      <a:lnRef idx="2">
+        <a:scrgbClr r="0" g="0" b="0"/>
+      </a:lnRef>
+      <a:fillRef idx="1">
+        <a:scrgbClr r="0" g="0" b="0"/>
+      </a:fillRef>
+      <a:effectRef idx="0">
+        <a:scrgbClr r="0" g="0" b="0"/>
+      </a:effectRef>
+      <a:fontRef idx="minor">
+        <a:schemeClr val="lt1"/>
+      </a:fontRef>
+    </dgm:style>
+  </dgm:styleLbl>
+  <dgm:styleLbl name="node3">
+    <dgm:scene3d>
+      <a:camera prst="orthographicFront"/>
+      <a:lightRig rig="threePt" dir="t"/>
+    </dgm:scene3d>
+    <dgm:sp3d/>
+    <dgm:txPr/>
+    <dgm:style>
+      <a:lnRef idx="2">
+        <a:scrgbClr r="0" g="0" b="0"/>
+      </a:lnRef>
+      <a:fillRef idx="1">
+        <a:scrgbClr r="0" g="0" b="0"/>
+      </a:fillRef>
+      <a:effectRef idx="0">
+        <a:scrgbClr r="0" g="0" b="0"/>
+      </a:effectRef>
+      <a:fontRef idx="minor">
+        <a:schemeClr val="lt1"/>
+      </a:fontRef>
+    </dgm:style>
+  </dgm:styleLbl>
+  <dgm:styleLbl name="node4">
+    <dgm:scene3d>
+      <a:camera prst="orthographicFront"/>
+      <a:lightRig rig="threePt" dir="t"/>
+    </dgm:scene3d>
+    <dgm:sp3d/>
+    <dgm:txPr/>
+    <dgm:style>
+      <a:lnRef idx="2">
+        <a:scrgbClr r="0" g="0" b="0"/>
+      </a:lnRef>
+      <a:fillRef idx="1">
+        <a:scrgbClr r="0" g="0" b="0"/>
+      </a:fillRef>
+      <a:effectRef idx="0">
+        <a:scrgbClr r="0" g="0" b="0"/>
+      </a:effectRef>
+      <a:fontRef idx="minor">
+        <a:schemeClr val="lt1"/>
+      </a:fontRef>
+    </dgm:style>
+  </dgm:styleLbl>
+  <dgm:styleLbl name="fgImgPlace1">
+    <dgm:scene3d>
+      <a:camera prst="orthographicFront"/>
+      <a:lightRig rig="threePt" dir="t"/>
+    </dgm:scene3d>
+    <dgm:sp3d/>
+    <dgm:txPr/>
+    <dgm:style>
+      <a:lnRef idx="2">
+        <a:scrgbClr r="0" g="0" b="0"/>
+      </a:lnRef>
+      <a:fillRef idx="1">
+        <a:scrgbClr r="0" g="0" b="0"/>
+      </a:fillRef>
+      <a:effectRef idx="0">
+        <a:scrgbClr r="0" g="0" b="0"/>
+      </a:effectRef>
+      <a:fontRef idx="minor"/>
+    </dgm:style>
+  </dgm:styleLbl>
+  <dgm:styleLbl name="alignImgPlace1">
+    <dgm:scene3d>
+      <a:camera prst="orthographicFront"/>
+      <a:lightRig rig="threePt" dir="t"/>
+    </dgm:scene3d>
+    <dgm:sp3d/>
+    <dgm:txPr/>
+    <dgm:style>
+      <a:lnRef idx="2">
+        <a:scrgbClr r="0" g="0" b="0"/>
+      </a:lnRef>
+      <a:fillRef idx="1">
+        <a:scrgbClr r="0" g="0" b="0"/>
+      </a:fillRef>
+      <a:effectRef idx="0">
+        <a:scrgbClr r="0" g="0" b="0"/>
+      </a:effectRef>
+      <a:fontRef idx="minor"/>
+    </dgm:style>
+  </dgm:styleLbl>
+  <dgm:styleLbl name="bgImgPlace1">
+    <dgm:scene3d>
+      <a:camera prst="orthographicFront"/>
+      <a:lightRig rig="threePt" dir="t"/>
+    </dgm:scene3d>
+    <dgm:sp3d/>
+    <dgm:txPr/>
+    <dgm:style>
+      <a:lnRef idx="2">
+        <a:scrgbClr r="0" g="0" b="0"/>
+      </a:lnRef>
+      <a:fillRef idx="1">
+        <a:scrgbClr r="0" g="0" b="0"/>
+      </a:fillRef>
+      <a:effectRef idx="0">
+        <a:scrgbClr r="0" g="0" b="0"/>
+      </a:effectRef>
+      <a:fontRef idx="minor"/>
+    </dgm:style>
+  </dgm:styleLbl>
+  <dgm:styleLbl name="sibTrans2D1">
+    <dgm:scene3d>
+      <a:camera prst="orthographicFront"/>
+      <a:lightRig rig="threePt" dir="t"/>
+    </dgm:scene3d>
+    <dgm:sp3d/>
+    <dgm:txPr/>
+    <dgm:style>
+      <a:lnRef idx="0">
+        <a:scrgbClr r="0" g="0" b="0"/>
+      </a:lnRef>
+      <a:fillRef idx="1">
+        <a:scrgbClr r="0" g="0" b="0"/>
+      </a:fillRef>
+      <a:effectRef idx="0">
+        <a:scrgbClr r="0" g="0" b="0"/>
+      </a:effectRef>
+      <a:fontRef idx="minor">
+        <a:schemeClr val="lt1"/>
+      </a:fontRef>
+    </dgm:style>
+  </dgm:styleLbl>
+  <dgm:styleLbl name="fgSibTrans2D1">
+    <dgm:scene3d>
+      <a:camera prst="orthographicFront"/>
+      <a:lightRig rig="threePt" dir="t"/>
+    </dgm:scene3d>
+    <dgm:sp3d/>
+    <dgm:txPr/>
+    <dgm:style>
+      <a:lnRef idx="0">
+        <a:scrgbClr r="0" g="0" b="0"/>
+      </a:lnRef>
+      <a:fillRef idx="1">
+        <a:scrgbClr r="0" g="0" b="0"/>
+      </a:fillRef>
+      <a:effectRef idx="0">
+        <a:scrgbClr r="0" g="0" b="0"/>
+      </a:effectRef>
+      <a:fontRef idx="minor">
+        <a:schemeClr val="lt1"/>
+      </a:fontRef>
+    </dgm:style>
+  </dgm:styleLbl>
+  <dgm:styleLbl name="bgSibTrans2D1">
+    <dgm:scene3d>
+      <a:camera prst="orthographicFront"/>
+      <a:lightRig rig="threePt" dir="t"/>
+    </dgm:scene3d>
+    <dgm:sp3d/>
+    <dgm:txPr/>
+    <dgm:style>
+      <a:lnRef idx="0">
+        <a:scrgbClr r="0" g="0" b="0"/>
+      </a:lnRef>
+      <a:fillRef idx="1">
+        <a:scrgbClr r="0" g="0" b="0"/>
+      </a:fillRef>
+      <a:effectRef idx="0">
+        <a:scrgbClr r="0" g="0" b="0"/>
+      </a:effectRef>
+      <a:fontRef idx="minor">
+        <a:schemeClr val="lt1"/>
+      </a:fontRef>
+    </dgm:style>
+  </dgm:styleLbl>
+  <dgm:styleLbl name="sibTrans1D1">
+    <dgm:scene3d>
+      <a:camera prst="orthographicFront"/>
+      <a:lightRig rig="threePt" dir="t"/>
+    </dgm:scene3d>
+    <dgm:sp3d/>
+    <dgm:txPr/>
+    <dgm:style>
+      <a:lnRef idx="1">
+        <a:scrgbClr r="0" g="0" b="0"/>
+      </a:lnRef>
+      <a:fillRef idx="0">
+        <a:scrgbClr r="0" g="0" b="0"/>
+      </a:fillRef>
+      <a:effectRef idx="0">
+        <a:scrgbClr r="0" g="0" b="0"/>
+      </a:effectRef>
+      <a:fontRef idx="minor"/>
+    </dgm:style>
+  </dgm:styleLbl>
+  <dgm:styleLbl name="callout">
+    <dgm:scene3d>
+      <a:camera prst="orthographicFront"/>
+      <a:lightRig rig="threePt" dir="t"/>
+    </dgm:scene3d>
+    <dgm:sp3d/>
+    <dgm:txPr/>
+    <dgm:style>
+      <a:lnRef idx="2">
+        <a:scrgbClr r="0" g="0" b="0"/>
+      </a:lnRef>
+      <a:fillRef idx="1">
+        <a:scrgbClr r="0" g="0" b="0"/>
+      </a:fillRef>
+      <a:effectRef idx="0">
+        <a:scrgbClr r="0" g="0" b="0"/>
+      </a:effectRef>
+      <a:fontRef idx="minor"/>
+    </dgm:style>
+  </dgm:styleLbl>
+  <dgm:styleLbl name="asst0">
+    <dgm:scene3d>
+      <a:camera prst="orthographicFront"/>
+      <a:lightRig rig="threePt" dir="t"/>
+    </dgm:scene3d>
+    <dgm:sp3d/>
+    <dgm:txPr/>
+    <dgm:style>
+      <a:lnRef idx="2">
+        <a:scrgbClr r="0" g="0" b="0"/>
+      </a:lnRef>
+      <a:fillRef idx="1">
+        <a:scrgbClr r="0" g="0" b="0"/>
+      </a:fillRef>
+      <a:effectRef idx="0">
+        <a:scrgbClr r="0" g="0" b="0"/>
+      </a:effectRef>
+      <a:fontRef idx="minor">
+        <a:schemeClr val="lt1"/>
+      </a:fontRef>
+    </dgm:style>
+  </dgm:styleLbl>
+  <dgm:styleLbl name="asst1">
+    <dgm:scene3d>
+      <a:camera prst="orthographicFront"/>
+      <a:lightRig rig="threePt" dir="t"/>
+    </dgm:scene3d>
+    <dgm:sp3d/>
+    <dgm:txPr/>
+    <dgm:style>
+      <a:lnRef idx="2">
+        <a:scrgbClr r="0" g="0" b="0"/>
+      </a:lnRef>
+      <a:fillRef idx="1">
+        <a:scrgbClr r="0" g="0" b="0"/>
+      </a:fillRef>
+      <a:effectRef idx="0">
+        <a:scrgbClr r="0" g="0" b="0"/>
+      </a:effectRef>
+      <a:fontRef idx="minor">
+        <a:schemeClr val="lt1"/>
+      </a:fontRef>
+    </dgm:style>
+  </dgm:styleLbl>
+  <dgm:styleLbl name="asst2">
+    <dgm:scene3d>
+      <a:camera prst="orthographicFront"/>
+      <a:lightRig rig="threePt" dir="t"/>
+    </dgm:scene3d>
+    <dgm:sp3d/>
+    <dgm:txPr/>
+    <dgm:style>
+      <a:lnRef idx="2">
+        <a:scrgbClr r="0" g="0" b="0"/>
+      </a:lnRef>
+      <a:fillRef idx="1">
+        <a:scrgbClr r="0" g="0" b="0"/>
+      </a:fillRef>
+      <a:effectRef idx="0">
+        <a:scrgbClr r="0" g="0" b="0"/>
+      </a:effectRef>
+      <a:fontRef idx="minor">
+        <a:schemeClr val="lt1"/>
+      </a:fontRef>
+    </dgm:style>
+  </dgm:styleLbl>
+  <dgm:styleLbl name="asst3">
+    <dgm:scene3d>
+      <a:camera prst="orthographicFront"/>
+      <a:lightRig rig="threePt" dir="t"/>
+    </dgm:scene3d>
+    <dgm:sp3d/>
+    <dgm:txPr/>
+    <dgm:style>
+      <a:lnRef idx="2">
+        <a:scrgbClr r="0" g="0" b="0"/>
+      </a:lnRef>
+      <a:fillRef idx="1">
+        <a:scrgbClr r="0" g="0" b="0"/>
+      </a:fillRef>
+      <a:effectRef idx="0">
+        <a:scrgbClr r="0" g="0" b="0"/>
+      </a:effectRef>
+      <a:fontRef idx="minor">
+        <a:schemeClr val="lt1"/>
+      </a:fontRef>
+    </dgm:style>
+  </dgm:styleLbl>
+  <dgm:styleLbl name="asst4">
+    <dgm:scene3d>
+      <a:camera prst="orthographicFront"/>
+      <a:lightRig rig="threePt" dir="t"/>
+    </dgm:scene3d>
+    <dgm:sp3d/>
+    <dgm:txPr/>
+    <dgm:style>
+      <a:lnRef idx="2">
+        <a:scrgbClr r="0" g="0" b="0"/>
+      </a:lnRef>
+      <a:fillRef idx="1">
+        <a:scrgbClr r="0" g="0" b="0"/>
+      </a:fillRef>
+      <a:effectRef idx="0">
+        <a:scrgbClr r="0" g="0" b="0"/>
+      </a:effectRef>
+      <a:fontRef idx="minor">
+        <a:schemeClr val="lt1"/>
+      </a:fontRef>
+    </dgm:style>
+  </dgm:styleLbl>
+  <dgm:styleLbl name="parChTrans2D1">
+    <dgm:scene3d>
+      <a:camera prst="orthographicFront"/>
+      <a:lightRig rig="threePt" dir="t"/>
+    </dgm:scene3d>
+    <dgm:sp3d/>
+    <dgm:txPr/>
+    <dgm:style>
+      <a:lnRef idx="2">
+        <a:scrgbClr r="0" g="0" b="0"/>
+      </a:lnRef>
+      <a:fillRef idx="1">
+        <a:scrgbClr r="0" g="0" b="0"/>
+      </a:fillRef>
+      <a:effectRef idx="0">
+        <a:scrgbClr r="0" g="0" b="0"/>
+      </a:effectRef>
+      <a:fontRef idx="minor">
+        <a:schemeClr val="lt1"/>
+      </a:fontRef>
+    </dgm:style>
+  </dgm:styleLbl>
+  <dgm:styleLbl name="parChTrans2D2">
+    <dgm:scene3d>
+      <a:camera prst="orthographicFront"/>
+      <a:lightRig rig="threePt" dir="t"/>
+    </dgm:scene3d>
+    <dgm:sp3d/>
+    <dgm:txPr/>
+    <dgm:style>
+      <a:lnRef idx="2">
+        <a:scrgbClr r="0" g="0" b="0"/>
+      </a:lnRef>
+      <a:fillRef idx="1">
+        <a:scrgbClr r="0" g="0" b="0"/>
+      </a:fillRef>
+      <a:effectRef idx="0">
+        <a:scrgbClr r="0" g="0" b="0"/>
+      </a:effectRef>
+      <a:fontRef idx="minor">
+        <a:schemeClr val="lt1"/>
+      </a:fontRef>
+    </dgm:style>
+  </dgm:styleLbl>
+  <dgm:styleLbl name="parChTrans2D3">
+    <dgm:scene3d>
+      <a:camera prst="orthographicFront"/>
+      <a:lightRig rig="threePt" dir="t"/>
+    </dgm:scene3d>
+    <dgm:sp3d/>
+    <dgm:txPr/>
+    <dgm:style>
+      <a:lnRef idx="2">
+        <a:scrgbClr r="0" g="0" b="0"/>
+      </a:lnRef>
+      <a:fillRef idx="1">
+        <a:scrgbClr r="0" g="0" b="0"/>
+      </a:fillRef>
+      <a:effectRef idx="0">
+        <a:scrgbClr r="0" g="0" b="0"/>
+      </a:effectRef>
+      <a:fontRef idx="minor">
+        <a:schemeClr val="lt1"/>
+      </a:fontRef>
+    </dgm:style>
+  </dgm:styleLbl>
+  <dgm:styleLbl name="parChTrans2D4">
+    <dgm:scene3d>
+      <a:camera prst="orthographicFront"/>
+      <a:lightRig rig="threePt" dir="t"/>
+    </dgm:scene3d>
+    <dgm:sp3d/>
+    <dgm:txPr/>
+    <dgm:style>
+      <a:lnRef idx="2">
+        <a:scrgbClr r="0" g="0" b="0"/>
+      </a:lnRef>
+      <a:fillRef idx="1">
+        <a:scrgbClr r="0" g="0" b="0"/>
+      </a:fillRef>
+      <a:effectRef idx="0">
+        <a:scrgbClr r="0" g="0" b="0"/>
+      </a:effectRef>
+      <a:fontRef idx="minor">
+        <a:schemeClr val="lt1"/>
+      </a:fontRef>
+    </dgm:style>
+  </dgm:styleLbl>
+  <dgm:styleLbl name="parChTrans1D1">
+    <dgm:scene3d>
+      <a:camera prst="orthographicFront"/>
+      <a:lightRig rig="threePt" dir="t"/>
+    </dgm:scene3d>
+    <dgm:sp3d/>
+    <dgm:txPr/>
+    <dgm:style>
+      <a:lnRef idx="2">
+        <a:scrgbClr r="0" g="0" b="0"/>
+      </a:lnRef>
+      <a:fillRef idx="0">
+        <a:scrgbClr r="0" g="0" b="0"/>
+      </a:fillRef>
+      <a:effectRef idx="0">
+        <a:scrgbClr r="0" g="0" b="0"/>
+      </a:effectRef>
+      <a:fontRef idx="minor"/>
+    </dgm:style>
+  </dgm:styleLbl>
+  <dgm:styleLbl name="parChTrans1D2">
+    <dgm:scene3d>
+      <a:camera prst="orthographicFront"/>
+      <a:lightRig rig="threePt" dir="t"/>
+    </dgm:scene3d>
+    <dgm:sp3d/>
+    <dgm:txPr/>
+    <dgm:style>
+      <a:lnRef idx="2">
+        <a:scrgbClr r="0" g="0" b="0"/>
+      </a:lnRef>
+      <a:fillRef idx="0">
+        <a:scrgbClr r="0" g="0" b="0"/>
+      </a:fillRef>
+      <a:effectRef idx="0">
+        <a:scrgbClr r="0" g="0" b="0"/>
+      </a:effectRef>
+      <a:fontRef idx="minor"/>
+    </dgm:style>
+  </dgm:styleLbl>
+  <dgm:styleLbl name="parChTrans1D3">
+    <dgm:scene3d>
+      <a:camera prst="orthographicFront"/>
+      <a:lightRig rig="threePt" dir="t"/>
+    </dgm:scene3d>
+    <dgm:sp3d/>
+    <dgm:txPr/>
+    <dgm:style>
+      <a:lnRef idx="2">
+        <a:scrgbClr r="0" g="0" b="0"/>
+      </a:lnRef>
+      <a:fillRef idx="0">
+        <a:scrgbClr r="0" g="0" b="0"/>
+      </a:fillRef>
+      <a:effectRef idx="0">
+        <a:scrgbClr r="0" g="0" b="0"/>
+      </a:effectRef>
+      <a:fontRef idx="minor"/>
+    </dgm:style>
+  </dgm:styleLbl>
+  <dgm:styleLbl name="parChTrans1D4">
+    <dgm:scene3d>
+      <a:camera prst="orthographicFront"/>
+      <a:lightRig rig="threePt" dir="t"/>
+    </dgm:scene3d>
+    <dgm:sp3d/>
+    <dgm:txPr/>
+    <dgm:style>
+      <a:lnRef idx="2">
+        <a:scrgbClr r="0" g="0" b="0"/>
+      </a:lnRef>
+      <a:fillRef idx="0">
+        <a:scrgbClr r="0" g="0" b="0"/>
+      </a:fillRef>
+      <a:effectRef idx="0">
+        <a:scrgbClr r="0" g="0" b="0"/>
+      </a:effectRef>
+      <a:fontRef idx="minor"/>
+    </dgm:style>
+  </dgm:styleLbl>
+  <dgm:styleLbl name="fgAcc1">
+    <dgm:scene3d>
+      <a:camera prst="orthographicFront"/>
+      <a:lightRig rig="threePt" dir="t"/>
+    </dgm:scene3d>
+    <dgm:sp3d/>
+    <dgm:txPr/>
+    <dgm:style>
+      <a:lnRef idx="2">
+        <a:scrgbClr r="0" g="0" b="0"/>
+      </a:lnRef>
+      <a:fillRef idx="1">
+        <a:scrgbClr r="0" g="0" b="0"/>
+      </a:fillRef>
+      <a:effectRef idx="0">
+        <a:scrgbClr r="0" g="0" b="0"/>
+      </a:effectRef>
+      <a:fontRef idx="minor"/>
+    </dgm:style>
+  </dgm:styleLbl>
+  <dgm:styleLbl name="conFgAcc1">
+    <dgm:scene3d>
+      <a:camera prst="orthographicFront"/>
+      <a:lightRig rig="threePt" dir="t"/>
+    </dgm:scene3d>
+    <dgm:sp3d/>
+    <dgm:txPr/>
+    <dgm:style>
+      <a:lnRef idx="2">
+        <a:scrgbClr r="0" g="0" b="0"/>
+      </a:lnRef>
+      <a:fillRef idx="1">
+        <a:scrgbClr r="0" g="0" b="0"/>
+      </a:fillRef>
+      <a:effectRef idx="0">
+        <a:scrgbClr r="0" g="0" b="0"/>
+      </a:effectRef>
+      <a:fontRef idx="minor"/>
+    </dgm:style>
+  </dgm:styleLbl>
+  <dgm:styleLbl name="alignAcc1">
+    <dgm:scene3d>
+      <a:camera prst="orthographicFront"/>
+      <a:lightRig rig="threePt" dir="t"/>
+    </dgm:scene3d>
+    <dgm:sp3d/>
+    <dgm:txPr/>
+    <dgm:style>
+      <a:lnRef idx="2">
+        <a:scrgbClr r="0" g="0" b="0"/>
+      </a:lnRef>
+      <a:fillRef idx="1">
+        <a:scrgbClr r="0" g="0" b="0"/>
+      </a:fillRef>
+      <a:effectRef idx="0">
+        <a:scrgbClr r="0" g="0" b="0"/>
+      </a:effectRef>
+      <a:fontRef idx="minor"/>
+    </dgm:style>
+  </dgm:styleLbl>
+  <dgm:styleLbl name="trAlignAcc1">
+    <dgm:scene3d>
+      <a:camera prst="orthographicFront"/>
+      <a:lightRig rig="threePt" dir="t"/>
+    </dgm:scene3d>
+    <dgm:sp3d/>
+    <dgm:txPr/>
+    <dgm:style>
+      <a:lnRef idx="1">
+        <a:scrgbClr r="0" g="0" b="0"/>
+      </a:lnRef>
+      <a:fillRef idx="1">
+        <a:scrgbClr r="0" g="0" b="0"/>
+      </a:fillRef>
+      <a:effectRef idx="0">
+        <a:scrgbClr r="0" g="0" b="0"/>
+      </a:effectRef>
+      <a:fontRef idx="minor"/>
+    </dgm:style>
+  </dgm:styleLbl>
+  <dgm:styleLbl name="bgAcc1">
+    <dgm:scene3d>
+      <a:camera prst="orthographicFront"/>
+      <a:lightRig rig="threePt" dir="t"/>
+    </dgm:scene3d>
+    <dgm:sp3d/>
+    <dgm:txPr/>
+    <dgm:style>
+      <a:lnRef idx="2">
+        <a:scrgbClr r="0" g="0" b="0"/>
+      </a:lnRef>
+      <a:fillRef idx="1">
+        <a:scrgbClr r="0" g="0" b="0"/>
+      </a:fillRef>
+      <a:effectRef idx="0">
+        <a:scrgbClr r="0" g="0" b="0"/>
+      </a:effectRef>
+      <a:fontRef idx="minor"/>
+    </dgm:style>
+  </dgm:styleLbl>
+  <dgm:styleLbl name="solidFgAcc1">
+    <dgm:scene3d>
+      <a:camera prst="orthographicFront"/>
+      <a:lightRig rig="threePt" dir="t"/>
+    </dgm:scene3d>
+    <dgm:sp3d/>
+    <dgm:txPr/>
+    <dgm:style>
+      <a:lnRef idx="2">
+        <a:scrgbClr r="0" g="0" b="0"/>
+      </a:lnRef>
+      <a:fillRef idx="1">
+        <a:scrgbClr r="0" g="0" b="0"/>
+      </a:fillRef>
+      <a:effectRef idx="0">
+        <a:scrgbClr r="0" g="0" b="0"/>
+      </a:effectRef>
+      <a:fontRef idx="minor"/>
+    </dgm:style>
+  </dgm:styleLbl>
+  <dgm:styleLbl name="solidAlignAcc1">
+    <dgm:scene3d>
+      <a:camera prst="orthographicFront"/>
+      <a:lightRig rig="threePt" dir="t"/>
+    </dgm:scene3d>
+    <dgm:sp3d/>
+    <dgm:txPr/>
+    <dgm:style>
+      <a:lnRef idx="2">
+        <a:scrgbClr r="0" g="0" b="0"/>
+      </a:lnRef>
+      <a:fillRef idx="1">
+        <a:scrgbClr r="0" g="0" b="0"/>
+      </a:fillRef>
+      <a:effectRef idx="0">
+        <a:scrgbClr r="0" g="0" b="0"/>
+      </a:effectRef>
+      <a:fontRef idx="minor"/>
+    </dgm:style>
+  </dgm:styleLbl>
+  <dgm:styleLbl name="solidBgAcc1">
+    <dgm:scene3d>
+      <a:camera prst="orthographicFront"/>
+      <a:lightRig rig="threePt" dir="t"/>
+    </dgm:scene3d>
+    <dgm:sp3d/>
+    <dgm:txPr/>
+    <dgm:style>
+      <a:lnRef idx="2">
+        <a:scrgbClr r="0" g="0" b="0"/>
+      </a:lnRef>
+      <a:fillRef idx="1">
+        <a:scrgbClr r="0" g="0" b="0"/>
+      </a:fillRef>
+      <a:effectRef idx="0">
+        <a:scrgbClr r="0" g="0" b="0"/>
+      </a:effectRef>
+      <a:fontRef idx="minor"/>
+    </dgm:style>
+  </dgm:styleLbl>
+  <dgm:styleLbl name="fgAccFollowNode1">
+    <dgm:scene3d>
+      <a:camera prst="orthographicFront"/>
+      <a:lightRig rig="threePt" dir="t"/>
+    </dgm:scene3d>
+    <dgm:sp3d/>
+    <dgm:txPr/>
+    <dgm:style>
+      <a:lnRef idx="2">
+        <a:scrgbClr r="0" g="0" b="0"/>
+      </a:lnRef>
+      <a:fillRef idx="1">
+        <a:scrgbClr r="0" g="0" b="0"/>
+      </a:fillRef>
+      <a:effectRef idx="0">
+        <a:scrgbClr r="0" g="0" b="0"/>
+      </a:effectRef>
+      <a:fontRef idx="minor"/>
+    </dgm:style>
+  </dgm:styleLbl>
+  <dgm:styleLbl name="alignAccFollowNode1">
+    <dgm:scene3d>
+      <a:camera prst="orthographicFront"/>
+      <a:lightRig rig="threePt" dir="t"/>
+    </dgm:scene3d>
+    <dgm:sp3d/>
+    <dgm:txPr/>
+    <dgm:style>
+      <a:lnRef idx="2">
+        <a:scrgbClr r="0" g="0" b="0"/>
+      </a:lnRef>
+      <a:fillRef idx="1">
+        <a:scrgbClr r="0" g="0" b="0"/>
+      </a:fillRef>
+      <a:effectRef idx="0">
+        <a:scrgbClr r="0" g="0" b="0"/>
+      </a:effectRef>
+      <a:fontRef idx="minor"/>
+    </dgm:style>
+  </dgm:styleLbl>
+  <dgm:styleLbl name="bgAccFollowNode1">
+    <dgm:scene3d>
+      <a:camera prst="orthographicFront"/>
+      <a:lightRig rig="threePt" dir="t"/>
+    </dgm:scene3d>
+    <dgm:sp3d/>
+    <dgm:txPr/>
+    <dgm:style>
+      <a:lnRef idx="2">
+        <a:scrgbClr r="0" g="0" b="0"/>
+      </a:lnRef>
+      <a:fillRef idx="1">
+        <a:scrgbClr r="0" g="0" b="0"/>
+      </a:fillRef>
+      <a:effectRef idx="0">
+        <a:scrgbClr r="0" g="0" b="0"/>
+      </a:effectRef>
+      <a:fontRef idx="minor"/>
+    </dgm:style>
+  </dgm:styleLbl>
+  <dgm:styleLbl name="fgAcc0">
+    <dgm:scene3d>
+      <a:camera prst="orthographicFront"/>
+      <a:lightRig rig="threePt" dir="t"/>
+    </dgm:scene3d>
+    <dgm:sp3d/>
+    <dgm:txPr/>
+    <dgm:style>
+      <a:lnRef idx="2">
+        <a:scrgbClr r="0" g="0" b="0"/>
+      </a:lnRef>
+      <a:fillRef idx="1">
+        <a:scrgbClr r="0" g="0" b="0"/>
+      </a:fillRef>
+      <a:effectRef idx="0">
+        <a:scrgbClr r="0" g="0" b="0"/>
+      </a:effectRef>
+      <a:fontRef idx="minor"/>
+    </dgm:style>
+  </dgm:styleLbl>
+  <dgm:styleLbl name="fgAcc2">
+    <dgm:scene3d>
+      <a:camera prst="orthographicFront"/>
+      <a:lightRig rig="threePt" dir="t"/>
+    </dgm:scene3d>
+    <dgm:sp3d/>
+    <dgm:txPr/>
+    <dgm:style>
+      <a:lnRef idx="2">
+        <a:scrgbClr r="0" g="0" b="0"/>
+      </a:lnRef>
+      <a:fillRef idx="1">
+        <a:scrgbClr r="0" g="0" b="0"/>
+      </a:fillRef>
+      <a:effectRef idx="0">
+        <a:scrgbClr r="0" g="0" b="0"/>
+      </a:effectRef>
+      <a:fontRef idx="minor"/>
+    </dgm:style>
+  </dgm:styleLbl>
+  <dgm:styleLbl name="fgAcc3">
+    <dgm:scene3d>
+      <a:camera prst="orthographicFront"/>
+      <a:lightRig rig="threePt" dir="t"/>
+    </dgm:scene3d>
+    <dgm:sp3d/>
+    <dgm:txPr/>
+    <dgm:style>
+      <a:lnRef idx="2">
+        <a:scrgbClr r="0" g="0" b="0"/>
+      </a:lnRef>
+      <a:fillRef idx="1">
+        <a:scrgbClr r="0" g="0" b="0"/>
+      </a:fillRef>
+      <a:effectRef idx="0">
+        <a:scrgbClr r="0" g="0" b="0"/>
+      </a:effectRef>
+      <a:fontRef idx="minor"/>
+    </dgm:style>
+  </dgm:styleLbl>
+  <dgm:styleLbl name="fgAcc4">
+    <dgm:scene3d>
+      <a:camera prst="orthographicFront"/>
+      <a:lightRig rig="threePt" dir="t"/>
+    </dgm:scene3d>
+    <dgm:sp3d/>
+    <dgm:txPr/>
+    <dgm:style>
+      <a:lnRef idx="2">
+        <a:scrgbClr r="0" g="0" b="0"/>
+      </a:lnRef>
+      <a:fillRef idx="1">
+        <a:scrgbClr r="0" g="0" b="0"/>
+      </a:fillRef>
+      <a:effectRef idx="0">
+        <a:scrgbClr r="0" g="0" b="0"/>
+      </a:effectRef>
+      <a:fontRef idx="minor"/>
+    </dgm:style>
+  </dgm:styleLbl>
+  <dgm:styleLbl name="bgShp">
+    <dgm:scene3d>
+      <a:camera prst="orthographicFront"/>
+      <a:lightRig rig="threePt" dir="t"/>
+    </dgm:scene3d>
+    <dgm:sp3d/>
+    <dgm:txPr/>
+    <dgm:style>
+      <a:lnRef idx="0">
+        <a:scrgbClr r="0" g="0" b="0"/>
+      </a:lnRef>
+      <a:fillRef idx="1">
+        <a:scrgbClr r="0" g="0" b="0"/>
+      </a:fillRef>
+      <a:effectRef idx="0">
+        <a:scrgbClr r="0" g="0" b="0"/>
+      </a:effectRef>
+      <a:fontRef idx="minor"/>
+    </dgm:style>
+  </dgm:styleLbl>
+  <dgm:styleLbl name="dkBgShp">
+    <dgm:scene3d>
+      <a:camera prst="orthographicFront"/>
+      <a:lightRig rig="threePt" dir="t"/>
+    </dgm:scene3d>
+    <dgm:sp3d/>
+    <dgm:txPr/>
+    <dgm:style>
+      <a:lnRef idx="0">
+        <a:scrgbClr r="0" g="0" b="0"/>
+      </a:lnRef>
+      <a:fillRef idx="1">
+        <a:scrgbClr r="0" g="0" b="0"/>
+      </a:fillRef>
+      <a:effectRef idx="0">
+        <a:scrgbClr r="0" g="0" b="0"/>
+      </a:effectRef>
+      <a:fontRef idx="minor"/>
+    </dgm:style>
+  </dgm:styleLbl>
+  <dgm:styleLbl name="trBgShp">
+    <dgm:scene3d>
+      <a:camera prst="orthographicFront"/>
+      <a:lightRig rig="threePt" dir="t"/>
+    </dgm:scene3d>
+    <dgm:sp3d/>
+    <dgm:txPr/>
+    <dgm:style>
+      <a:lnRef idx="0">
+        <a:scrgbClr r="0" g="0" b="0"/>
+      </a:lnRef>
+      <a:fillRef idx="1">
+        <a:scrgbClr r="0" g="0" b="0"/>
+      </a:fillRef>
+      <a:effectRef idx="0">
+        <a:scrgbClr r="0" g="0" b="0"/>
+      </a:effectRef>
+      <a:fontRef idx="minor"/>
+    </dgm:style>
+  </dgm:styleLbl>
+  <dgm:styleLbl name="fgShp">
+    <dgm:scene3d>
+      <a:camera prst="orthographicFront"/>
+      <a:lightRig rig="threePt" dir="t"/>
+    </dgm:scene3d>
+    <dgm:sp3d/>
+    <dgm:txPr/>
+    <dgm:style>
+      <a:lnRef idx="2">
+        <a:scrgbClr r="0" g="0" b="0"/>
+      </a:lnRef>
+      <a:fillRef idx="1">
+        <a:scrgbClr r="0" g="0" b="0"/>
+      </a:fillRef>
+      <a:effectRef idx="0">
+        <a:scrgbClr r="0" g="0" b="0"/>
+      </a:effectRef>
+      <a:fontRef idx="minor"/>
+    </dgm:style>
+  </dgm:styleLbl>
+  <dgm:styleLbl name="revTx">
+    <dgm:scene3d>
+      <a:camera prst="orthographicFront"/>
+      <a:lightRig rig="threePt" dir="t"/>
+    </dgm:scene3d>
+    <dgm:sp3d/>
+    <dgm:txPr/>
+    <dgm:style>
+      <a:lnRef idx="0">
+        <a:scrgbClr r="0" g="0" b="0"/>
+      </a:lnRef>
+      <a:fillRef idx="0">
+        <a:scrgbClr r="0" g="0" b="0"/>
+      </a:fillRef>
+      <a:effectRef idx="0">
+        <a:scrgbClr r="0" g="0" b="0"/>
+      </a:effectRef>
+      <a:fontRef idx="minor"/>
+    </dgm:style>
+  </dgm:styleLbl>
+</dgm:styleDef>
 </file>
 
 <file path=ppt/slideLayouts/slideLayout1.xml><?xml version="1.0" encoding="utf-8"?>
@@ -4253,7 +8213,7 @@
           <a:noFill/>
         </p:spPr>
         <p:txBody>
-          <a:bodyPr wrap="square" rtlCol="0" anchor="ctr">
+          <a:bodyPr wrap="square" rtlCol="0">
             <a:spAutoFit/>
           </a:bodyPr>
           <a:lstStyle/>
@@ -4261,7 +8221,7 @@
             <a:pPr algn="ctr"/>
             <a:r>
               <a:rPr lang="de-DE" sz="11500" b="1" dirty="0" smtClean="0"/>
-              <a:t>Q&amp;A</a:t>
+              <a:t>Live-Demo</a:t>
             </a:r>
             <a:endParaRPr lang="de-DE" sz="11500" b="1" dirty="0"/>
           </a:p>
@@ -6361,23 +10321,34 @@
                   <a:schemeClr val="tx1"/>
                 </a:solidFill>
               </a:rPr>
-              <a:t>Neue Tabelle erstellen mit </a:t>
-            </a:r>
+              <a:t>Berechnung der Wahlkreisergebnisse auf Bundesland-Ebene, dann deutschlandweit</a:t>
+            </a:r>
+          </a:p>
+          <a:p>
+            <a:pPr lvl="1"/>
             <a:r>
               <a:rPr lang="de-DE" dirty="0" err="1" smtClean="0">
                 <a:solidFill>
                   <a:schemeClr val="tx1"/>
                 </a:solidFill>
               </a:rPr>
-              <a:t>Tmp</a:t>
-            </a:r>
+              <a:t>Divisorverfahren</a:t>
+            </a:r>
+            <a:endParaRPr lang="de-DE" dirty="0" smtClean="0">
+              <a:solidFill>
+                <a:schemeClr val="tx1"/>
+              </a:solidFill>
+            </a:endParaRPr>
+          </a:p>
+          <a:p>
+            <a:pPr lvl="1"/>
             <a:r>
               <a:rPr lang="de-DE" dirty="0" smtClean="0">
                 <a:solidFill>
                   <a:schemeClr val="tx1"/>
                 </a:solidFill>
               </a:rPr>
-              <a:t> = (</a:t>
+              <a:t>Ergebnis wird unter Berücksichtigung der Überhangmandate auf Bundesland-Ebene </a:t>
             </a:r>
             <a:r>
               <a:rPr lang="de-DE" dirty="0" err="1" smtClean="0">
@@ -6385,7 +10356,7 @@
                   <a:schemeClr val="tx1"/>
                 </a:solidFill>
               </a:rPr>
-              <a:t>partei</a:t>
+              <a:t>heruntergebrochen</a:t>
             </a:r>
             <a:r>
               <a:rPr lang="de-DE" dirty="0" smtClean="0">
@@ -6393,90 +10364,7 @@
                   <a:schemeClr val="tx1"/>
                 </a:solidFill>
               </a:rPr>
-              <a:t>, </a:t>
-            </a:r>
-            <a:r>
-              <a:rPr lang="de-DE" dirty="0" err="1" smtClean="0">
-                <a:solidFill>
-                  <a:schemeClr val="tx1"/>
-                </a:solidFill>
-              </a:rPr>
-              <a:t>durchgang</a:t>
-            </a:r>
-            <a:r>
-              <a:rPr lang="de-DE" dirty="0" smtClean="0">
-                <a:solidFill>
-                  <a:schemeClr val="tx1"/>
-                </a:solidFill>
-              </a:rPr>
-              <a:t>, stimmenanzahl) und für jede Partei </a:t>
-            </a:r>
-            <a:r>
-              <a:rPr lang="de-DE" dirty="0" err="1" smtClean="0">
-                <a:solidFill>
-                  <a:schemeClr val="tx1"/>
-                </a:solidFill>
-              </a:rPr>
-              <a:t>anz.stimmen</a:t>
-            </a:r>
-            <a:r>
-              <a:rPr lang="de-DE" dirty="0" smtClean="0">
-                <a:solidFill>
-                  <a:schemeClr val="tx1"/>
-                </a:solidFill>
-              </a:rPr>
-              <a:t>/(0.5, 1.5, 2.5, ...) berechnen</a:t>
-            </a:r>
-          </a:p>
-          <a:p>
-            <a:pPr lvl="1">
-              <a:buNone/>
-            </a:pPr>
-            <a:r>
-              <a:rPr lang="de-DE" dirty="0" smtClean="0">
-                <a:solidFill>
-                  <a:schemeClr val="tx1"/>
-                </a:solidFill>
-              </a:rPr>
-              <a:t>	(Metrik: bis Stimmenanzahl &lt; Hare Quote)</a:t>
-            </a:r>
-          </a:p>
-          <a:p>
-            <a:pPr lvl="1"/>
-            <a:r>
-              <a:rPr lang="de-DE" dirty="0" smtClean="0">
-                <a:solidFill>
-                  <a:schemeClr val="tx1"/>
-                </a:solidFill>
-              </a:rPr>
-              <a:t>Hilfstabelle „Divisor“</a:t>
-            </a:r>
-          </a:p>
-          <a:p>
-            <a:pPr lvl="1"/>
-            <a:r>
-              <a:rPr lang="de-DE" dirty="0" smtClean="0">
-                <a:solidFill>
-                  <a:schemeClr val="tx1"/>
-                </a:solidFill>
-              </a:rPr>
-              <a:t>Nach Stimmenanzahl sortieren (</a:t>
-            </a:r>
-            <a:r>
-              <a:rPr lang="de-DE" dirty="0" err="1" smtClean="0">
-                <a:solidFill>
-                  <a:schemeClr val="tx1"/>
-                </a:solidFill>
-              </a:rPr>
-              <a:t>desc</a:t>
-            </a:r>
-            <a:r>
-              <a:rPr lang="de-DE" dirty="0" smtClean="0">
-                <a:solidFill>
-                  <a:schemeClr val="tx1"/>
-                </a:solidFill>
-              </a:rPr>
-              <a:t>) und die ersten 598 auswählen. Danach kann man die Parteien zählen und die Anzahl der Sitze für jede Partei herausfinden</a:t>
+              <a:t> um die gewählten Landeslistenkandidaten zu berechnen</a:t>
             </a:r>
             <a:endParaRPr lang="de-DE" dirty="0">
               <a:solidFill>
@@ -6535,6 +10423,211 @@
           <a:p>
             <a:r>
               <a:rPr lang="de-DE" dirty="0" smtClean="0"/>
+              <a:t>Online Stimmabgabe</a:t>
+            </a:r>
+            <a:endParaRPr lang="de-DE" dirty="0"/>
+          </a:p>
+        </p:txBody>
+      </p:sp>
+      <p:graphicFrame>
+        <p:nvGraphicFramePr>
+          <p:cNvPr id="4" name="Diagramm 3"/>
+          <p:cNvGraphicFramePr/>
+          <p:nvPr/>
+        </p:nvGraphicFramePr>
+        <p:xfrm>
+          <a:off x="395536" y="2132856"/>
+          <a:ext cx="6096000" cy="4064000"/>
+        </p:xfrm>
+        <a:graphic>
+          <a:graphicData uri="http://schemas.openxmlformats.org/drawingml/2006/diagram">
+            <dgm:relIds xmlns:dgm="http://schemas.openxmlformats.org/drawingml/2006/diagram" xmlns:r="http://schemas.openxmlformats.org/officeDocument/2006/relationships" r:dm="rId2" r:lo="rId3" r:qs="rId4" r:cs="rId5"/>
+          </a:graphicData>
+        </a:graphic>
+      </p:graphicFrame>
+      <p:sp>
+        <p:nvSpPr>
+          <p:cNvPr id="5" name="Legende mit Pfeil nach links 4"/>
+          <p:cNvSpPr/>
+          <p:nvPr/>
+        </p:nvSpPr>
+        <p:spPr>
+          <a:xfrm>
+            <a:off x="5652120" y="2492896"/>
+            <a:ext cx="2700000" cy="1008112"/>
+          </a:xfrm>
+          <a:prstGeom prst="leftArrowCallout">
+            <a:avLst>
+              <a:gd name="adj1" fmla="val 25000"/>
+              <a:gd name="adj2" fmla="val 25000"/>
+              <a:gd name="adj3" fmla="val 25000"/>
+              <a:gd name="adj4" fmla="val 77494"/>
+            </a:avLst>
+          </a:prstGeom>
+        </p:spPr>
+        <p:style>
+          <a:lnRef idx="0">
+            <a:schemeClr val="accent6"/>
+          </a:lnRef>
+          <a:fillRef idx="3">
+            <a:schemeClr val="accent6"/>
+          </a:fillRef>
+          <a:effectRef idx="3">
+            <a:schemeClr val="accent6"/>
+          </a:effectRef>
+          <a:fontRef idx="minor">
+            <a:schemeClr val="lt1"/>
+          </a:fontRef>
+        </p:style>
+        <p:txBody>
+          <a:bodyPr rtlCol="0" anchor="ctr"/>
+          <a:lstStyle/>
+          <a:p>
+            <a:pPr algn="ctr"/>
+            <a:r>
+              <a:rPr lang="de-DE" sz="1600" dirty="0" smtClean="0"/>
+              <a:t>Check: Personalausweis-nummer valide? Noch nicht gewählt?</a:t>
+            </a:r>
+            <a:endParaRPr lang="de-DE" sz="1600" dirty="0"/>
+          </a:p>
+        </p:txBody>
+      </p:sp>
+      <p:sp>
+        <p:nvSpPr>
+          <p:cNvPr id="6" name="Legende mit Pfeil nach links 5"/>
+          <p:cNvSpPr/>
+          <p:nvPr/>
+        </p:nvSpPr>
+        <p:spPr>
+          <a:xfrm>
+            <a:off x="6516216" y="4653136"/>
+            <a:ext cx="2591480" cy="1008112"/>
+          </a:xfrm>
+          <a:prstGeom prst="leftArrowCallout">
+            <a:avLst>
+              <a:gd name="adj1" fmla="val 25000"/>
+              <a:gd name="adj2" fmla="val 25000"/>
+              <a:gd name="adj3" fmla="val 25000"/>
+              <a:gd name="adj4" fmla="val 78062"/>
+            </a:avLst>
+          </a:prstGeom>
+        </p:spPr>
+        <p:style>
+          <a:lnRef idx="0">
+            <a:schemeClr val="accent6"/>
+          </a:lnRef>
+          <a:fillRef idx="3">
+            <a:schemeClr val="accent6"/>
+          </a:fillRef>
+          <a:effectRef idx="3">
+            <a:schemeClr val="accent6"/>
+          </a:effectRef>
+          <a:fontRef idx="minor">
+            <a:schemeClr val="lt1"/>
+          </a:fontRef>
+        </p:style>
+        <p:txBody>
+          <a:bodyPr rtlCol="0" anchor="ctr"/>
+          <a:lstStyle/>
+          <a:p>
+            <a:pPr algn="ctr"/>
+            <a:r>
+              <a:rPr lang="de-DE" sz="1600" dirty="0" smtClean="0"/>
+              <a:t>Eintragung der Stimmen und Markierung „gewählt“ separat</a:t>
+            </a:r>
+            <a:endParaRPr lang="de-DE" sz="1600" dirty="0"/>
+          </a:p>
+        </p:txBody>
+      </p:sp>
+      <p:sp>
+        <p:nvSpPr>
+          <p:cNvPr id="7" name="Legende mit Pfeil nach links 6"/>
+          <p:cNvSpPr/>
+          <p:nvPr/>
+        </p:nvSpPr>
+        <p:spPr>
+          <a:xfrm>
+            <a:off x="6156176" y="3573016"/>
+            <a:ext cx="2700000" cy="1008112"/>
+          </a:xfrm>
+          <a:prstGeom prst="leftArrowCallout">
+            <a:avLst>
+              <a:gd name="adj1" fmla="val 25000"/>
+              <a:gd name="adj2" fmla="val 25000"/>
+              <a:gd name="adj3" fmla="val 25000"/>
+              <a:gd name="adj4" fmla="val 78873"/>
+            </a:avLst>
+          </a:prstGeom>
+        </p:spPr>
+        <p:style>
+          <a:lnRef idx="0">
+            <a:schemeClr val="accent6"/>
+          </a:lnRef>
+          <a:fillRef idx="3">
+            <a:schemeClr val="accent6"/>
+          </a:fillRef>
+          <a:effectRef idx="3">
+            <a:schemeClr val="accent6"/>
+          </a:effectRef>
+          <a:fontRef idx="minor">
+            <a:schemeClr val="lt1"/>
+          </a:fontRef>
+        </p:style>
+        <p:txBody>
+          <a:bodyPr rtlCol="0" anchor="ctr"/>
+          <a:lstStyle/>
+          <a:p>
+            <a:pPr algn="ctr"/>
+            <a:r>
+              <a:rPr lang="de-DE" sz="1600" dirty="0" smtClean="0"/>
+              <a:t>Check: Genau eine Erststimme und genau eine Zweitstimme?</a:t>
+            </a:r>
+            <a:endParaRPr lang="de-DE" sz="1600" dirty="0"/>
+          </a:p>
+        </p:txBody>
+      </p:sp>
+    </p:spTree>
+  </p:cSld>
+  <p:clrMapOvr>
+    <a:masterClrMapping/>
+  </p:clrMapOvr>
+</p:sld>
+</file>
+
+<file path=ppt/slides/slide9.xml><?xml version="1.0" encoding="utf-8"?>
+<p:sld xmlns:a="http://schemas.openxmlformats.org/drawingml/2006/main" xmlns:r="http://schemas.openxmlformats.org/officeDocument/2006/relationships" xmlns:p="http://schemas.openxmlformats.org/presentationml/2006/main">
+  <p:cSld>
+    <p:spTree>
+      <p:nvGrpSpPr>
+        <p:cNvPr id="1" name=""/>
+        <p:cNvGrpSpPr/>
+        <p:nvPr/>
+      </p:nvGrpSpPr>
+      <p:grpSpPr>
+        <a:xfrm>
+          <a:off x="0" y="0"/>
+          <a:ext cx="0" cy="0"/>
+          <a:chOff x="0" y="0"/>
+          <a:chExt cx="0" cy="0"/>
+        </a:xfrm>
+      </p:grpSpPr>
+      <p:sp>
+        <p:nvSpPr>
+          <p:cNvPr id="2" name="Titel 1"/>
+          <p:cNvSpPr>
+            <a:spLocks noGrp="1"/>
+          </p:cNvSpPr>
+          <p:nvPr>
+            <p:ph type="title"/>
+          </p:nvPr>
+        </p:nvSpPr>
+        <p:spPr/>
+        <p:txBody>
+          <a:bodyPr/>
+          <a:lstStyle/>
+          <a:p>
+            <a:r>
+              <a:rPr lang="de-DE" dirty="0" smtClean="0"/>
               <a:t>Benchmark</a:t>
             </a:r>
             <a:endParaRPr lang="de-DE" dirty="0"/>
@@ -6609,69 +10702,6 @@
           </a:ln>
         </p:spPr>
       </p:pic>
-    </p:spTree>
-  </p:cSld>
-  <p:clrMapOvr>
-    <a:masterClrMapping/>
-  </p:clrMapOvr>
-  <p:timing>
-    <p:tnLst>
-      <p:par>
-        <p:cTn id="1" dur="indefinite" restart="never" nodeType="tmRoot"/>
-      </p:par>
-    </p:tnLst>
-  </p:timing>
-</p:sld>
-</file>
-
-<file path=ppt/slides/slide9.xml><?xml version="1.0" encoding="utf-8"?>
-<p:sld xmlns:a="http://schemas.openxmlformats.org/drawingml/2006/main" xmlns:r="http://schemas.openxmlformats.org/officeDocument/2006/relationships" xmlns:p="http://schemas.openxmlformats.org/presentationml/2006/main">
-  <p:cSld>
-    <p:spTree>
-      <p:nvGrpSpPr>
-        <p:cNvPr id="1" name=""/>
-        <p:cNvGrpSpPr/>
-        <p:nvPr/>
-      </p:nvGrpSpPr>
-      <p:grpSpPr>
-        <a:xfrm>
-          <a:off x="0" y="0"/>
-          <a:ext cx="0" cy="0"/>
-          <a:chOff x="0" y="0"/>
-          <a:chExt cx="0" cy="0"/>
-        </a:xfrm>
-      </p:grpSpPr>
-      <p:sp>
-        <p:nvSpPr>
-          <p:cNvPr id="5" name="Textfeld 4"/>
-          <p:cNvSpPr txBox="1"/>
-          <p:nvPr/>
-        </p:nvSpPr>
-        <p:spPr>
-          <a:xfrm>
-            <a:off x="0" y="2575064"/>
-            <a:ext cx="9144000" cy="1862048"/>
-          </a:xfrm>
-          <a:prstGeom prst="rect">
-            <a:avLst/>
-          </a:prstGeom>
-          <a:noFill/>
-        </p:spPr>
-        <p:txBody>
-          <a:bodyPr wrap="square" rtlCol="0">
-            <a:spAutoFit/>
-          </a:bodyPr>
-          <a:lstStyle/>
-          <a:p>
-            <a:pPr algn="ctr"/>
-            <a:r>
-              <a:rPr lang="de-DE" sz="11500" b="1" dirty="0" smtClean="0"/>
-              <a:t>Live-Demo</a:t>
-            </a:r>
-            <a:endParaRPr lang="de-DE" sz="11500" b="1" dirty="0"/>
-          </a:p>
-        </p:txBody>
-      </p:sp>
     </p:spTree>
   </p:cSld>
   <p:clrMapOvr>

</xml_diff>